<commit_message>
Started making an ER diagram
</commit_message>
<xml_diff>
--- a/WAD2 Group Project Design Spec.pptx
+++ b/WAD2 Group Project Design Spec.pptx
@@ -8,6 +8,7 @@
     <p:sldId id="256" r:id="rId2"/>
     <p:sldId id="257" r:id="rId3"/>
     <p:sldId id="258" r:id="rId4"/>
+    <p:sldId id="259" r:id="rId5"/>
   </p:sldIdLst>
   <p:sldSz cx="12192000" cy="6858000"/>
   <p:notesSz cx="6858000" cy="9144000"/>
@@ -106,6 +107,11 @@
       </a:defRPr>
     </a:lvl9pPr>
   </p:defaultTextStyle>
+  <p:extLst>
+    <p:ext uri="{EFAFB233-063F-42B5-8137-9DF3F51BA10A}">
+      <p15:sldGuideLst xmlns:p15="http://schemas.microsoft.com/office/powerpoint/2012/main"/>
+    </p:ext>
+  </p:extLst>
 </p:presentation>
 </file>
 
@@ -3576,6 +3582,934 @@
     <p:extLst>
       <p:ext uri="{BB962C8B-B14F-4D97-AF65-F5344CB8AC3E}">
         <p14:creationId xmlns:p14="http://schemas.microsoft.com/office/powerpoint/2010/main" val="2058726886"/>
+      </p:ext>
+    </p:extLst>
+  </p:cSld>
+  <p:clrMapOvr>
+    <a:masterClrMapping/>
+  </p:clrMapOvr>
+</p:sld>
+</file>
+
+<file path=ppt/slides/slide4.xml><?xml version="1.0" encoding="utf-8"?>
+<p:sld xmlns:a="http://schemas.openxmlformats.org/drawingml/2006/main" xmlns:r="http://schemas.openxmlformats.org/officeDocument/2006/relationships" xmlns:p="http://schemas.openxmlformats.org/presentationml/2006/main">
+  <p:cSld>
+    <p:spTree>
+      <p:nvGrpSpPr>
+        <p:cNvPr id="1" name=""/>
+        <p:cNvGrpSpPr/>
+        <p:nvPr/>
+      </p:nvGrpSpPr>
+      <p:grpSpPr>
+        <a:xfrm>
+          <a:off x="0" y="0"/>
+          <a:ext cx="0" cy="0"/>
+          <a:chOff x="0" y="0"/>
+          <a:chExt cx="0" cy="0"/>
+        </a:xfrm>
+      </p:grpSpPr>
+      <p:sp>
+        <p:nvSpPr>
+          <p:cNvPr id="2" name="Title 1">
+            <a:extLst>
+              <a:ext uri="{FF2B5EF4-FFF2-40B4-BE49-F238E27FC236}">
+                <a16:creationId xmlns:a16="http://schemas.microsoft.com/office/drawing/2014/main" id="{41EA2D55-21D6-B6D6-9F55-727B1DB29312}"/>
+              </a:ext>
+            </a:extLst>
+          </p:cNvPr>
+          <p:cNvSpPr>
+            <a:spLocks noGrp="1"/>
+          </p:cNvSpPr>
+          <p:nvPr>
+            <p:ph type="title"/>
+          </p:nvPr>
+        </p:nvSpPr>
+        <p:spPr/>
+        <p:txBody>
+          <a:bodyPr/>
+          <a:lstStyle/>
+          <a:p>
+            <a:r>
+              <a:rPr lang="en-GB" dirty="0"/>
+              <a:t>ER diagram</a:t>
+            </a:r>
+          </a:p>
+        </p:txBody>
+      </p:sp>
+      <p:pic>
+        <p:nvPicPr>
+          <p:cNvPr id="71" name="Picture 70">
+            <a:extLst>
+              <a:ext uri="{FF2B5EF4-FFF2-40B4-BE49-F238E27FC236}">
+                <a16:creationId xmlns:a16="http://schemas.microsoft.com/office/drawing/2014/main" id="{A547FD92-61E2-213B-CADB-C21A836C8F29}"/>
+              </a:ext>
+            </a:extLst>
+          </p:cNvPr>
+          <p:cNvPicPr>
+            <a:picLocks noChangeAspect="1"/>
+          </p:cNvPicPr>
+          <p:nvPr/>
+        </p:nvPicPr>
+        <p:blipFill>
+          <a:blip r:embed="rId2"/>
+          <a:stretch>
+            <a:fillRect/>
+          </a:stretch>
+        </p:blipFill>
+        <p:spPr>
+          <a:xfrm>
+            <a:off x="838200" y="1673102"/>
+            <a:ext cx="4765519" cy="3009429"/>
+          </a:xfrm>
+          <a:prstGeom prst="rect">
+            <a:avLst/>
+          </a:prstGeom>
+        </p:spPr>
+      </p:pic>
+      <p:graphicFrame>
+        <p:nvGraphicFramePr>
+          <p:cNvPr id="72" name="Table 71">
+            <a:extLst>
+              <a:ext uri="{FF2B5EF4-FFF2-40B4-BE49-F238E27FC236}">
+                <a16:creationId xmlns:a16="http://schemas.microsoft.com/office/drawing/2014/main" id="{06EBC0DF-4A1D-DD4C-12DF-00BA674345D3}"/>
+              </a:ext>
+            </a:extLst>
+          </p:cNvPr>
+          <p:cNvGraphicFramePr>
+            <a:graphicFrameLocks noGrp="1"/>
+          </p:cNvGraphicFramePr>
+          <p:nvPr>
+            <p:extLst>
+              <p:ext uri="{D42A27DB-BD31-4B8C-83A1-F6EECF244321}">
+                <p14:modId xmlns:p14="http://schemas.microsoft.com/office/powerpoint/2010/main" val="508242387"/>
+              </p:ext>
+            </p:extLst>
+          </p:nvPr>
+        </p:nvGraphicFramePr>
+        <p:xfrm>
+          <a:off x="5584797" y="575822"/>
+          <a:ext cx="2893962" cy="2194560"/>
+        </p:xfrm>
+        <a:graphic>
+          <a:graphicData uri="http://schemas.openxmlformats.org/drawingml/2006/table">
+            <a:tbl>
+              <a:tblPr firstRow="1" bandRow="1">
+                <a:tableStyleId>{5C22544A-7EE6-4342-B048-85BDC9FD1C3A}</a:tableStyleId>
+              </a:tblPr>
+              <a:tblGrid>
+                <a:gridCol w="1446981">
+                  <a:extLst>
+                    <a:ext uri="{9D8B030D-6E8A-4147-A177-3AD203B41FA5}">
+                      <a16:colId xmlns:a16="http://schemas.microsoft.com/office/drawing/2014/main" val="1978240753"/>
+                    </a:ext>
+                  </a:extLst>
+                </a:gridCol>
+                <a:gridCol w="1446981">
+                  <a:extLst>
+                    <a:ext uri="{9D8B030D-6E8A-4147-A177-3AD203B41FA5}">
+                      <a16:colId xmlns:a16="http://schemas.microsoft.com/office/drawing/2014/main" val="1094651281"/>
+                    </a:ext>
+                  </a:extLst>
+                </a:gridCol>
+              </a:tblGrid>
+              <a:tr h="318720">
+                <a:tc>
+                  <a:txBody>
+                    <a:bodyPr/>
+                    <a:lstStyle/>
+                    <a:p>
+                      <a:r>
+                        <a:rPr lang="en-GB" dirty="0"/>
+                        <a:t>Fields</a:t>
+                      </a:r>
+                    </a:p>
+                  </a:txBody>
+                  <a:tcPr/>
+                </a:tc>
+                <a:tc>
+                  <a:txBody>
+                    <a:bodyPr/>
+                    <a:lstStyle/>
+                    <a:p>
+                      <a:r>
+                        <a:rPr lang="en-GB" dirty="0"/>
+                        <a:t>Type</a:t>
+                      </a:r>
+                    </a:p>
+                  </a:txBody>
+                  <a:tcPr/>
+                </a:tc>
+                <a:extLst>
+                  <a:ext uri="{0D108BD9-81ED-4DB2-BD59-A6C34878D82A}">
+                    <a16:rowId xmlns:a16="http://schemas.microsoft.com/office/drawing/2014/main" val="1005000879"/>
+                  </a:ext>
+                </a:extLst>
+              </a:tr>
+              <a:tr h="318720">
+                <a:tc>
+                  <a:txBody>
+                    <a:bodyPr/>
+                    <a:lstStyle/>
+                    <a:p>
+                      <a:r>
+                        <a:rPr lang="en-GB" dirty="0"/>
+                        <a:t>Username</a:t>
+                      </a:r>
+                    </a:p>
+                  </a:txBody>
+                  <a:tcPr/>
+                </a:tc>
+                <a:tc>
+                  <a:txBody>
+                    <a:bodyPr/>
+                    <a:lstStyle/>
+                    <a:p>
+                      <a:r>
+                        <a:rPr lang="en-GB" dirty="0"/>
+                        <a:t>Char(20)</a:t>
+                      </a:r>
+                    </a:p>
+                  </a:txBody>
+                  <a:tcPr/>
+                </a:tc>
+                <a:extLst>
+                  <a:ext uri="{0D108BD9-81ED-4DB2-BD59-A6C34878D82A}">
+                    <a16:rowId xmlns:a16="http://schemas.microsoft.com/office/drawing/2014/main" val="2980255561"/>
+                  </a:ext>
+                </a:extLst>
+              </a:tr>
+              <a:tr h="318720">
+                <a:tc>
+                  <a:txBody>
+                    <a:bodyPr/>
+                    <a:lstStyle/>
+                    <a:p>
+                      <a:endParaRPr lang="en-GB" dirty="0"/>
+                    </a:p>
+                  </a:txBody>
+                  <a:tcPr/>
+                </a:tc>
+                <a:tc>
+                  <a:txBody>
+                    <a:bodyPr/>
+                    <a:lstStyle/>
+                    <a:p>
+                      <a:endParaRPr lang="en-GB"/>
+                    </a:p>
+                  </a:txBody>
+                  <a:tcPr/>
+                </a:tc>
+                <a:extLst>
+                  <a:ext uri="{0D108BD9-81ED-4DB2-BD59-A6C34878D82A}">
+                    <a16:rowId xmlns:a16="http://schemas.microsoft.com/office/drawing/2014/main" val="3945668263"/>
+                  </a:ext>
+                </a:extLst>
+              </a:tr>
+              <a:tr h="318720">
+                <a:tc>
+                  <a:txBody>
+                    <a:bodyPr/>
+                    <a:lstStyle/>
+                    <a:p>
+                      <a:endParaRPr lang="en-GB"/>
+                    </a:p>
+                  </a:txBody>
+                  <a:tcPr/>
+                </a:tc>
+                <a:tc>
+                  <a:txBody>
+                    <a:bodyPr/>
+                    <a:lstStyle/>
+                    <a:p>
+                      <a:endParaRPr lang="en-GB"/>
+                    </a:p>
+                  </a:txBody>
+                  <a:tcPr/>
+                </a:tc>
+                <a:extLst>
+                  <a:ext uri="{0D108BD9-81ED-4DB2-BD59-A6C34878D82A}">
+                    <a16:rowId xmlns:a16="http://schemas.microsoft.com/office/drawing/2014/main" val="988923780"/>
+                  </a:ext>
+                </a:extLst>
+              </a:tr>
+              <a:tr h="318720">
+                <a:tc>
+                  <a:txBody>
+                    <a:bodyPr/>
+                    <a:lstStyle/>
+                    <a:p>
+                      <a:endParaRPr lang="en-GB"/>
+                    </a:p>
+                  </a:txBody>
+                  <a:tcPr/>
+                </a:tc>
+                <a:tc>
+                  <a:txBody>
+                    <a:bodyPr/>
+                    <a:lstStyle/>
+                    <a:p>
+                      <a:endParaRPr lang="en-GB"/>
+                    </a:p>
+                  </a:txBody>
+                  <a:tcPr/>
+                </a:tc>
+                <a:extLst>
+                  <a:ext uri="{0D108BD9-81ED-4DB2-BD59-A6C34878D82A}">
+                    <a16:rowId xmlns:a16="http://schemas.microsoft.com/office/drawing/2014/main" val="1289283692"/>
+                  </a:ext>
+                </a:extLst>
+              </a:tr>
+              <a:tr h="318720">
+                <a:tc>
+                  <a:txBody>
+                    <a:bodyPr/>
+                    <a:lstStyle/>
+                    <a:p>
+                      <a:endParaRPr lang="en-GB"/>
+                    </a:p>
+                  </a:txBody>
+                  <a:tcPr/>
+                </a:tc>
+                <a:tc>
+                  <a:txBody>
+                    <a:bodyPr/>
+                    <a:lstStyle/>
+                    <a:p>
+                      <a:endParaRPr lang="en-GB" dirty="0"/>
+                    </a:p>
+                  </a:txBody>
+                  <a:tcPr/>
+                </a:tc>
+                <a:extLst>
+                  <a:ext uri="{0D108BD9-81ED-4DB2-BD59-A6C34878D82A}">
+                    <a16:rowId xmlns:a16="http://schemas.microsoft.com/office/drawing/2014/main" val="2525786986"/>
+                  </a:ext>
+                </a:extLst>
+              </a:tr>
+            </a:tbl>
+          </a:graphicData>
+        </a:graphic>
+      </p:graphicFrame>
+      <p:sp>
+        <p:nvSpPr>
+          <p:cNvPr id="73" name="TextBox 72">
+            <a:extLst>
+              <a:ext uri="{FF2B5EF4-FFF2-40B4-BE49-F238E27FC236}">
+                <a16:creationId xmlns:a16="http://schemas.microsoft.com/office/drawing/2014/main" id="{170E3E0C-5DB5-2C05-35C6-55C5EB15183E}"/>
+              </a:ext>
+            </a:extLst>
+          </p:cNvPr>
+          <p:cNvSpPr txBox="1"/>
+          <p:nvPr/>
+        </p:nvSpPr>
+        <p:spPr>
+          <a:xfrm>
+            <a:off x="5597239" y="180459"/>
+            <a:ext cx="2881520" cy="369332"/>
+          </a:xfrm>
+          <a:prstGeom prst="rect">
+            <a:avLst/>
+          </a:prstGeom>
+          <a:noFill/>
+        </p:spPr>
+        <p:txBody>
+          <a:bodyPr wrap="square" rtlCol="0">
+            <a:spAutoFit/>
+          </a:bodyPr>
+          <a:lstStyle/>
+          <a:p>
+            <a:pPr algn="ctr"/>
+            <a:r>
+              <a:rPr lang="en-GB" dirty="0"/>
+              <a:t>Users</a:t>
+            </a:r>
+          </a:p>
+        </p:txBody>
+      </p:sp>
+      <p:sp>
+        <p:nvSpPr>
+          <p:cNvPr id="75" name="Content Placeholder 74">
+            <a:extLst>
+              <a:ext uri="{FF2B5EF4-FFF2-40B4-BE49-F238E27FC236}">
+                <a16:creationId xmlns:a16="http://schemas.microsoft.com/office/drawing/2014/main" id="{0378450C-A436-0540-7673-280DEF70E967}"/>
+              </a:ext>
+            </a:extLst>
+          </p:cNvPr>
+          <p:cNvSpPr>
+            <a:spLocks noGrp="1"/>
+          </p:cNvSpPr>
+          <p:nvPr>
+            <p:ph idx="1"/>
+          </p:nvPr>
+        </p:nvSpPr>
+        <p:spPr>
+          <a:xfrm>
+            <a:off x="11248101" y="6131244"/>
+            <a:ext cx="105698" cy="45719"/>
+          </a:xfrm>
+        </p:spPr>
+        <p:txBody>
+          <a:bodyPr>
+            <a:normAutofit fontScale="25000" lnSpcReduction="20000"/>
+          </a:bodyPr>
+          <a:lstStyle/>
+          <a:p>
+            <a:pPr marL="0" indent="0">
+              <a:buNone/>
+            </a:pPr>
+            <a:endParaRPr lang="en-GB" dirty="0"/>
+          </a:p>
+        </p:txBody>
+      </p:sp>
+      <p:graphicFrame>
+        <p:nvGraphicFramePr>
+          <p:cNvPr id="76" name="Table 75">
+            <a:extLst>
+              <a:ext uri="{FF2B5EF4-FFF2-40B4-BE49-F238E27FC236}">
+                <a16:creationId xmlns:a16="http://schemas.microsoft.com/office/drawing/2014/main" id="{A10FCE13-4C24-77CE-52BB-F6B2BDA6BAF9}"/>
+              </a:ext>
+            </a:extLst>
+          </p:cNvPr>
+          <p:cNvGraphicFramePr>
+            <a:graphicFrameLocks noGrp="1"/>
+          </p:cNvGraphicFramePr>
+          <p:nvPr>
+            <p:extLst>
+              <p:ext uri="{D42A27DB-BD31-4B8C-83A1-F6EECF244321}">
+                <p14:modId xmlns:p14="http://schemas.microsoft.com/office/powerpoint/2010/main" val="929973107"/>
+              </p:ext>
+            </p:extLst>
+          </p:nvPr>
+        </p:nvGraphicFramePr>
+        <p:xfrm>
+          <a:off x="8598384" y="575822"/>
+          <a:ext cx="2893962" cy="2194560"/>
+        </p:xfrm>
+        <a:graphic>
+          <a:graphicData uri="http://schemas.openxmlformats.org/drawingml/2006/table">
+            <a:tbl>
+              <a:tblPr firstRow="1" bandRow="1">
+                <a:tableStyleId>{5C22544A-7EE6-4342-B048-85BDC9FD1C3A}</a:tableStyleId>
+              </a:tblPr>
+              <a:tblGrid>
+                <a:gridCol w="1446981">
+                  <a:extLst>
+                    <a:ext uri="{9D8B030D-6E8A-4147-A177-3AD203B41FA5}">
+                      <a16:colId xmlns:a16="http://schemas.microsoft.com/office/drawing/2014/main" val="1978240753"/>
+                    </a:ext>
+                  </a:extLst>
+                </a:gridCol>
+                <a:gridCol w="1446981">
+                  <a:extLst>
+                    <a:ext uri="{9D8B030D-6E8A-4147-A177-3AD203B41FA5}">
+                      <a16:colId xmlns:a16="http://schemas.microsoft.com/office/drawing/2014/main" val="1094651281"/>
+                    </a:ext>
+                  </a:extLst>
+                </a:gridCol>
+              </a:tblGrid>
+              <a:tr h="318720">
+                <a:tc>
+                  <a:txBody>
+                    <a:bodyPr/>
+                    <a:lstStyle/>
+                    <a:p>
+                      <a:r>
+                        <a:rPr lang="en-GB" dirty="0"/>
+                        <a:t>Fields</a:t>
+                      </a:r>
+                    </a:p>
+                  </a:txBody>
+                  <a:tcPr/>
+                </a:tc>
+                <a:tc>
+                  <a:txBody>
+                    <a:bodyPr/>
+                    <a:lstStyle/>
+                    <a:p>
+                      <a:r>
+                        <a:rPr lang="en-GB" dirty="0"/>
+                        <a:t>Type</a:t>
+                      </a:r>
+                    </a:p>
+                  </a:txBody>
+                  <a:tcPr/>
+                </a:tc>
+                <a:extLst>
+                  <a:ext uri="{0D108BD9-81ED-4DB2-BD59-A6C34878D82A}">
+                    <a16:rowId xmlns:a16="http://schemas.microsoft.com/office/drawing/2014/main" val="1005000879"/>
+                  </a:ext>
+                </a:extLst>
+              </a:tr>
+              <a:tr h="318720">
+                <a:tc>
+                  <a:txBody>
+                    <a:bodyPr/>
+                    <a:lstStyle/>
+                    <a:p>
+                      <a:r>
+                        <a:rPr lang="en-GB" dirty="0"/>
+                        <a:t>Title</a:t>
+                      </a:r>
+                    </a:p>
+                  </a:txBody>
+                  <a:tcPr/>
+                </a:tc>
+                <a:tc>
+                  <a:txBody>
+                    <a:bodyPr/>
+                    <a:lstStyle/>
+                    <a:p>
+                      <a:r>
+                        <a:rPr lang="en-GB" dirty="0"/>
+                        <a:t>Char(40)</a:t>
+                      </a:r>
+                    </a:p>
+                  </a:txBody>
+                  <a:tcPr/>
+                </a:tc>
+                <a:extLst>
+                  <a:ext uri="{0D108BD9-81ED-4DB2-BD59-A6C34878D82A}">
+                    <a16:rowId xmlns:a16="http://schemas.microsoft.com/office/drawing/2014/main" val="2980255561"/>
+                  </a:ext>
+                </a:extLst>
+              </a:tr>
+              <a:tr h="318720">
+                <a:tc>
+                  <a:txBody>
+                    <a:bodyPr/>
+                    <a:lstStyle/>
+                    <a:p>
+                      <a:r>
+                        <a:rPr lang="en-GB" dirty="0"/>
+                        <a:t>Likes</a:t>
+                      </a:r>
+                    </a:p>
+                  </a:txBody>
+                  <a:tcPr/>
+                </a:tc>
+                <a:tc>
+                  <a:txBody>
+                    <a:bodyPr/>
+                    <a:lstStyle/>
+                    <a:p>
+                      <a:r>
+                        <a:rPr lang="en-GB" dirty="0"/>
+                        <a:t>int</a:t>
+                      </a:r>
+                    </a:p>
+                  </a:txBody>
+                  <a:tcPr/>
+                </a:tc>
+                <a:extLst>
+                  <a:ext uri="{0D108BD9-81ED-4DB2-BD59-A6C34878D82A}">
+                    <a16:rowId xmlns:a16="http://schemas.microsoft.com/office/drawing/2014/main" val="3945668263"/>
+                  </a:ext>
+                </a:extLst>
+              </a:tr>
+              <a:tr h="318720">
+                <a:tc>
+                  <a:txBody>
+                    <a:bodyPr/>
+                    <a:lstStyle/>
+                    <a:p>
+                      <a:r>
+                        <a:rPr lang="en-GB" dirty="0"/>
+                        <a:t>Dislikes</a:t>
+                      </a:r>
+                    </a:p>
+                  </a:txBody>
+                  <a:tcPr/>
+                </a:tc>
+                <a:tc>
+                  <a:txBody>
+                    <a:bodyPr/>
+                    <a:lstStyle/>
+                    <a:p>
+                      <a:r>
+                        <a:rPr lang="en-GB" dirty="0"/>
+                        <a:t>int</a:t>
+                      </a:r>
+                    </a:p>
+                  </a:txBody>
+                  <a:tcPr/>
+                </a:tc>
+                <a:extLst>
+                  <a:ext uri="{0D108BD9-81ED-4DB2-BD59-A6C34878D82A}">
+                    <a16:rowId xmlns:a16="http://schemas.microsoft.com/office/drawing/2014/main" val="988923780"/>
+                  </a:ext>
+                </a:extLst>
+              </a:tr>
+              <a:tr h="318720">
+                <a:tc>
+                  <a:txBody>
+                    <a:bodyPr/>
+                    <a:lstStyle/>
+                    <a:p>
+                      <a:endParaRPr lang="en-GB" dirty="0"/>
+                    </a:p>
+                  </a:txBody>
+                  <a:tcPr/>
+                </a:tc>
+                <a:tc>
+                  <a:txBody>
+                    <a:bodyPr/>
+                    <a:lstStyle/>
+                    <a:p>
+                      <a:endParaRPr lang="en-GB"/>
+                    </a:p>
+                  </a:txBody>
+                  <a:tcPr/>
+                </a:tc>
+                <a:extLst>
+                  <a:ext uri="{0D108BD9-81ED-4DB2-BD59-A6C34878D82A}">
+                    <a16:rowId xmlns:a16="http://schemas.microsoft.com/office/drawing/2014/main" val="1289283692"/>
+                  </a:ext>
+                </a:extLst>
+              </a:tr>
+              <a:tr h="318720">
+                <a:tc>
+                  <a:txBody>
+                    <a:bodyPr/>
+                    <a:lstStyle/>
+                    <a:p>
+                      <a:endParaRPr lang="en-GB"/>
+                    </a:p>
+                  </a:txBody>
+                  <a:tcPr/>
+                </a:tc>
+                <a:tc>
+                  <a:txBody>
+                    <a:bodyPr/>
+                    <a:lstStyle/>
+                    <a:p>
+                      <a:endParaRPr lang="en-GB" dirty="0"/>
+                    </a:p>
+                  </a:txBody>
+                  <a:tcPr/>
+                </a:tc>
+                <a:extLst>
+                  <a:ext uri="{0D108BD9-81ED-4DB2-BD59-A6C34878D82A}">
+                    <a16:rowId xmlns:a16="http://schemas.microsoft.com/office/drawing/2014/main" val="2525786986"/>
+                  </a:ext>
+                </a:extLst>
+              </a:tr>
+            </a:tbl>
+          </a:graphicData>
+        </a:graphic>
+      </p:graphicFrame>
+      <p:sp>
+        <p:nvSpPr>
+          <p:cNvPr id="77" name="TextBox 76">
+            <a:extLst>
+              <a:ext uri="{FF2B5EF4-FFF2-40B4-BE49-F238E27FC236}">
+                <a16:creationId xmlns:a16="http://schemas.microsoft.com/office/drawing/2014/main" id="{15E53AA4-38A8-C20A-0677-300104229B66}"/>
+              </a:ext>
+            </a:extLst>
+          </p:cNvPr>
+          <p:cNvSpPr txBox="1"/>
+          <p:nvPr/>
+        </p:nvSpPr>
+        <p:spPr>
+          <a:xfrm>
+            <a:off x="8610826" y="180459"/>
+            <a:ext cx="2881520" cy="369332"/>
+          </a:xfrm>
+          <a:prstGeom prst="rect">
+            <a:avLst/>
+          </a:prstGeom>
+          <a:noFill/>
+        </p:spPr>
+        <p:txBody>
+          <a:bodyPr wrap="square" rtlCol="0">
+            <a:spAutoFit/>
+          </a:bodyPr>
+          <a:lstStyle/>
+          <a:p>
+            <a:pPr algn="ctr"/>
+            <a:r>
+              <a:rPr lang="en-GB" dirty="0"/>
+              <a:t>Albums</a:t>
+            </a:r>
+          </a:p>
+        </p:txBody>
+      </p:sp>
+      <p:graphicFrame>
+        <p:nvGraphicFramePr>
+          <p:cNvPr id="78" name="Table 77">
+            <a:extLst>
+              <a:ext uri="{FF2B5EF4-FFF2-40B4-BE49-F238E27FC236}">
+                <a16:creationId xmlns:a16="http://schemas.microsoft.com/office/drawing/2014/main" id="{113D315B-A5C3-8062-06AC-C23E610C98A1}"/>
+              </a:ext>
+            </a:extLst>
+          </p:cNvPr>
+          <p:cNvGraphicFramePr>
+            <a:graphicFrameLocks noGrp="1"/>
+          </p:cNvGraphicFramePr>
+          <p:nvPr>
+            <p:extLst>
+              <p:ext uri="{D42A27DB-BD31-4B8C-83A1-F6EECF244321}">
+                <p14:modId xmlns:p14="http://schemas.microsoft.com/office/powerpoint/2010/main" val="1165967550"/>
+              </p:ext>
+            </p:extLst>
+          </p:nvPr>
+        </p:nvGraphicFramePr>
+        <p:xfrm>
+          <a:off x="5578576" y="3300682"/>
+          <a:ext cx="2893962" cy="2194560"/>
+        </p:xfrm>
+        <a:graphic>
+          <a:graphicData uri="http://schemas.openxmlformats.org/drawingml/2006/table">
+            <a:tbl>
+              <a:tblPr firstRow="1" bandRow="1">
+                <a:tableStyleId>{5C22544A-7EE6-4342-B048-85BDC9FD1C3A}</a:tableStyleId>
+              </a:tblPr>
+              <a:tblGrid>
+                <a:gridCol w="1446981">
+                  <a:extLst>
+                    <a:ext uri="{9D8B030D-6E8A-4147-A177-3AD203B41FA5}">
+                      <a16:colId xmlns:a16="http://schemas.microsoft.com/office/drawing/2014/main" val="1978240753"/>
+                    </a:ext>
+                  </a:extLst>
+                </a:gridCol>
+                <a:gridCol w="1446981">
+                  <a:extLst>
+                    <a:ext uri="{9D8B030D-6E8A-4147-A177-3AD203B41FA5}">
+                      <a16:colId xmlns:a16="http://schemas.microsoft.com/office/drawing/2014/main" val="1094651281"/>
+                    </a:ext>
+                  </a:extLst>
+                </a:gridCol>
+              </a:tblGrid>
+              <a:tr h="318720">
+                <a:tc>
+                  <a:txBody>
+                    <a:bodyPr/>
+                    <a:lstStyle/>
+                    <a:p>
+                      <a:r>
+                        <a:rPr lang="en-GB" dirty="0"/>
+                        <a:t>Fields</a:t>
+                      </a:r>
+                    </a:p>
+                  </a:txBody>
+                  <a:tcPr/>
+                </a:tc>
+                <a:tc>
+                  <a:txBody>
+                    <a:bodyPr/>
+                    <a:lstStyle/>
+                    <a:p>
+                      <a:r>
+                        <a:rPr lang="en-GB" dirty="0"/>
+                        <a:t>Type</a:t>
+                      </a:r>
+                    </a:p>
+                  </a:txBody>
+                  <a:tcPr/>
+                </a:tc>
+                <a:extLst>
+                  <a:ext uri="{0D108BD9-81ED-4DB2-BD59-A6C34878D82A}">
+                    <a16:rowId xmlns:a16="http://schemas.microsoft.com/office/drawing/2014/main" val="1005000879"/>
+                  </a:ext>
+                </a:extLst>
+              </a:tr>
+              <a:tr h="318720">
+                <a:tc>
+                  <a:txBody>
+                    <a:bodyPr/>
+                    <a:lstStyle/>
+                    <a:p>
+                      <a:r>
+                        <a:rPr lang="en-GB" dirty="0"/>
+                        <a:t>Text</a:t>
+                      </a:r>
+                    </a:p>
+                  </a:txBody>
+                  <a:tcPr/>
+                </a:tc>
+                <a:tc>
+                  <a:txBody>
+                    <a:bodyPr/>
+                    <a:lstStyle/>
+                    <a:p>
+                      <a:r>
+                        <a:rPr lang="en-GB" dirty="0"/>
+                        <a:t>Char(128)</a:t>
+                      </a:r>
+                    </a:p>
+                  </a:txBody>
+                  <a:tcPr/>
+                </a:tc>
+                <a:extLst>
+                  <a:ext uri="{0D108BD9-81ED-4DB2-BD59-A6C34878D82A}">
+                    <a16:rowId xmlns:a16="http://schemas.microsoft.com/office/drawing/2014/main" val="2980255561"/>
+                  </a:ext>
+                </a:extLst>
+              </a:tr>
+              <a:tr h="318720">
+                <a:tc>
+                  <a:txBody>
+                    <a:bodyPr/>
+                    <a:lstStyle/>
+                    <a:p>
+                      <a:r>
+                        <a:rPr lang="en-GB" dirty="0"/>
+                        <a:t>Username</a:t>
+                      </a:r>
+                    </a:p>
+                  </a:txBody>
+                  <a:tcPr/>
+                </a:tc>
+                <a:tc>
+                  <a:txBody>
+                    <a:bodyPr/>
+                    <a:lstStyle/>
+                    <a:p>
+                      <a:r>
+                        <a:rPr lang="en-GB" dirty="0"/>
+                        <a:t>Char(20)</a:t>
+                      </a:r>
+                    </a:p>
+                  </a:txBody>
+                  <a:tcPr/>
+                </a:tc>
+                <a:extLst>
+                  <a:ext uri="{0D108BD9-81ED-4DB2-BD59-A6C34878D82A}">
+                    <a16:rowId xmlns:a16="http://schemas.microsoft.com/office/drawing/2014/main" val="3945668263"/>
+                  </a:ext>
+                </a:extLst>
+              </a:tr>
+              <a:tr h="318720">
+                <a:tc>
+                  <a:txBody>
+                    <a:bodyPr/>
+                    <a:lstStyle/>
+                    <a:p>
+                      <a:r>
+                        <a:rPr lang="en-GB" dirty="0" err="1"/>
+                        <a:t>AlbumTitle</a:t>
+                      </a:r>
+                      <a:endParaRPr lang="en-GB" dirty="0"/>
+                    </a:p>
+                  </a:txBody>
+                  <a:tcPr/>
+                </a:tc>
+                <a:tc>
+                  <a:txBody>
+                    <a:bodyPr/>
+                    <a:lstStyle/>
+                    <a:p>
+                      <a:r>
+                        <a:rPr lang="en-GB" dirty="0"/>
+                        <a:t>Char(40)</a:t>
+                      </a:r>
+                    </a:p>
+                  </a:txBody>
+                  <a:tcPr/>
+                </a:tc>
+                <a:extLst>
+                  <a:ext uri="{0D108BD9-81ED-4DB2-BD59-A6C34878D82A}">
+                    <a16:rowId xmlns:a16="http://schemas.microsoft.com/office/drawing/2014/main" val="988923780"/>
+                  </a:ext>
+                </a:extLst>
+              </a:tr>
+              <a:tr h="318720">
+                <a:tc>
+                  <a:txBody>
+                    <a:bodyPr/>
+                    <a:lstStyle/>
+                    <a:p>
+                      <a:endParaRPr lang="en-GB"/>
+                    </a:p>
+                  </a:txBody>
+                  <a:tcPr/>
+                </a:tc>
+                <a:tc>
+                  <a:txBody>
+                    <a:bodyPr/>
+                    <a:lstStyle/>
+                    <a:p>
+                      <a:endParaRPr lang="en-GB"/>
+                    </a:p>
+                  </a:txBody>
+                  <a:tcPr/>
+                </a:tc>
+                <a:extLst>
+                  <a:ext uri="{0D108BD9-81ED-4DB2-BD59-A6C34878D82A}">
+                    <a16:rowId xmlns:a16="http://schemas.microsoft.com/office/drawing/2014/main" val="1289283692"/>
+                  </a:ext>
+                </a:extLst>
+              </a:tr>
+              <a:tr h="318720">
+                <a:tc>
+                  <a:txBody>
+                    <a:bodyPr/>
+                    <a:lstStyle/>
+                    <a:p>
+                      <a:endParaRPr lang="en-GB"/>
+                    </a:p>
+                  </a:txBody>
+                  <a:tcPr/>
+                </a:tc>
+                <a:tc>
+                  <a:txBody>
+                    <a:bodyPr/>
+                    <a:lstStyle/>
+                    <a:p>
+                      <a:endParaRPr lang="en-GB" dirty="0"/>
+                    </a:p>
+                  </a:txBody>
+                  <a:tcPr/>
+                </a:tc>
+                <a:extLst>
+                  <a:ext uri="{0D108BD9-81ED-4DB2-BD59-A6C34878D82A}">
+                    <a16:rowId xmlns:a16="http://schemas.microsoft.com/office/drawing/2014/main" val="2525786986"/>
+                  </a:ext>
+                </a:extLst>
+              </a:tr>
+            </a:tbl>
+          </a:graphicData>
+        </a:graphic>
+      </p:graphicFrame>
+      <p:sp>
+        <p:nvSpPr>
+          <p:cNvPr id="79" name="TextBox 78">
+            <a:extLst>
+              <a:ext uri="{FF2B5EF4-FFF2-40B4-BE49-F238E27FC236}">
+                <a16:creationId xmlns:a16="http://schemas.microsoft.com/office/drawing/2014/main" id="{90791E3C-4AE5-48B7-EED1-93E1DEF2B272}"/>
+              </a:ext>
+            </a:extLst>
+          </p:cNvPr>
+          <p:cNvSpPr txBox="1"/>
+          <p:nvPr/>
+        </p:nvSpPr>
+        <p:spPr>
+          <a:xfrm>
+            <a:off x="5591018" y="2905319"/>
+            <a:ext cx="2881520" cy="369332"/>
+          </a:xfrm>
+          <a:prstGeom prst="rect">
+            <a:avLst/>
+          </a:prstGeom>
+          <a:noFill/>
+        </p:spPr>
+        <p:txBody>
+          <a:bodyPr wrap="square" rtlCol="0">
+            <a:spAutoFit/>
+          </a:bodyPr>
+          <a:lstStyle/>
+          <a:p>
+            <a:pPr algn="ctr"/>
+            <a:r>
+              <a:rPr lang="en-GB" dirty="0"/>
+              <a:t>Comments</a:t>
+            </a:r>
+          </a:p>
+        </p:txBody>
+      </p:sp>
+    </p:spTree>
+    <p:extLst>
+      <p:ext uri="{BB962C8B-B14F-4D97-AF65-F5344CB8AC3E}">
+        <p14:creationId xmlns:p14="http://schemas.microsoft.com/office/powerpoint/2010/main" val="1032153461"/>
       </p:ext>
     </p:extLst>
   </p:cSld>

</xml_diff>

<commit_message>
Minor changed to ER diagram
</commit_message>
<xml_diff>
--- a/WAD2 Group Project Design Spec.pptx
+++ b/WAD2 Group Project Design Spec.pptx
@@ -3681,7 +3681,7 @@
           <p:nvPr>
             <p:extLst>
               <p:ext uri="{D42A27DB-BD31-4B8C-83A1-F6EECF244321}">
-                <p14:modId xmlns:p14="http://schemas.microsoft.com/office/powerpoint/2010/main" val="508242387"/>
+                <p14:modId xmlns:p14="http://schemas.microsoft.com/office/powerpoint/2010/main" val="294875610"/>
               </p:ext>
             </p:extLst>
           </p:nvPr>
@@ -3697,14 +3697,14 @@
                 <a:tableStyleId>{5C22544A-7EE6-4342-B048-85BDC9FD1C3A}</a:tableStyleId>
               </a:tblPr>
               <a:tblGrid>
-                <a:gridCol w="1446981">
+                <a:gridCol w="1484597">
                   <a:extLst>
                     <a:ext uri="{9D8B030D-6E8A-4147-A177-3AD203B41FA5}">
                       <a16:colId xmlns:a16="http://schemas.microsoft.com/office/drawing/2014/main" val="1978240753"/>
                     </a:ext>
                   </a:extLst>
                 </a:gridCol>
-                <a:gridCol w="1446981">
+                <a:gridCol w="1409365">
                   <a:extLst>
                     <a:ext uri="{9D8B030D-6E8A-4147-A177-3AD203B41FA5}">
                       <a16:colId xmlns:a16="http://schemas.microsoft.com/office/drawing/2014/main" val="1094651281"/>
@@ -3784,6 +3784,10 @@
                     <a:bodyPr/>
                     <a:lstStyle/>
                     <a:p>
+                      <a:r>
+                        <a:rPr lang="en-GB" dirty="0" err="1"/>
+                        <a:t>DateCreated</a:t>
+                      </a:r>
                       <a:endParaRPr lang="en-GB" dirty="0"/>
                     </a:p>
                   </a:txBody>
@@ -3794,7 +3798,10 @@
                     <a:bodyPr/>
                     <a:lstStyle/>
                     <a:p>
-                      <a:endParaRPr lang="en-GB"/>
+                      <a:r>
+                        <a:rPr lang="en-GB" dirty="0"/>
+                        <a:t>Date</a:t>
+                      </a:r>
                     </a:p>
                   </a:txBody>
                   <a:tcPr/>
@@ -3976,14 +3983,14 @@
           <p:nvPr>
             <p:extLst>
               <p:ext uri="{D42A27DB-BD31-4B8C-83A1-F6EECF244321}">
-                <p14:modId xmlns:p14="http://schemas.microsoft.com/office/powerpoint/2010/main" val="929973107"/>
+                <p14:modId xmlns:p14="http://schemas.microsoft.com/office/powerpoint/2010/main" val="1482190724"/>
               </p:ext>
             </p:extLst>
           </p:nvPr>
         </p:nvGraphicFramePr>
         <p:xfrm>
-          <a:off x="8598384" y="575822"/>
-          <a:ext cx="2893962" cy="2194560"/>
+          <a:off x="8610826" y="567193"/>
+          <a:ext cx="3364864" cy="3291840"/>
         </p:xfrm>
         <a:graphic>
           <a:graphicData uri="http://schemas.openxmlformats.org/drawingml/2006/table">
@@ -3992,14 +3999,14 @@
                 <a:tableStyleId>{5C22544A-7EE6-4342-B048-85BDC9FD1C3A}</a:tableStyleId>
               </a:tblPr>
               <a:tblGrid>
-                <a:gridCol w="1446981">
+                <a:gridCol w="2246331">
                   <a:extLst>
                     <a:ext uri="{9D8B030D-6E8A-4147-A177-3AD203B41FA5}">
                       <a16:colId xmlns:a16="http://schemas.microsoft.com/office/drawing/2014/main" val="1978240753"/>
                     </a:ext>
                   </a:extLst>
                 </a:gridCol>
-                <a:gridCol w="1446981">
+                <a:gridCol w="1118533">
                   <a:extLst>
                     <a:ext uri="{9D8B030D-6E8A-4147-A177-3AD203B41FA5}">
                       <a16:colId xmlns:a16="http://schemas.microsoft.com/office/drawing/2014/main" val="1094651281"/>
@@ -4094,7 +4101,7 @@
                     <a:p>
                       <a:r>
                         <a:rPr lang="en-GB" dirty="0"/>
-                        <a:t>int</a:t>
+                        <a:t>Integer</a:t>
                       </a:r>
                     </a:p>
                   </a:txBody>
@@ -4126,9 +4133,10 @@
                     <a:lstStyle/>
                     <a:p>
                       <a:r>
-                        <a:rPr lang="en-GB" dirty="0"/>
-                        <a:t>int</a:t>
+                        <a:rPr lang="en-GB"/>
+                        <a:t>Integer</a:t>
                       </a:r>
+                      <a:endParaRPr lang="en-GB" dirty="0"/>
                     </a:p>
                   </a:txBody>
                   <a:tcPr/>
@@ -4145,7 +4153,10 @@
                     <a:bodyPr/>
                     <a:lstStyle/>
                     <a:p>
-                      <a:endParaRPr lang="en-GB" dirty="0"/>
+                      <a:r>
+                        <a:rPr lang="en-GB" dirty="0"/>
+                        <a:t>Followers</a:t>
+                      </a:r>
                     </a:p>
                   </a:txBody>
                   <a:tcPr/>
@@ -4155,7 +4166,10 @@
                     <a:bodyPr/>
                     <a:lstStyle/>
                     <a:p>
-                      <a:endParaRPr lang="en-GB"/>
+                      <a:r>
+                        <a:rPr lang="en-GB" dirty="0"/>
+                        <a:t>Integer</a:t>
+                      </a:r>
                     </a:p>
                   </a:txBody>
                   <a:tcPr/>
@@ -4172,7 +4186,11 @@
                     <a:bodyPr/>
                     <a:lstStyle/>
                     <a:p>
-                      <a:endParaRPr lang="en-GB"/>
+                      <a:r>
+                        <a:rPr lang="en-GB" dirty="0" err="1"/>
+                        <a:t>CoverArt</a:t>
+                      </a:r>
+                      <a:endParaRPr lang="en-GB" dirty="0"/>
                     </a:p>
                   </a:txBody>
                   <a:tcPr/>
@@ -4182,7 +4200,10 @@
                     <a:bodyPr/>
                     <a:lstStyle/>
                     <a:p>
-                      <a:endParaRPr lang="en-GB" dirty="0"/>
+                      <a:r>
+                        <a:rPr lang="en-GB" dirty="0"/>
+                        <a:t>Image</a:t>
+                      </a:r>
                     </a:p>
                   </a:txBody>
                   <a:tcPr/>
@@ -4190,6 +4211,107 @@
                 <a:extLst>
                   <a:ext uri="{0D108BD9-81ED-4DB2-BD59-A6C34878D82A}">
                     <a16:rowId xmlns:a16="http://schemas.microsoft.com/office/drawing/2014/main" val="2525786986"/>
+                  </a:ext>
+                </a:extLst>
+              </a:tr>
+              <a:tr h="318720">
+                <a:tc>
+                  <a:txBody>
+                    <a:bodyPr/>
+                    <a:lstStyle/>
+                    <a:p>
+                      <a:r>
+                        <a:rPr lang="en-GB" dirty="0" err="1"/>
+                        <a:t>UploaderUsername</a:t>
+                      </a:r>
+                      <a:endParaRPr lang="en-GB" dirty="0"/>
+                    </a:p>
+                  </a:txBody>
+                  <a:tcPr/>
+                </a:tc>
+                <a:tc>
+                  <a:txBody>
+                    <a:bodyPr/>
+                    <a:lstStyle/>
+                    <a:p>
+                      <a:r>
+                        <a:rPr lang="en-GB" dirty="0"/>
+                        <a:t>Char(20)</a:t>
+                      </a:r>
+                    </a:p>
+                  </a:txBody>
+                  <a:tcPr/>
+                </a:tc>
+                <a:extLst>
+                  <a:ext uri="{0D108BD9-81ED-4DB2-BD59-A6C34878D82A}">
+                    <a16:rowId xmlns:a16="http://schemas.microsoft.com/office/drawing/2014/main" val="2882015945"/>
+                  </a:ext>
+                </a:extLst>
+              </a:tr>
+              <a:tr h="318720">
+                <a:tc>
+                  <a:txBody>
+                    <a:bodyPr/>
+                    <a:lstStyle/>
+                    <a:p>
+                      <a:r>
+                        <a:rPr lang="en-GB" dirty="0" err="1"/>
+                        <a:t>UploadDate</a:t>
+                      </a:r>
+                      <a:endParaRPr lang="en-GB" dirty="0"/>
+                    </a:p>
+                  </a:txBody>
+                  <a:tcPr/>
+                </a:tc>
+                <a:tc>
+                  <a:txBody>
+                    <a:bodyPr/>
+                    <a:lstStyle/>
+                    <a:p>
+                      <a:r>
+                        <a:rPr lang="en-GB" dirty="0"/>
+                        <a:t>Date</a:t>
+                      </a:r>
+                    </a:p>
+                  </a:txBody>
+                  <a:tcPr/>
+                </a:tc>
+                <a:extLst>
+                  <a:ext uri="{0D108BD9-81ED-4DB2-BD59-A6C34878D82A}">
+                    <a16:rowId xmlns:a16="http://schemas.microsoft.com/office/drawing/2014/main" val="2319001431"/>
+                  </a:ext>
+                </a:extLst>
+              </a:tr>
+              <a:tr h="318720">
+                <a:tc>
+                  <a:txBody>
+                    <a:bodyPr/>
+                    <a:lstStyle/>
+                    <a:p>
+                      <a:r>
+                        <a:rPr lang="en-GB" dirty="0"/>
+                        <a:t>Views</a:t>
+                      </a:r>
+                    </a:p>
+                  </a:txBody>
+                  <a:tcPr/>
+                </a:tc>
+                <a:tc>
+                  <a:txBody>
+                    <a:bodyPr/>
+                    <a:lstStyle/>
+                    <a:p>
+                      <a:r>
+                        <a:rPr lang="en-GB" dirty="0"/>
+                        <a:t>Integer</a:t>
+                      </a:r>
+                    </a:p>
+                  </a:txBody>
+                  <a:tcPr/>
+                </a:tc>
+                <a:extLst>
+                  <a:ext uri="{0D108BD9-81ED-4DB2-BD59-A6C34878D82A}">
+                    <a16:rowId xmlns:a16="http://schemas.microsoft.com/office/drawing/2014/main" val="2149279636"/>
                   </a:ext>
                 </a:extLst>
               </a:tr>
@@ -4502,6 +4624,75 @@
             <a:r>
               <a:rPr lang="en-GB" dirty="0"/>
               <a:t>Comments</a:t>
+            </a:r>
+          </a:p>
+        </p:txBody>
+      </p:sp>
+      <p:sp>
+        <p:nvSpPr>
+          <p:cNvPr id="3" name="Rectangle 2">
+            <a:extLst>
+              <a:ext uri="{FF2B5EF4-FFF2-40B4-BE49-F238E27FC236}">
+                <a16:creationId xmlns:a16="http://schemas.microsoft.com/office/drawing/2014/main" id="{81AFBF2B-EC91-3735-709B-4D64D6095A03}"/>
+              </a:ext>
+            </a:extLst>
+          </p:cNvPr>
+          <p:cNvSpPr/>
+          <p:nvPr/>
+        </p:nvSpPr>
+        <p:spPr>
+          <a:xfrm>
+            <a:off x="1691148" y="2278338"/>
+            <a:ext cx="147484" cy="157316"/>
+          </a:xfrm>
+          <a:prstGeom prst="rect">
+            <a:avLst/>
+          </a:prstGeom>
+          <a:solidFill>
+            <a:schemeClr val="bg1"/>
+          </a:solidFill>
+          <a:ln>
+            <a:solidFill>
+              <a:schemeClr val="bg1"/>
+            </a:solidFill>
+          </a:ln>
+        </p:spPr>
+        <p:style>
+          <a:lnRef idx="2">
+            <a:schemeClr val="accent1">
+              <a:shade val="15000"/>
+            </a:schemeClr>
+          </a:lnRef>
+          <a:fillRef idx="1">
+            <a:schemeClr val="accent1"/>
+          </a:fillRef>
+          <a:effectRef idx="0">
+            <a:schemeClr val="accent1"/>
+          </a:effectRef>
+          <a:fontRef idx="minor">
+            <a:schemeClr val="lt1"/>
+          </a:fontRef>
+        </p:style>
+        <p:txBody>
+          <a:bodyPr rtlCol="0" anchor="ctr"/>
+          <a:lstStyle/>
+          <a:p>
+            <a:pPr algn="ctr"/>
+            <a:r>
+              <a:rPr lang="en-GB" dirty="0">
+                <a:ln w="0"/>
+                <a:solidFill>
+                  <a:schemeClr val="tx1"/>
+                </a:solidFill>
+                <a:effectLst>
+                  <a:outerShdw blurRad="38100" dist="19050" dir="2700000" algn="tl" rotWithShape="0">
+                    <a:schemeClr val="dk1">
+                      <a:alpha val="40000"/>
+                    </a:schemeClr>
+                  </a:outerShdw>
+                </a:effectLst>
+              </a:rPr>
+              <a:t>1</a:t>
             </a:r>
           </a:p>
         </p:txBody>

</xml_diff>

<commit_message>
add User Personas, System architecture diagram,change Specification, ER Diagram (make bigger comments from 128 to 255)
</commit_message>
<xml_diff>
--- a/WAD2 Group Project Design Spec.pptx
+++ b/WAD2 Group Project Design Spec.pptx
@@ -7,8 +7,10 @@
   <p:sldIdLst>
     <p:sldId id="256" r:id="rId2"/>
     <p:sldId id="257" r:id="rId3"/>
-    <p:sldId id="258" r:id="rId4"/>
-    <p:sldId id="259" r:id="rId5"/>
+    <p:sldId id="260" r:id="rId4"/>
+    <p:sldId id="258" r:id="rId5"/>
+    <p:sldId id="261" r:id="rId6"/>
+    <p:sldId id="259" r:id="rId7"/>
   </p:sldIdLst>
   <p:sldSz cx="12192000" cy="6858000"/>
   <p:notesSz cx="6858000" cy="9144000"/>
@@ -262,7 +264,7 @@
           <a:p>
             <a:fld id="{386EAC6E-8ADC-498C-8D78-A1467B1978D3}" type="datetimeFigureOut">
               <a:rPr lang="en-GB" smtClean="0"/>
-              <a:t>21/02/2025</a:t>
+              <a:t>22/02/2025</a:t>
             </a:fld>
             <a:endParaRPr lang="en-GB"/>
           </a:p>
@@ -460,7 +462,7 @@
           <a:p>
             <a:fld id="{386EAC6E-8ADC-498C-8D78-A1467B1978D3}" type="datetimeFigureOut">
               <a:rPr lang="en-GB" smtClean="0"/>
-              <a:t>21/02/2025</a:t>
+              <a:t>22/02/2025</a:t>
             </a:fld>
             <a:endParaRPr lang="en-GB"/>
           </a:p>
@@ -668,7 +670,7 @@
           <a:p>
             <a:fld id="{386EAC6E-8ADC-498C-8D78-A1467B1978D3}" type="datetimeFigureOut">
               <a:rPr lang="en-GB" smtClean="0"/>
-              <a:t>21/02/2025</a:t>
+              <a:t>22/02/2025</a:t>
             </a:fld>
             <a:endParaRPr lang="en-GB"/>
           </a:p>
@@ -866,7 +868,7 @@
           <a:p>
             <a:fld id="{386EAC6E-8ADC-498C-8D78-A1467B1978D3}" type="datetimeFigureOut">
               <a:rPr lang="en-GB" smtClean="0"/>
-              <a:t>21/02/2025</a:t>
+              <a:t>22/02/2025</a:t>
             </a:fld>
             <a:endParaRPr lang="en-GB"/>
           </a:p>
@@ -1141,7 +1143,7 @@
           <a:p>
             <a:fld id="{386EAC6E-8ADC-498C-8D78-A1467B1978D3}" type="datetimeFigureOut">
               <a:rPr lang="en-GB" smtClean="0"/>
-              <a:t>21/02/2025</a:t>
+              <a:t>22/02/2025</a:t>
             </a:fld>
             <a:endParaRPr lang="en-GB"/>
           </a:p>
@@ -1406,7 +1408,7 @@
           <a:p>
             <a:fld id="{386EAC6E-8ADC-498C-8D78-A1467B1978D3}" type="datetimeFigureOut">
               <a:rPr lang="en-GB" smtClean="0"/>
-              <a:t>21/02/2025</a:t>
+              <a:t>22/02/2025</a:t>
             </a:fld>
             <a:endParaRPr lang="en-GB"/>
           </a:p>
@@ -1818,7 +1820,7 @@
           <a:p>
             <a:fld id="{386EAC6E-8ADC-498C-8D78-A1467B1978D3}" type="datetimeFigureOut">
               <a:rPr lang="en-GB" smtClean="0"/>
-              <a:t>21/02/2025</a:t>
+              <a:t>22/02/2025</a:t>
             </a:fld>
             <a:endParaRPr lang="en-GB"/>
           </a:p>
@@ -1959,7 +1961,7 @@
           <a:p>
             <a:fld id="{386EAC6E-8ADC-498C-8D78-A1467B1978D3}" type="datetimeFigureOut">
               <a:rPr lang="en-GB" smtClean="0"/>
-              <a:t>21/02/2025</a:t>
+              <a:t>22/02/2025</a:t>
             </a:fld>
             <a:endParaRPr lang="en-GB"/>
           </a:p>
@@ -2072,7 +2074,7 @@
           <a:p>
             <a:fld id="{386EAC6E-8ADC-498C-8D78-A1467B1978D3}" type="datetimeFigureOut">
               <a:rPr lang="en-GB" smtClean="0"/>
-              <a:t>21/02/2025</a:t>
+              <a:t>22/02/2025</a:t>
             </a:fld>
             <a:endParaRPr lang="en-GB"/>
           </a:p>
@@ -2383,7 +2385,7 @@
           <a:p>
             <a:fld id="{386EAC6E-8ADC-498C-8D78-A1467B1978D3}" type="datetimeFigureOut">
               <a:rPr lang="en-GB" smtClean="0"/>
-              <a:t>21/02/2025</a:t>
+              <a:t>22/02/2025</a:t>
             </a:fld>
             <a:endParaRPr lang="en-GB"/>
           </a:p>
@@ -2671,7 +2673,7 @@
           <a:p>
             <a:fld id="{386EAC6E-8ADC-498C-8D78-A1467B1978D3}" type="datetimeFigureOut">
               <a:rPr lang="en-GB" smtClean="0"/>
-              <a:t>21/02/2025</a:t>
+              <a:t>22/02/2025</a:t>
             </a:fld>
             <a:endParaRPr lang="en-GB"/>
           </a:p>
@@ -2912,7 +2914,7 @@
           <a:p>
             <a:fld id="{386EAC6E-8ADC-498C-8D78-A1467B1978D3}" type="datetimeFigureOut">
               <a:rPr lang="en-GB" smtClean="0"/>
-              <a:t>21/02/2025</a:t>
+              <a:t>22/02/2025</a:t>
             </a:fld>
             <a:endParaRPr lang="en-GB"/>
           </a:p>
@@ -3351,7 +3353,7 @@
           <a:lstStyle/>
           <a:p>
             <a:r>
-              <a:rPr lang="en-GB" dirty="0"/>
+              <a:rPr lang="en-GB" noProof="0" dirty="0"/>
               <a:t>WAD2 Group Project	</a:t>
             </a:r>
           </a:p>
@@ -3379,7 +3381,7 @@
           <a:lstStyle/>
           <a:p>
             <a:r>
-              <a:rPr lang="en-GB" dirty="0"/>
+              <a:rPr lang="en-GB" noProof="0" dirty="0"/>
               <a:t>Team 10-D</a:t>
             </a:r>
           </a:p>
@@ -3431,13 +3433,18 @@
             <p:ph type="title"/>
           </p:nvPr>
         </p:nvSpPr>
-        <p:spPr/>
+        <p:spPr>
+          <a:xfrm>
+            <a:off x="431800" y="365125"/>
+            <a:ext cx="10515600" cy="1325563"/>
+          </a:xfrm>
+        </p:spPr>
         <p:txBody>
           <a:bodyPr/>
           <a:lstStyle/>
           <a:p>
             <a:r>
-              <a:rPr lang="en-GB" dirty="0"/>
+              <a:rPr lang="en-GB" noProof="0" dirty="0"/>
               <a:t>Project Overview</a:t>
             </a:r>
           </a:p>
@@ -3459,36 +3466,41 @@
             <p:ph idx="1"/>
           </p:nvPr>
         </p:nvSpPr>
-        <p:spPr/>
+        <p:spPr>
+          <a:xfrm>
+            <a:off x="368300" y="1690688"/>
+            <a:ext cx="10515600" cy="4351338"/>
+          </a:xfrm>
+        </p:spPr>
         <p:txBody>
           <a:bodyPr/>
           <a:lstStyle/>
           <a:p>
             <a:r>
-              <a:rPr lang="en-GB" dirty="0"/>
+              <a:rPr lang="en-GB" noProof="0" dirty="0"/>
               <a:t>Users will be able to view albums</a:t>
             </a:r>
           </a:p>
           <a:p>
             <a:r>
-              <a:rPr lang="en-GB" dirty="0"/>
+              <a:rPr lang="en-GB" noProof="0" dirty="0"/>
               <a:t>Authenticated users will be able to like/dislike, comment on and upload albums</a:t>
             </a:r>
           </a:p>
           <a:p>
             <a:r>
-              <a:rPr lang="en-GB" dirty="0"/>
+              <a:rPr lang="en-GB" noProof="0" dirty="0"/>
               <a:t>The home page will show top rated albums, albums uploaded that day, and a search feature for users/albums</a:t>
             </a:r>
           </a:p>
           <a:p>
             <a:r>
-              <a:rPr lang="en-GB" dirty="0"/>
+              <a:rPr lang="en-GB" noProof="0" dirty="0"/>
               <a:t>A “follow” system- users will be able to follow other users, and albums they rate will show in the home page</a:t>
             </a:r>
           </a:p>
           <a:p>
-            <a:endParaRPr lang="en-GB" dirty="0"/>
+            <a:endParaRPr lang="en-GB" noProof="0" dirty="0"/>
           </a:p>
         </p:txBody>
       </p:sp>
@@ -3510,7 +3522,13 @@
   <p:cSld>
     <p:spTree>
       <p:nvGrpSpPr>
-        <p:cNvPr id="1" name=""/>
+        <p:cNvPr id="1" name="">
+          <a:extLst>
+            <a:ext uri="{FF2B5EF4-FFF2-40B4-BE49-F238E27FC236}">
+              <a16:creationId xmlns:a16="http://schemas.microsoft.com/office/drawing/2014/main" id="{A67D487C-ADA8-31AC-435F-B6DEE1DFAF96}"/>
+            </a:ext>
+          </a:extLst>
+        </p:cNvPr>
         <p:cNvGrpSpPr/>
         <p:nvPr/>
       </p:nvGrpSpPr>
@@ -3527,7 +3545,7 @@
           <p:cNvPr id="2" name="Title 1">
             <a:extLst>
               <a:ext uri="{FF2B5EF4-FFF2-40B4-BE49-F238E27FC236}">
-                <a16:creationId xmlns:a16="http://schemas.microsoft.com/office/drawing/2014/main" id="{3D4BB3E7-3677-9628-3BED-8C06AB41A9CF}"/>
+                <a16:creationId xmlns:a16="http://schemas.microsoft.com/office/drawing/2014/main" id="{5A47E641-6C73-6AC0-61DA-360021474C60}"/>
               </a:ext>
             </a:extLst>
           </p:cNvPr>
@@ -3538,14 +3556,19 @@
             <p:ph type="title"/>
           </p:nvPr>
         </p:nvSpPr>
-        <p:spPr/>
+        <p:spPr>
+          <a:xfrm>
+            <a:off x="279400" y="320675"/>
+            <a:ext cx="10515600" cy="1325563"/>
+          </a:xfrm>
+        </p:spPr>
         <p:txBody>
           <a:bodyPr/>
           <a:lstStyle/>
           <a:p>
             <a:r>
-              <a:rPr lang="en-GB" dirty="0"/>
-              <a:t>Project Specification</a:t>
+              <a:rPr lang="en-GB" noProof="0" dirty="0"/>
+              <a:t>User Personas</a:t>
             </a:r>
           </a:p>
         </p:txBody>
@@ -3555,7 +3578,7 @@
           <p:cNvPr id="3" name="Content Placeholder 2">
             <a:extLst>
               <a:ext uri="{FF2B5EF4-FFF2-40B4-BE49-F238E27FC236}">
-                <a16:creationId xmlns:a16="http://schemas.microsoft.com/office/drawing/2014/main" id="{CCDC9EDC-60DC-11A2-2D48-72DBECFE4670}"/>
+                <a16:creationId xmlns:a16="http://schemas.microsoft.com/office/drawing/2014/main" id="{0F19E9B1-00A2-5137-CA05-787ABE9D9D3F}"/>
               </a:ext>
             </a:extLst>
           </p:cNvPr>
@@ -3566,14 +3589,613 @@
             <p:ph idx="1"/>
           </p:nvPr>
         </p:nvSpPr>
-        <p:spPr/>
-        <p:txBody>
-          <a:bodyPr/>
+        <p:spPr>
+          <a:xfrm>
+            <a:off x="279400" y="1546224"/>
+            <a:ext cx="3924300" cy="4848225"/>
+          </a:xfrm>
+        </p:spPr>
+        <p:txBody>
+          <a:bodyPr>
+            <a:normAutofit/>
+          </a:bodyPr>
           <a:lstStyle/>
           <a:p>
-            <a:r>
-              <a:rPr lang="en-GB" dirty="0"/>
-              <a:t>Use of cookies, to keep track of views</a:t>
+            <a:pPr marL="0" indent="0">
+              <a:buNone/>
+            </a:pPr>
+            <a:r>
+              <a:rPr lang="en-GB" sz="1800" b="1" noProof="0" dirty="0"/>
+              <a:t>Casual Listener</a:t>
+            </a:r>
+            <a:r>
+              <a:rPr lang="en-GB" sz="1800" noProof="0" dirty="0"/>
+              <a:t>:</a:t>
+            </a:r>
+          </a:p>
+          <a:p>
+            <a:pPr marL="0" indent="0">
+              <a:buNone/>
+            </a:pPr>
+            <a:r>
+              <a:rPr lang="en-GB" sz="1800" noProof="0" dirty="0"/>
+              <a:t>Description: Loves listening to music, but doesn't have time to search deeply for new releases.</a:t>
+            </a:r>
+          </a:p>
+          <a:p>
+            <a:pPr marL="0" indent="0">
+              <a:buNone/>
+            </a:pPr>
+            <a:r>
+              <a:rPr lang="en-GB" sz="1800" i="1" noProof="0" dirty="0"/>
+              <a:t>Goal: </a:t>
+            </a:r>
+            <a:r>
+              <a:rPr lang="en-GB" sz="1800" noProof="0" dirty="0"/>
+              <a:t>Find new albums, quickly rate, read reviews from other users, leave short comments.</a:t>
+            </a:r>
+          </a:p>
+          <a:p>
+            <a:pPr marL="0" indent="0">
+              <a:buNone/>
+            </a:pPr>
+            <a:r>
+              <a:rPr lang="en-GB" sz="1800" i="1" noProof="0" dirty="0"/>
+              <a:t>Tasks:</a:t>
+            </a:r>
+          </a:p>
+          <a:p>
+            <a:pPr lvl="1"/>
+            <a:r>
+              <a:rPr lang="en-GB" sz="1800" dirty="0"/>
+              <a:t>Convenient</a:t>
+            </a:r>
+            <a:r>
+              <a:rPr lang="en-GB" sz="1800" noProof="0" dirty="0"/>
+              <a:t> search for albums, sort them by popularity/dates.</a:t>
+            </a:r>
+          </a:p>
+          <a:p>
+            <a:pPr lvl="1"/>
+            <a:r>
+              <a:rPr lang="en-GB" sz="1800" noProof="0" dirty="0"/>
+              <a:t>Keep track of what his friends like.</a:t>
+            </a:r>
+          </a:p>
+          <a:p>
+            <a:endParaRPr lang="en-GB" sz="1800" noProof="0" dirty="0"/>
+          </a:p>
+        </p:txBody>
+      </p:sp>
+      <p:sp>
+        <p:nvSpPr>
+          <p:cNvPr id="5" name="Content Placeholder 2">
+            <a:extLst>
+              <a:ext uri="{FF2B5EF4-FFF2-40B4-BE49-F238E27FC236}">
+                <a16:creationId xmlns:a16="http://schemas.microsoft.com/office/drawing/2014/main" id="{E800BC42-6DF4-355D-DD16-C45C46791893}"/>
+              </a:ext>
+            </a:extLst>
+          </p:cNvPr>
+          <p:cNvSpPr txBox="1">
+            <a:spLocks/>
+          </p:cNvSpPr>
+          <p:nvPr/>
+        </p:nvSpPr>
+        <p:spPr>
+          <a:xfrm>
+            <a:off x="4203700" y="1546224"/>
+            <a:ext cx="3924300" cy="4848225"/>
+          </a:xfrm>
+          <a:prstGeom prst="rect">
+            <a:avLst/>
+          </a:prstGeom>
+        </p:spPr>
+        <p:txBody>
+          <a:bodyPr vert="horz" lIns="91440" tIns="45720" rIns="91440" bIns="45720" rtlCol="0">
+            <a:normAutofit/>
+          </a:bodyPr>
+          <a:lstStyle>
+            <a:lvl1pPr marL="228600" indent="-228600" algn="l" defTabSz="914400" rtl="0" eaLnBrk="1" latinLnBrk="0" hangingPunct="1">
+              <a:lnSpc>
+                <a:spcPct val="90000"/>
+              </a:lnSpc>
+              <a:spcBef>
+                <a:spcPts val="1000"/>
+              </a:spcBef>
+              <a:buFont typeface="Arial" panose="020B0604020202020204" pitchFamily="34" charset="0"/>
+              <a:buChar char="•"/>
+              <a:defRPr sz="2800" kern="1200">
+                <a:solidFill>
+                  <a:schemeClr val="tx1"/>
+                </a:solidFill>
+                <a:latin typeface="+mn-lt"/>
+                <a:ea typeface="+mn-ea"/>
+                <a:cs typeface="+mn-cs"/>
+              </a:defRPr>
+            </a:lvl1pPr>
+            <a:lvl2pPr marL="685800" indent="-228600" algn="l" defTabSz="914400" rtl="0" eaLnBrk="1" latinLnBrk="0" hangingPunct="1">
+              <a:lnSpc>
+                <a:spcPct val="90000"/>
+              </a:lnSpc>
+              <a:spcBef>
+                <a:spcPts val="500"/>
+              </a:spcBef>
+              <a:buFont typeface="Arial" panose="020B0604020202020204" pitchFamily="34" charset="0"/>
+              <a:buChar char="•"/>
+              <a:defRPr sz="2400" kern="1200">
+                <a:solidFill>
+                  <a:schemeClr val="tx1"/>
+                </a:solidFill>
+                <a:latin typeface="+mn-lt"/>
+                <a:ea typeface="+mn-ea"/>
+                <a:cs typeface="+mn-cs"/>
+              </a:defRPr>
+            </a:lvl2pPr>
+            <a:lvl3pPr marL="1143000" indent="-228600" algn="l" defTabSz="914400" rtl="0" eaLnBrk="1" latinLnBrk="0" hangingPunct="1">
+              <a:lnSpc>
+                <a:spcPct val="90000"/>
+              </a:lnSpc>
+              <a:spcBef>
+                <a:spcPts val="500"/>
+              </a:spcBef>
+              <a:buFont typeface="Arial" panose="020B0604020202020204" pitchFamily="34" charset="0"/>
+              <a:buChar char="•"/>
+              <a:defRPr sz="2000" kern="1200">
+                <a:solidFill>
+                  <a:schemeClr val="tx1"/>
+                </a:solidFill>
+                <a:latin typeface="+mn-lt"/>
+                <a:ea typeface="+mn-ea"/>
+                <a:cs typeface="+mn-cs"/>
+              </a:defRPr>
+            </a:lvl3pPr>
+            <a:lvl4pPr marL="1600200" indent="-228600" algn="l" defTabSz="914400" rtl="0" eaLnBrk="1" latinLnBrk="0" hangingPunct="1">
+              <a:lnSpc>
+                <a:spcPct val="90000"/>
+              </a:lnSpc>
+              <a:spcBef>
+                <a:spcPts val="500"/>
+              </a:spcBef>
+              <a:buFont typeface="Arial" panose="020B0604020202020204" pitchFamily="34" charset="0"/>
+              <a:buChar char="•"/>
+              <a:defRPr sz="1800" kern="1200">
+                <a:solidFill>
+                  <a:schemeClr val="tx1"/>
+                </a:solidFill>
+                <a:latin typeface="+mn-lt"/>
+                <a:ea typeface="+mn-ea"/>
+                <a:cs typeface="+mn-cs"/>
+              </a:defRPr>
+            </a:lvl4pPr>
+            <a:lvl5pPr marL="2057400" indent="-228600" algn="l" defTabSz="914400" rtl="0" eaLnBrk="1" latinLnBrk="0" hangingPunct="1">
+              <a:lnSpc>
+                <a:spcPct val="90000"/>
+              </a:lnSpc>
+              <a:spcBef>
+                <a:spcPts val="500"/>
+              </a:spcBef>
+              <a:buFont typeface="Arial" panose="020B0604020202020204" pitchFamily="34" charset="0"/>
+              <a:buChar char="•"/>
+              <a:defRPr sz="1800" kern="1200">
+                <a:solidFill>
+                  <a:schemeClr val="tx1"/>
+                </a:solidFill>
+                <a:latin typeface="+mn-lt"/>
+                <a:ea typeface="+mn-ea"/>
+                <a:cs typeface="+mn-cs"/>
+              </a:defRPr>
+            </a:lvl5pPr>
+            <a:lvl6pPr marL="2514600" indent="-228600" algn="l" defTabSz="914400" rtl="0" eaLnBrk="1" latinLnBrk="0" hangingPunct="1">
+              <a:lnSpc>
+                <a:spcPct val="90000"/>
+              </a:lnSpc>
+              <a:spcBef>
+                <a:spcPts val="500"/>
+              </a:spcBef>
+              <a:buFont typeface="Arial" panose="020B0604020202020204" pitchFamily="34" charset="0"/>
+              <a:buChar char="•"/>
+              <a:defRPr sz="1800" kern="1200">
+                <a:solidFill>
+                  <a:schemeClr val="tx1"/>
+                </a:solidFill>
+                <a:latin typeface="+mn-lt"/>
+                <a:ea typeface="+mn-ea"/>
+                <a:cs typeface="+mn-cs"/>
+              </a:defRPr>
+            </a:lvl6pPr>
+            <a:lvl7pPr marL="2971800" indent="-228600" algn="l" defTabSz="914400" rtl="0" eaLnBrk="1" latinLnBrk="0" hangingPunct="1">
+              <a:lnSpc>
+                <a:spcPct val="90000"/>
+              </a:lnSpc>
+              <a:spcBef>
+                <a:spcPts val="500"/>
+              </a:spcBef>
+              <a:buFont typeface="Arial" panose="020B0604020202020204" pitchFamily="34" charset="0"/>
+              <a:buChar char="•"/>
+              <a:defRPr sz="1800" kern="1200">
+                <a:solidFill>
+                  <a:schemeClr val="tx1"/>
+                </a:solidFill>
+                <a:latin typeface="+mn-lt"/>
+                <a:ea typeface="+mn-ea"/>
+                <a:cs typeface="+mn-cs"/>
+              </a:defRPr>
+            </a:lvl7pPr>
+            <a:lvl8pPr marL="3429000" indent="-228600" algn="l" defTabSz="914400" rtl="0" eaLnBrk="1" latinLnBrk="0" hangingPunct="1">
+              <a:lnSpc>
+                <a:spcPct val="90000"/>
+              </a:lnSpc>
+              <a:spcBef>
+                <a:spcPts val="500"/>
+              </a:spcBef>
+              <a:buFont typeface="Arial" panose="020B0604020202020204" pitchFamily="34" charset="0"/>
+              <a:buChar char="•"/>
+              <a:defRPr sz="1800" kern="1200">
+                <a:solidFill>
+                  <a:schemeClr val="tx1"/>
+                </a:solidFill>
+                <a:latin typeface="+mn-lt"/>
+                <a:ea typeface="+mn-ea"/>
+                <a:cs typeface="+mn-cs"/>
+              </a:defRPr>
+            </a:lvl8pPr>
+            <a:lvl9pPr marL="3886200" indent="-228600" algn="l" defTabSz="914400" rtl="0" eaLnBrk="1" latinLnBrk="0" hangingPunct="1">
+              <a:lnSpc>
+                <a:spcPct val="90000"/>
+              </a:lnSpc>
+              <a:spcBef>
+                <a:spcPts val="500"/>
+              </a:spcBef>
+              <a:buFont typeface="Arial" panose="020B0604020202020204" pitchFamily="34" charset="0"/>
+              <a:buChar char="•"/>
+              <a:defRPr sz="1800" kern="1200">
+                <a:solidFill>
+                  <a:schemeClr val="tx1"/>
+                </a:solidFill>
+                <a:latin typeface="+mn-lt"/>
+                <a:ea typeface="+mn-ea"/>
+                <a:cs typeface="+mn-cs"/>
+              </a:defRPr>
+            </a:lvl9pPr>
+          </a:lstStyle>
+          <a:p>
+            <a:pPr marL="0" indent="0">
+              <a:buFont typeface="Arial" panose="020B0604020202020204" pitchFamily="34" charset="0"/>
+              <a:buNone/>
+            </a:pPr>
+            <a:r>
+              <a:rPr lang="en-GB" sz="1800" b="1" noProof="0" dirty="0"/>
+              <a:t>Content Creator</a:t>
+            </a:r>
+            <a:r>
+              <a:rPr lang="en-GB" sz="1800" noProof="0" dirty="0"/>
+              <a:t>:</a:t>
+            </a:r>
+          </a:p>
+          <a:p>
+            <a:pPr marL="0" indent="0">
+              <a:buFont typeface="Arial" panose="020B0604020202020204" pitchFamily="34" charset="0"/>
+              <a:buNone/>
+            </a:pPr>
+            <a:r>
+              <a:rPr lang="en-GB" sz="1800" i="1" noProof="0" dirty="0"/>
+              <a:t>Description:</a:t>
+            </a:r>
+            <a:r>
+              <a:rPr lang="en-GB" sz="1800" noProof="0" dirty="0"/>
+              <a:t> An aspiring musician, he records his own tracks and wants to share them with the community.</a:t>
+            </a:r>
+          </a:p>
+          <a:p>
+            <a:pPr marL="0" indent="0">
+              <a:buFont typeface="Arial" panose="020B0604020202020204" pitchFamily="34" charset="0"/>
+              <a:buNone/>
+            </a:pPr>
+            <a:r>
+              <a:rPr lang="en-GB" sz="1800" i="1" noProof="0" dirty="0"/>
+              <a:t>Goal: </a:t>
+            </a:r>
+            <a:r>
+              <a:rPr lang="en-GB" sz="1800" noProof="0" dirty="0"/>
+              <a:t>Upload your albums, get feedback and a fan base.</a:t>
+            </a:r>
+          </a:p>
+          <a:p>
+            <a:pPr marL="0" indent="0">
+              <a:buFont typeface="Arial" panose="020B0604020202020204" pitchFamily="34" charset="0"/>
+              <a:buNone/>
+            </a:pPr>
+            <a:r>
+              <a:rPr lang="en-GB" sz="1800" i="1" noProof="0" dirty="0"/>
+              <a:t>Tasks:</a:t>
+            </a:r>
+          </a:p>
+          <a:p>
+            <a:pPr lvl="1"/>
+            <a:r>
+              <a:rPr lang="en-GB" sz="1800" noProof="0" dirty="0"/>
+              <a:t>Easy upload albums and covers.</a:t>
+            </a:r>
+          </a:p>
+          <a:p>
+            <a:pPr lvl="1"/>
+            <a:r>
+              <a:rPr lang="en-GB" sz="1800" noProof="0" dirty="0"/>
+              <a:t>Ability to track statistics (number of likes, views and comments).</a:t>
+            </a:r>
+          </a:p>
+          <a:p>
+            <a:pPr lvl="1"/>
+            <a:r>
+              <a:rPr lang="en-GB" sz="1800" noProof="0" dirty="0"/>
+              <a:t>Communicate with fans through comments.</a:t>
+            </a:r>
+          </a:p>
+        </p:txBody>
+      </p:sp>
+      <p:sp>
+        <p:nvSpPr>
+          <p:cNvPr id="6" name="Content Placeholder 2">
+            <a:extLst>
+              <a:ext uri="{FF2B5EF4-FFF2-40B4-BE49-F238E27FC236}">
+                <a16:creationId xmlns:a16="http://schemas.microsoft.com/office/drawing/2014/main" id="{6C202748-E359-D596-5AFC-AEFA8D2BD373}"/>
+              </a:ext>
+            </a:extLst>
+          </p:cNvPr>
+          <p:cNvSpPr txBox="1">
+            <a:spLocks/>
+          </p:cNvSpPr>
+          <p:nvPr/>
+        </p:nvSpPr>
+        <p:spPr>
+          <a:xfrm>
+            <a:off x="8128000" y="1546224"/>
+            <a:ext cx="3924300" cy="4848225"/>
+          </a:xfrm>
+          <a:prstGeom prst="rect">
+            <a:avLst/>
+          </a:prstGeom>
+        </p:spPr>
+        <p:txBody>
+          <a:bodyPr vert="horz" lIns="91440" tIns="45720" rIns="91440" bIns="45720" rtlCol="0">
+            <a:noAutofit/>
+          </a:bodyPr>
+          <a:lstStyle>
+            <a:lvl1pPr marL="228600" indent="-228600" algn="l" defTabSz="914400" rtl="0" eaLnBrk="1" latinLnBrk="0" hangingPunct="1">
+              <a:lnSpc>
+                <a:spcPct val="90000"/>
+              </a:lnSpc>
+              <a:spcBef>
+                <a:spcPts val="1000"/>
+              </a:spcBef>
+              <a:buFont typeface="Arial" panose="020B0604020202020204" pitchFamily="34" charset="0"/>
+              <a:buChar char="•"/>
+              <a:defRPr sz="2800" kern="1200">
+                <a:solidFill>
+                  <a:schemeClr val="tx1"/>
+                </a:solidFill>
+                <a:latin typeface="+mn-lt"/>
+                <a:ea typeface="+mn-ea"/>
+                <a:cs typeface="+mn-cs"/>
+              </a:defRPr>
+            </a:lvl1pPr>
+            <a:lvl2pPr marL="685800" indent="-228600" algn="l" defTabSz="914400" rtl="0" eaLnBrk="1" latinLnBrk="0" hangingPunct="1">
+              <a:lnSpc>
+                <a:spcPct val="90000"/>
+              </a:lnSpc>
+              <a:spcBef>
+                <a:spcPts val="500"/>
+              </a:spcBef>
+              <a:buFont typeface="Arial" panose="020B0604020202020204" pitchFamily="34" charset="0"/>
+              <a:buChar char="•"/>
+              <a:defRPr sz="2400" kern="1200">
+                <a:solidFill>
+                  <a:schemeClr val="tx1"/>
+                </a:solidFill>
+                <a:latin typeface="+mn-lt"/>
+                <a:ea typeface="+mn-ea"/>
+                <a:cs typeface="+mn-cs"/>
+              </a:defRPr>
+            </a:lvl2pPr>
+            <a:lvl3pPr marL="1143000" indent="-228600" algn="l" defTabSz="914400" rtl="0" eaLnBrk="1" latinLnBrk="0" hangingPunct="1">
+              <a:lnSpc>
+                <a:spcPct val="90000"/>
+              </a:lnSpc>
+              <a:spcBef>
+                <a:spcPts val="500"/>
+              </a:spcBef>
+              <a:buFont typeface="Arial" panose="020B0604020202020204" pitchFamily="34" charset="0"/>
+              <a:buChar char="•"/>
+              <a:defRPr sz="2000" kern="1200">
+                <a:solidFill>
+                  <a:schemeClr val="tx1"/>
+                </a:solidFill>
+                <a:latin typeface="+mn-lt"/>
+                <a:ea typeface="+mn-ea"/>
+                <a:cs typeface="+mn-cs"/>
+              </a:defRPr>
+            </a:lvl3pPr>
+            <a:lvl4pPr marL="1600200" indent="-228600" algn="l" defTabSz="914400" rtl="0" eaLnBrk="1" latinLnBrk="0" hangingPunct="1">
+              <a:lnSpc>
+                <a:spcPct val="90000"/>
+              </a:lnSpc>
+              <a:spcBef>
+                <a:spcPts val="500"/>
+              </a:spcBef>
+              <a:buFont typeface="Arial" panose="020B0604020202020204" pitchFamily="34" charset="0"/>
+              <a:buChar char="•"/>
+              <a:defRPr sz="1800" kern="1200">
+                <a:solidFill>
+                  <a:schemeClr val="tx1"/>
+                </a:solidFill>
+                <a:latin typeface="+mn-lt"/>
+                <a:ea typeface="+mn-ea"/>
+                <a:cs typeface="+mn-cs"/>
+              </a:defRPr>
+            </a:lvl4pPr>
+            <a:lvl5pPr marL="2057400" indent="-228600" algn="l" defTabSz="914400" rtl="0" eaLnBrk="1" latinLnBrk="0" hangingPunct="1">
+              <a:lnSpc>
+                <a:spcPct val="90000"/>
+              </a:lnSpc>
+              <a:spcBef>
+                <a:spcPts val="500"/>
+              </a:spcBef>
+              <a:buFont typeface="Arial" panose="020B0604020202020204" pitchFamily="34" charset="0"/>
+              <a:buChar char="•"/>
+              <a:defRPr sz="1800" kern="1200">
+                <a:solidFill>
+                  <a:schemeClr val="tx1"/>
+                </a:solidFill>
+                <a:latin typeface="+mn-lt"/>
+                <a:ea typeface="+mn-ea"/>
+                <a:cs typeface="+mn-cs"/>
+              </a:defRPr>
+            </a:lvl5pPr>
+            <a:lvl6pPr marL="2514600" indent="-228600" algn="l" defTabSz="914400" rtl="0" eaLnBrk="1" latinLnBrk="0" hangingPunct="1">
+              <a:lnSpc>
+                <a:spcPct val="90000"/>
+              </a:lnSpc>
+              <a:spcBef>
+                <a:spcPts val="500"/>
+              </a:spcBef>
+              <a:buFont typeface="Arial" panose="020B0604020202020204" pitchFamily="34" charset="0"/>
+              <a:buChar char="•"/>
+              <a:defRPr sz="1800" kern="1200">
+                <a:solidFill>
+                  <a:schemeClr val="tx1"/>
+                </a:solidFill>
+                <a:latin typeface="+mn-lt"/>
+                <a:ea typeface="+mn-ea"/>
+                <a:cs typeface="+mn-cs"/>
+              </a:defRPr>
+            </a:lvl6pPr>
+            <a:lvl7pPr marL="2971800" indent="-228600" algn="l" defTabSz="914400" rtl="0" eaLnBrk="1" latinLnBrk="0" hangingPunct="1">
+              <a:lnSpc>
+                <a:spcPct val="90000"/>
+              </a:lnSpc>
+              <a:spcBef>
+                <a:spcPts val="500"/>
+              </a:spcBef>
+              <a:buFont typeface="Arial" panose="020B0604020202020204" pitchFamily="34" charset="0"/>
+              <a:buChar char="•"/>
+              <a:defRPr sz="1800" kern="1200">
+                <a:solidFill>
+                  <a:schemeClr val="tx1"/>
+                </a:solidFill>
+                <a:latin typeface="+mn-lt"/>
+                <a:ea typeface="+mn-ea"/>
+                <a:cs typeface="+mn-cs"/>
+              </a:defRPr>
+            </a:lvl7pPr>
+            <a:lvl8pPr marL="3429000" indent="-228600" algn="l" defTabSz="914400" rtl="0" eaLnBrk="1" latinLnBrk="0" hangingPunct="1">
+              <a:lnSpc>
+                <a:spcPct val="90000"/>
+              </a:lnSpc>
+              <a:spcBef>
+                <a:spcPts val="500"/>
+              </a:spcBef>
+              <a:buFont typeface="Arial" panose="020B0604020202020204" pitchFamily="34" charset="0"/>
+              <a:buChar char="•"/>
+              <a:defRPr sz="1800" kern="1200">
+                <a:solidFill>
+                  <a:schemeClr val="tx1"/>
+                </a:solidFill>
+                <a:latin typeface="+mn-lt"/>
+                <a:ea typeface="+mn-ea"/>
+                <a:cs typeface="+mn-cs"/>
+              </a:defRPr>
+            </a:lvl8pPr>
+            <a:lvl9pPr marL="3886200" indent="-228600" algn="l" defTabSz="914400" rtl="0" eaLnBrk="1" latinLnBrk="0" hangingPunct="1">
+              <a:lnSpc>
+                <a:spcPct val="90000"/>
+              </a:lnSpc>
+              <a:spcBef>
+                <a:spcPts val="500"/>
+              </a:spcBef>
+              <a:buFont typeface="Arial" panose="020B0604020202020204" pitchFamily="34" charset="0"/>
+              <a:buChar char="•"/>
+              <a:defRPr sz="1800" kern="1200">
+                <a:solidFill>
+                  <a:schemeClr val="tx1"/>
+                </a:solidFill>
+                <a:latin typeface="+mn-lt"/>
+                <a:ea typeface="+mn-ea"/>
+                <a:cs typeface="+mn-cs"/>
+              </a:defRPr>
+            </a:lvl9pPr>
+          </a:lstStyle>
+          <a:p>
+            <a:pPr marL="0" indent="0">
+              <a:buFont typeface="Arial" panose="020B0604020202020204" pitchFamily="34" charset="0"/>
+              <a:buNone/>
+            </a:pPr>
+            <a:r>
+              <a:rPr lang="en-GB" sz="1800" b="1" noProof="0" dirty="0"/>
+              <a:t>Music Critic</a:t>
+            </a:r>
+            <a:r>
+              <a:rPr lang="en-GB" sz="1800" noProof="0" dirty="0"/>
+              <a:t>:</a:t>
+            </a:r>
+          </a:p>
+          <a:p>
+            <a:pPr marL="0" indent="0">
+              <a:buFont typeface="Arial" panose="020B0604020202020204" pitchFamily="34" charset="0"/>
+              <a:buNone/>
+            </a:pPr>
+            <a:r>
+              <a:rPr lang="en-GB" sz="1800" i="1" noProof="0" dirty="0"/>
+              <a:t>Description:</a:t>
+            </a:r>
+            <a:r>
+              <a:rPr lang="en-GB" sz="1800" noProof="0" dirty="0"/>
+              <a:t> An experienced music lover, he runs a blog and loves to give detailed reviews of music.</a:t>
+            </a:r>
+          </a:p>
+          <a:p>
+            <a:pPr marL="0" indent="0">
+              <a:buFont typeface="Arial" panose="020B0604020202020204" pitchFamily="34" charset="0"/>
+              <a:buNone/>
+            </a:pPr>
+            <a:r>
+              <a:rPr lang="en-GB" sz="1800" i="1" noProof="0" dirty="0"/>
+              <a:t>Goal: </a:t>
+            </a:r>
+            <a:r>
+              <a:rPr lang="en-US" sz="1800" noProof="0" dirty="0"/>
+              <a:t>Search for rare/interesting albums, comment on them in detail</a:t>
+            </a:r>
+            <a:r>
+              <a:rPr lang="en-GB" sz="1800" noProof="0" dirty="0"/>
+              <a:t>.</a:t>
+            </a:r>
+          </a:p>
+          <a:p>
+            <a:pPr marL="0" indent="0">
+              <a:buFont typeface="Arial" panose="020B0604020202020204" pitchFamily="34" charset="0"/>
+              <a:buNone/>
+            </a:pPr>
+            <a:r>
+              <a:rPr lang="en-GB" sz="1800" i="1" noProof="0" dirty="0"/>
+              <a:t>Tasks:</a:t>
+            </a:r>
+          </a:p>
+          <a:p>
+            <a:pPr lvl="1"/>
+            <a:r>
+              <a:rPr lang="en-US" sz="1800" noProof="0" dirty="0"/>
+              <a:t>Ability to find albums by genre and other metadata.</a:t>
+            </a:r>
+          </a:p>
+          <a:p>
+            <a:pPr lvl="1"/>
+            <a:r>
+              <a:rPr lang="en-US" sz="1800" dirty="0"/>
+              <a:t>Write detailed reviews for each album</a:t>
+            </a:r>
+            <a:r>
+              <a:rPr lang="en-US" sz="1800" noProof="0" dirty="0"/>
+              <a:t>.</a:t>
             </a:r>
           </a:p>
         </p:txBody>
@@ -3581,7 +4203,7 @@
     </p:spTree>
     <p:extLst>
       <p:ext uri="{BB962C8B-B14F-4D97-AF65-F5344CB8AC3E}">
-        <p14:creationId xmlns:p14="http://schemas.microsoft.com/office/powerpoint/2010/main" val="2058726886"/>
+        <p14:creationId xmlns:p14="http://schemas.microsoft.com/office/powerpoint/2010/main" val="173748744"/>
       </p:ext>
     </p:extLst>
   </p:cSld>
@@ -3613,7 +4235,7 @@
           <p:cNvPr id="2" name="Title 1">
             <a:extLst>
               <a:ext uri="{FF2B5EF4-FFF2-40B4-BE49-F238E27FC236}">
-                <a16:creationId xmlns:a16="http://schemas.microsoft.com/office/drawing/2014/main" id="{41EA2D55-21D6-B6D6-9F55-727B1DB29312}"/>
+                <a16:creationId xmlns:a16="http://schemas.microsoft.com/office/drawing/2014/main" id="{3D4BB3E7-3677-9628-3BED-8C06AB41A9CF}"/>
               </a:ext>
             </a:extLst>
           </p:cNvPr>
@@ -3624,13 +4246,1650 @@
             <p:ph type="title"/>
           </p:nvPr>
         </p:nvSpPr>
-        <p:spPr/>
+        <p:spPr>
+          <a:xfrm>
+            <a:off x="330200" y="257175"/>
+            <a:ext cx="10515600" cy="1325563"/>
+          </a:xfrm>
+        </p:spPr>
         <p:txBody>
           <a:bodyPr/>
           <a:lstStyle/>
           <a:p>
             <a:r>
+              <a:rPr lang="en-GB" noProof="0" dirty="0"/>
+              <a:t>Project Specification</a:t>
+            </a:r>
+          </a:p>
+        </p:txBody>
+      </p:sp>
+      <p:graphicFrame>
+        <p:nvGraphicFramePr>
+          <p:cNvPr id="4" name="Table 3">
+            <a:extLst>
+              <a:ext uri="{FF2B5EF4-FFF2-40B4-BE49-F238E27FC236}">
+                <a16:creationId xmlns:a16="http://schemas.microsoft.com/office/drawing/2014/main" id="{C086A621-F8F0-0464-129E-826126E15D4D}"/>
+              </a:ext>
+            </a:extLst>
+          </p:cNvPr>
+          <p:cNvGraphicFramePr>
+            <a:graphicFrameLocks noGrp="1"/>
+          </p:cNvGraphicFramePr>
+          <p:nvPr>
+            <p:extLst>
+              <p:ext uri="{D42A27DB-BD31-4B8C-83A1-F6EECF244321}">
+                <p14:modId xmlns:p14="http://schemas.microsoft.com/office/powerpoint/2010/main" val="3828459622"/>
+              </p:ext>
+            </p:extLst>
+          </p:nvPr>
+        </p:nvGraphicFramePr>
+        <p:xfrm>
+          <a:off x="405685" y="1278036"/>
+          <a:ext cx="11352726" cy="4211320"/>
+        </p:xfrm>
+        <a:graphic>
+          <a:graphicData uri="http://schemas.openxmlformats.org/drawingml/2006/table">
+            <a:tbl>
+              <a:tblPr firstRow="1" bandRow="1">
+                <a:tableStyleId>{5C22544A-7EE6-4342-B048-85BDC9FD1C3A}</a:tableStyleId>
+              </a:tblPr>
+              <a:tblGrid>
+                <a:gridCol w="5546029">
+                  <a:extLst>
+                    <a:ext uri="{9D8B030D-6E8A-4147-A177-3AD203B41FA5}">
+                      <a16:colId xmlns:a16="http://schemas.microsoft.com/office/drawing/2014/main" val="1641353362"/>
+                    </a:ext>
+                  </a:extLst>
+                </a:gridCol>
+                <a:gridCol w="5806697">
+                  <a:extLst>
+                    <a:ext uri="{9D8B030D-6E8A-4147-A177-3AD203B41FA5}">
+                      <a16:colId xmlns:a16="http://schemas.microsoft.com/office/drawing/2014/main" val="4291018923"/>
+                    </a:ext>
+                  </a:extLst>
+                </a:gridCol>
+              </a:tblGrid>
+              <a:tr h="370840">
+                <a:tc>
+                  <a:txBody>
+                    <a:bodyPr/>
+                    <a:lstStyle/>
+                    <a:p>
+                      <a:r>
+                        <a:rPr lang="en-GB" noProof="0" dirty="0"/>
+                        <a:t>Specification</a:t>
+                      </a:r>
+                      <a:endParaRPr lang="en-US" dirty="0"/>
+                    </a:p>
+                  </a:txBody>
+                  <a:tcPr/>
+                </a:tc>
+                <a:tc>
+                  <a:txBody>
+                    <a:bodyPr/>
+                    <a:lstStyle/>
+                    <a:p>
+                      <a:r>
+                        <a:rPr lang="en-GB" dirty="0"/>
+                        <a:t>Description</a:t>
+                      </a:r>
+                      <a:endParaRPr lang="en-US" dirty="0"/>
+                    </a:p>
+                  </a:txBody>
+                  <a:tcPr/>
+                </a:tc>
+                <a:extLst>
+                  <a:ext uri="{0D108BD9-81ED-4DB2-BD59-A6C34878D82A}">
+                    <a16:rowId xmlns:a16="http://schemas.microsoft.com/office/drawing/2014/main" val="1518990347"/>
+                  </a:ext>
+                </a:extLst>
+              </a:tr>
+              <a:tr h="370840">
+                <a:tc>
+                  <a:txBody>
+                    <a:bodyPr/>
+                    <a:lstStyle/>
+                    <a:p>
+                      <a:r>
+                        <a:rPr lang="en-GB" sz="1200" noProof="0" dirty="0"/>
+                        <a:t>Registration and authorisation</a:t>
+                      </a:r>
+                      <a:endParaRPr lang="en-US" sz="1200" dirty="0"/>
+                    </a:p>
+                  </a:txBody>
+                  <a:tcPr/>
+                </a:tc>
+                <a:tc>
+                  <a:txBody>
+                    <a:bodyPr/>
+                    <a:lstStyle/>
+                    <a:p>
+                      <a:pPr marL="171450" indent="-171450">
+                        <a:buFont typeface="Arial" panose="020B0604020202020204" pitchFamily="34" charset="0"/>
+                        <a:buChar char="•"/>
+                      </a:pPr>
+                      <a:r>
+                        <a:rPr lang="en-US" sz="1200" dirty="0"/>
+                        <a:t>The user can create an account using a login and password.</a:t>
+                      </a:r>
+                    </a:p>
+                    <a:p>
+                      <a:pPr marL="171450" indent="-171450">
+                        <a:buFont typeface="Arial" panose="020B0604020202020204" pitchFamily="34" charset="0"/>
+                        <a:buChar char="•"/>
+                      </a:pPr>
+                      <a:r>
+                        <a:rPr lang="en-US" sz="1200" dirty="0"/>
+                        <a:t>Authenticated users have access to like, comment and upload album features.</a:t>
+                      </a:r>
+                    </a:p>
+                  </a:txBody>
+                  <a:tcPr/>
+                </a:tc>
+                <a:extLst>
+                  <a:ext uri="{0D108BD9-81ED-4DB2-BD59-A6C34878D82A}">
+                    <a16:rowId xmlns:a16="http://schemas.microsoft.com/office/drawing/2014/main" val="1979020116"/>
+                  </a:ext>
+                </a:extLst>
+              </a:tr>
+              <a:tr h="370840">
+                <a:tc>
+                  <a:txBody>
+                    <a:bodyPr/>
+                    <a:lstStyle/>
+                    <a:p>
+                      <a:r>
+                        <a:rPr lang="en-US" sz="1200" dirty="0"/>
+                        <a:t>User profile</a:t>
+                      </a:r>
+                    </a:p>
+                  </a:txBody>
+                  <a:tcPr/>
+                </a:tc>
+                <a:tc>
+                  <a:txBody>
+                    <a:bodyPr/>
+                    <a:lstStyle/>
+                    <a:p>
+                      <a:pPr marL="171450" indent="-171450">
+                        <a:buFont typeface="Arial" panose="020B0604020202020204" pitchFamily="34" charset="0"/>
+                        <a:buChar char="•"/>
+                      </a:pPr>
+                      <a:r>
+                        <a:rPr lang="en-US" sz="1200" dirty="0"/>
+                        <a:t>Display basic information: username, registration date, uploaded albums, etc.</a:t>
+                      </a:r>
+                    </a:p>
+                    <a:p>
+                      <a:pPr marL="171450" indent="-171450">
+                        <a:buFont typeface="Arial" panose="020B0604020202020204" pitchFamily="34" charset="0"/>
+                        <a:buChar char="•"/>
+                      </a:pPr>
+                      <a:r>
+                        <a:rPr lang="en-US" sz="1200" dirty="0"/>
+                        <a:t>Ability to change password and some settings.</a:t>
+                      </a:r>
+                    </a:p>
+                  </a:txBody>
+                  <a:tcPr/>
+                </a:tc>
+                <a:extLst>
+                  <a:ext uri="{0D108BD9-81ED-4DB2-BD59-A6C34878D82A}">
+                    <a16:rowId xmlns:a16="http://schemas.microsoft.com/office/drawing/2014/main" val="1513095257"/>
+                  </a:ext>
+                </a:extLst>
+              </a:tr>
+              <a:tr h="370840">
+                <a:tc>
+                  <a:txBody>
+                    <a:bodyPr/>
+                    <a:lstStyle/>
+                    <a:p>
+                      <a:r>
+                        <a:rPr lang="en-US" sz="1200" dirty="0"/>
+                        <a:t>Albums uploading</a:t>
+                      </a:r>
+                    </a:p>
+                  </a:txBody>
+                  <a:tcPr/>
+                </a:tc>
+                <a:tc>
+                  <a:txBody>
+                    <a:bodyPr/>
+                    <a:lstStyle/>
+                    <a:p>
+                      <a:pPr marL="171450" indent="-171450">
+                        <a:buFont typeface="Arial" panose="020B0604020202020204" pitchFamily="34" charset="0"/>
+                        <a:buChar char="•"/>
+                      </a:pPr>
+                      <a:r>
+                        <a:rPr lang="en-US" sz="1200" dirty="0"/>
+                        <a:t>Fields when uploading: Album title, Cover, Genre, Description (optional).</a:t>
+                      </a:r>
+                    </a:p>
+                    <a:p>
+                      <a:pPr marL="171450" indent="-171450">
+                        <a:buFont typeface="Arial" panose="020B0604020202020204" pitchFamily="34" charset="0"/>
+                        <a:buChar char="•"/>
+                      </a:pPr>
+                      <a:r>
+                        <a:rPr lang="en-US" sz="1200" dirty="0"/>
+                        <a:t>Tracking upload date, views, likes/dislikes.</a:t>
+                      </a:r>
+                    </a:p>
+                  </a:txBody>
+                  <a:tcPr/>
+                </a:tc>
+                <a:extLst>
+                  <a:ext uri="{0D108BD9-81ED-4DB2-BD59-A6C34878D82A}">
+                    <a16:rowId xmlns:a16="http://schemas.microsoft.com/office/drawing/2014/main" val="3924231895"/>
+                  </a:ext>
+                </a:extLst>
+              </a:tr>
+              <a:tr h="370840">
+                <a:tc>
+                  <a:txBody>
+                    <a:bodyPr/>
+                    <a:lstStyle/>
+                    <a:p>
+                      <a:r>
+                        <a:rPr lang="en-US" sz="1200" dirty="0"/>
+                        <a:t>Like/dislike system</a:t>
+                      </a:r>
+                    </a:p>
+                  </a:txBody>
+                  <a:tcPr/>
+                </a:tc>
+                <a:tc>
+                  <a:txBody>
+                    <a:bodyPr/>
+                    <a:lstStyle/>
+                    <a:p>
+                      <a:pPr marL="171450" indent="-171450">
+                        <a:buFont typeface="Arial" panose="020B0604020202020204" pitchFamily="34" charset="0"/>
+                        <a:buChar char="•"/>
+                      </a:pPr>
+                      <a:r>
+                        <a:rPr lang="en-US" sz="1200" dirty="0"/>
+                        <a:t>Each album can be rated positively or negatively.</a:t>
+                      </a:r>
+                      <a:endParaRPr lang="ru-RU" sz="1200" dirty="0"/>
+                    </a:p>
+                    <a:p>
+                      <a:pPr marL="171450" indent="-171450">
+                        <a:buFont typeface="Arial" panose="020B0604020202020204" pitchFamily="34" charset="0"/>
+                        <a:buChar char="•"/>
+                      </a:pPr>
+                      <a:r>
+                        <a:rPr lang="en-US" sz="1200" dirty="0"/>
+                        <a:t>The like/dislike counter is displayed next to each album.</a:t>
+                      </a:r>
+                    </a:p>
+                  </a:txBody>
+                  <a:tcPr/>
+                </a:tc>
+                <a:extLst>
+                  <a:ext uri="{0D108BD9-81ED-4DB2-BD59-A6C34878D82A}">
+                    <a16:rowId xmlns:a16="http://schemas.microsoft.com/office/drawing/2014/main" val="2028155564"/>
+                  </a:ext>
+                </a:extLst>
+              </a:tr>
+              <a:tr h="370840">
+                <a:tc>
+                  <a:txBody>
+                    <a:bodyPr/>
+                    <a:lstStyle/>
+                    <a:p>
+                      <a:r>
+                        <a:rPr lang="en-US" sz="1200" dirty="0"/>
+                        <a:t>Comment system</a:t>
+                      </a:r>
+                    </a:p>
+                  </a:txBody>
+                  <a:tcPr/>
+                </a:tc>
+                <a:tc>
+                  <a:txBody>
+                    <a:bodyPr/>
+                    <a:lstStyle/>
+                    <a:p>
+                      <a:pPr marL="171450" indent="-171450">
+                        <a:buFont typeface="Arial" panose="020B0604020202020204" pitchFamily="34" charset="0"/>
+                        <a:buChar char="•"/>
+                      </a:pPr>
+                      <a:r>
+                        <a:rPr lang="en-US" sz="1200" dirty="0"/>
+                        <a:t>Ability to leave text comments under the album.</a:t>
+                      </a:r>
+                      <a:endParaRPr lang="ru-RU" sz="1200" dirty="0"/>
+                    </a:p>
+                    <a:p>
+                      <a:pPr marL="171450" indent="-171450">
+                        <a:buFont typeface="Arial" panose="020B0604020202020204" pitchFamily="34" charset="0"/>
+                        <a:buChar char="•"/>
+                      </a:pPr>
+                      <a:r>
+                        <a:rPr lang="en-US" sz="1200" dirty="0"/>
+                        <a:t>Display a list of all comments in chronological order.</a:t>
+                      </a:r>
+                    </a:p>
+                  </a:txBody>
+                  <a:tcPr/>
+                </a:tc>
+                <a:extLst>
+                  <a:ext uri="{0D108BD9-81ED-4DB2-BD59-A6C34878D82A}">
+                    <a16:rowId xmlns:a16="http://schemas.microsoft.com/office/drawing/2014/main" val="4265522486"/>
+                  </a:ext>
+                </a:extLst>
+              </a:tr>
+              <a:tr h="370840">
+                <a:tc>
+                  <a:txBody>
+                    <a:bodyPr/>
+                    <a:lstStyle/>
+                    <a:p>
+                      <a:r>
+                        <a:rPr lang="en-US" sz="1200" dirty="0"/>
+                        <a:t>The mechanics of “Followers”</a:t>
+                      </a:r>
+                    </a:p>
+                  </a:txBody>
+                  <a:tcPr/>
+                </a:tc>
+                <a:tc>
+                  <a:txBody>
+                    <a:bodyPr/>
+                    <a:lstStyle/>
+                    <a:p>
+                      <a:pPr marL="171450" indent="-171450">
+                        <a:buFont typeface="Arial" panose="020B0604020202020204" pitchFamily="34" charset="0"/>
+                        <a:buChar char="•"/>
+                      </a:pPr>
+                      <a:r>
+                        <a:rPr lang="en-US" sz="1200" dirty="0"/>
+                        <a:t>Users can follow each other.</a:t>
+                      </a:r>
+                    </a:p>
+                    <a:p>
+                      <a:pPr marL="171450" indent="-171450">
+                        <a:buFont typeface="Arial" panose="020B0604020202020204" pitchFamily="34" charset="0"/>
+                        <a:buChar char="•"/>
+                      </a:pPr>
+                      <a:r>
+                        <a:rPr lang="en-US" sz="1200" dirty="0"/>
+                        <a:t>The Home page displays the latest ratings and comments from people you follow.</a:t>
+                      </a:r>
+                    </a:p>
+                  </a:txBody>
+                  <a:tcPr/>
+                </a:tc>
+                <a:extLst>
+                  <a:ext uri="{0D108BD9-81ED-4DB2-BD59-A6C34878D82A}">
+                    <a16:rowId xmlns:a16="http://schemas.microsoft.com/office/drawing/2014/main" val="1065828768"/>
+                  </a:ext>
+                </a:extLst>
+              </a:tr>
+              <a:tr h="370840">
+                <a:tc>
+                  <a:txBody>
+                    <a:bodyPr/>
+                    <a:lstStyle/>
+                    <a:p>
+                      <a:r>
+                        <a:rPr lang="en-US" sz="1200" dirty="0"/>
+                        <a:t>Search and sort</a:t>
+                      </a:r>
+                    </a:p>
+                  </a:txBody>
+                  <a:tcPr/>
+                </a:tc>
+                <a:tc>
+                  <a:txBody>
+                    <a:bodyPr/>
+                    <a:lstStyle/>
+                    <a:p>
+                      <a:pPr marL="171450" indent="-171450">
+                        <a:buFont typeface="Arial" panose="020B0604020202020204" pitchFamily="34" charset="0"/>
+                        <a:buChar char="•"/>
+                      </a:pPr>
+                      <a:r>
+                        <a:rPr lang="en-US" sz="1200" dirty="0"/>
+                        <a:t>Full text search by album title and username.</a:t>
+                      </a:r>
+                    </a:p>
+                    <a:p>
+                      <a:pPr marL="171450" indent="-171450">
+                        <a:buFont typeface="Arial" panose="020B0604020202020204" pitchFamily="34" charset="0"/>
+                        <a:buChar char="•"/>
+                      </a:pPr>
+                      <a:r>
+                        <a:rPr lang="en-US" sz="1200" dirty="0"/>
+                        <a:t>Filter by number of likes, upload date, popularity.</a:t>
+                      </a:r>
+                    </a:p>
+                  </a:txBody>
+                  <a:tcPr/>
+                </a:tc>
+                <a:extLst>
+                  <a:ext uri="{0D108BD9-81ED-4DB2-BD59-A6C34878D82A}">
+                    <a16:rowId xmlns:a16="http://schemas.microsoft.com/office/drawing/2014/main" val="2254452428"/>
+                  </a:ext>
+                </a:extLst>
+              </a:tr>
+              <a:tr h="370840">
+                <a:tc>
+                  <a:txBody>
+                    <a:bodyPr/>
+                    <a:lstStyle/>
+                    <a:p>
+                      <a:r>
+                        <a:rPr lang="en-US" sz="1200" dirty="0"/>
+                        <a:t>Views</a:t>
+                      </a:r>
+                    </a:p>
+                  </a:txBody>
+                  <a:tcPr/>
+                </a:tc>
+                <a:tc>
+                  <a:txBody>
+                    <a:bodyPr/>
+                    <a:lstStyle/>
+                    <a:p>
+                      <a:pPr marL="171450" indent="-171450">
+                        <a:buFont typeface="Arial" panose="020B0604020202020204" pitchFamily="34" charset="0"/>
+                        <a:buChar char="•"/>
+                      </a:pPr>
+                      <a:r>
+                        <a:rPr lang="en-US" sz="1200" dirty="0"/>
+                        <a:t>Each time you open an album page the view counter increases.</a:t>
+                      </a:r>
+                    </a:p>
+                    <a:p>
+                      <a:pPr marL="171450" indent="-171450">
+                        <a:buFont typeface="Arial" panose="020B0604020202020204" pitchFamily="34" charset="0"/>
+                        <a:buChar char="•"/>
+                      </a:pPr>
+                      <a:r>
+                        <a:rPr lang="en-US" sz="1200" dirty="0"/>
+                        <a:t>Using cookies or sessions to avoid “cheat</a:t>
+                      </a:r>
+                      <a:r>
+                        <a:rPr lang="en-GB" sz="1200" dirty="0"/>
+                        <a:t>ed</a:t>
+                      </a:r>
+                      <a:r>
+                        <a:rPr lang="en-US" sz="1200" dirty="0"/>
+                        <a:t>” views from the same user in a short period of time.</a:t>
+                      </a:r>
+                    </a:p>
+                  </a:txBody>
+                  <a:tcPr/>
+                </a:tc>
+                <a:extLst>
+                  <a:ext uri="{0D108BD9-81ED-4DB2-BD59-A6C34878D82A}">
+                    <a16:rowId xmlns:a16="http://schemas.microsoft.com/office/drawing/2014/main" val="3235469331"/>
+                  </a:ext>
+                </a:extLst>
+              </a:tr>
+            </a:tbl>
+          </a:graphicData>
+        </a:graphic>
+      </p:graphicFrame>
+    </p:spTree>
+    <p:extLst>
+      <p:ext uri="{BB962C8B-B14F-4D97-AF65-F5344CB8AC3E}">
+        <p14:creationId xmlns:p14="http://schemas.microsoft.com/office/powerpoint/2010/main" val="2058726886"/>
+      </p:ext>
+    </p:extLst>
+  </p:cSld>
+  <p:clrMapOvr>
+    <a:masterClrMapping/>
+  </p:clrMapOvr>
+</p:sld>
+</file>
+
+<file path=ppt/slides/slide5.xml><?xml version="1.0" encoding="utf-8"?>
+<p:sld xmlns:a="http://schemas.openxmlformats.org/drawingml/2006/main" xmlns:r="http://schemas.openxmlformats.org/officeDocument/2006/relationships" xmlns:p="http://schemas.openxmlformats.org/presentationml/2006/main">
+  <p:cSld>
+    <p:spTree>
+      <p:nvGrpSpPr>
+        <p:cNvPr id="1" name="">
+          <a:extLst>
+            <a:ext uri="{FF2B5EF4-FFF2-40B4-BE49-F238E27FC236}">
+              <a16:creationId xmlns:a16="http://schemas.microsoft.com/office/drawing/2014/main" id="{686D98EF-D14C-8B0C-4083-87C7E2545D87}"/>
+            </a:ext>
+          </a:extLst>
+        </p:cNvPr>
+        <p:cNvGrpSpPr/>
+        <p:nvPr/>
+      </p:nvGrpSpPr>
+      <p:grpSpPr>
+        <a:xfrm>
+          <a:off x="0" y="0"/>
+          <a:ext cx="0" cy="0"/>
+          <a:chOff x="0" y="0"/>
+          <a:chExt cx="0" cy="0"/>
+        </a:xfrm>
+      </p:grpSpPr>
+      <p:sp>
+        <p:nvSpPr>
+          <p:cNvPr id="2" name="Title 1">
+            <a:extLst>
+              <a:ext uri="{FF2B5EF4-FFF2-40B4-BE49-F238E27FC236}">
+                <a16:creationId xmlns:a16="http://schemas.microsoft.com/office/drawing/2014/main" id="{859D85F2-27FF-5E61-92AA-661B2E9CF5B9}"/>
+              </a:ext>
+            </a:extLst>
+          </p:cNvPr>
+          <p:cNvSpPr>
+            <a:spLocks noGrp="1"/>
+          </p:cNvSpPr>
+          <p:nvPr>
+            <p:ph type="title"/>
+          </p:nvPr>
+        </p:nvSpPr>
+        <p:spPr>
+          <a:xfrm>
+            <a:off x="279400" y="320675"/>
+            <a:ext cx="10515600" cy="1325563"/>
+          </a:xfrm>
+        </p:spPr>
+        <p:txBody>
+          <a:bodyPr/>
+          <a:lstStyle/>
+          <a:p>
+            <a:r>
+              <a:rPr lang="en-GB" noProof="0" dirty="0"/>
+              <a:t>System Architecture Diagram</a:t>
+            </a:r>
+          </a:p>
+        </p:txBody>
+      </p:sp>
+      <p:pic>
+        <p:nvPicPr>
+          <p:cNvPr id="7" name="Picture 6">
+            <a:extLst>
+              <a:ext uri="{FF2B5EF4-FFF2-40B4-BE49-F238E27FC236}">
+                <a16:creationId xmlns:a16="http://schemas.microsoft.com/office/drawing/2014/main" id="{750266B3-C7EB-B2BB-B965-6C068C2294D5}"/>
+              </a:ext>
+            </a:extLst>
+          </p:cNvPr>
+          <p:cNvPicPr>
+            <a:picLocks noChangeAspect="1"/>
+          </p:cNvPicPr>
+          <p:nvPr/>
+        </p:nvPicPr>
+        <p:blipFill>
+          <a:blip r:embed="rId2">
+            <a:extLst>
+              <a:ext uri="{28A0092B-C50C-407E-A947-70E740481C1C}">
+                <a14:useLocalDpi xmlns:a14="http://schemas.microsoft.com/office/drawing/2010/main" val="0"/>
+              </a:ext>
+            </a:extLst>
+          </a:blip>
+          <a:stretch>
+            <a:fillRect/>
+          </a:stretch>
+        </p:blipFill>
+        <p:spPr>
+          <a:xfrm>
+            <a:off x="595786" y="2998042"/>
+            <a:ext cx="1421280" cy="861915"/>
+          </a:xfrm>
+          <a:prstGeom prst="rect">
+            <a:avLst/>
+          </a:prstGeom>
+        </p:spPr>
+      </p:pic>
+      <p:grpSp>
+        <p:nvGrpSpPr>
+          <p:cNvPr id="13" name="Group 12">
+            <a:extLst>
+              <a:ext uri="{FF2B5EF4-FFF2-40B4-BE49-F238E27FC236}">
+                <a16:creationId xmlns:a16="http://schemas.microsoft.com/office/drawing/2014/main" id="{7C864776-4BB1-4B94-7253-7275D06E5967}"/>
+              </a:ext>
+            </a:extLst>
+          </p:cNvPr>
+          <p:cNvGrpSpPr/>
+          <p:nvPr/>
+        </p:nvGrpSpPr>
+        <p:grpSpPr>
+          <a:xfrm>
+            <a:off x="1792646" y="3032719"/>
+            <a:ext cx="659726" cy="696124"/>
+            <a:chOff x="2609849" y="2519101"/>
+            <a:chExt cx="1137374" cy="1246319"/>
+          </a:xfrm>
+        </p:grpSpPr>
+        <p:pic>
+          <p:nvPicPr>
+            <p:cNvPr id="11" name="Picture 10">
+              <a:extLst>
+                <a:ext uri="{FF2B5EF4-FFF2-40B4-BE49-F238E27FC236}">
+                  <a16:creationId xmlns:a16="http://schemas.microsoft.com/office/drawing/2014/main" id="{52A10ED4-AC3C-62B8-7C3B-1A51C4F96B9A}"/>
+                </a:ext>
+              </a:extLst>
+            </p:cNvPr>
+            <p:cNvPicPr>
+              <a:picLocks noChangeAspect="1"/>
+            </p:cNvPicPr>
+            <p:nvPr/>
+          </p:nvPicPr>
+          <p:blipFill>
+            <a:blip r:embed="rId3">
+              <a:extLst>
+                <a:ext uri="{28A0092B-C50C-407E-A947-70E740481C1C}">
+                  <a14:useLocalDpi xmlns:a14="http://schemas.microsoft.com/office/drawing/2010/main" val="0"/>
+                </a:ext>
+              </a:extLst>
+            </a:blip>
+            <a:stretch>
+              <a:fillRect/>
+            </a:stretch>
+          </p:blipFill>
+          <p:spPr>
+            <a:xfrm>
+              <a:off x="2609850" y="2519101"/>
+              <a:ext cx="1137373" cy="909898"/>
+            </a:xfrm>
+            <a:prstGeom prst="rect">
+              <a:avLst/>
+            </a:prstGeom>
+          </p:spPr>
+        </p:pic>
+        <p:pic>
+          <p:nvPicPr>
+            <p:cNvPr id="12" name="Picture 11">
+              <a:extLst>
+                <a:ext uri="{FF2B5EF4-FFF2-40B4-BE49-F238E27FC236}">
+                  <a16:creationId xmlns:a16="http://schemas.microsoft.com/office/drawing/2014/main" id="{A4552AB6-8633-EA79-1B46-B76724B7C90E}"/>
+                </a:ext>
+              </a:extLst>
+            </p:cNvPr>
+            <p:cNvPicPr>
+              <a:picLocks noChangeAspect="1"/>
+            </p:cNvPicPr>
+            <p:nvPr/>
+          </p:nvPicPr>
+          <p:blipFill>
+            <a:blip r:embed="rId3">
+              <a:extLst>
+                <a:ext uri="{28A0092B-C50C-407E-A947-70E740481C1C}">
+                  <a14:useLocalDpi xmlns:a14="http://schemas.microsoft.com/office/drawing/2010/main" val="0"/>
+                </a:ext>
+              </a:extLst>
+            </a:blip>
+            <a:stretch>
+              <a:fillRect/>
+            </a:stretch>
+          </p:blipFill>
+          <p:spPr>
+            <a:xfrm rot="10800000">
+              <a:off x="2609849" y="2855522"/>
+              <a:ext cx="1137373" cy="909898"/>
+            </a:xfrm>
+            <a:prstGeom prst="rect">
+              <a:avLst/>
+            </a:prstGeom>
+          </p:spPr>
+        </p:pic>
+      </p:grpSp>
+      <p:pic>
+        <p:nvPicPr>
+          <p:cNvPr id="15" name="Picture 14">
+            <a:extLst>
+              <a:ext uri="{FF2B5EF4-FFF2-40B4-BE49-F238E27FC236}">
+                <a16:creationId xmlns:a16="http://schemas.microsoft.com/office/drawing/2014/main" id="{9CFE3F02-540C-6482-6F96-B6EB646C08B8}"/>
+              </a:ext>
+            </a:extLst>
+          </p:cNvPr>
+          <p:cNvPicPr>
+            <a:picLocks noChangeAspect="1"/>
+          </p:cNvPicPr>
+          <p:nvPr/>
+        </p:nvPicPr>
+        <p:blipFill>
+          <a:blip r:embed="rId4">
+            <a:extLst>
+              <a:ext uri="{28A0092B-C50C-407E-A947-70E740481C1C}">
+                <a14:useLocalDpi xmlns:a14="http://schemas.microsoft.com/office/drawing/2010/main" val="0"/>
+              </a:ext>
+            </a:extLst>
+          </a:blip>
+          <a:stretch>
+            <a:fillRect/>
+          </a:stretch>
+        </p:blipFill>
+        <p:spPr>
+          <a:xfrm>
+            <a:off x="2543211" y="2973144"/>
+            <a:ext cx="860682" cy="862439"/>
+          </a:xfrm>
+          <a:prstGeom prst="rect">
+            <a:avLst/>
+          </a:prstGeom>
+        </p:spPr>
+      </p:pic>
+      <p:grpSp>
+        <p:nvGrpSpPr>
+          <p:cNvPr id="16" name="Group 15">
+            <a:extLst>
+              <a:ext uri="{FF2B5EF4-FFF2-40B4-BE49-F238E27FC236}">
+                <a16:creationId xmlns:a16="http://schemas.microsoft.com/office/drawing/2014/main" id="{A8D5AF47-153E-82F2-CFB1-135F9C7D28C5}"/>
+              </a:ext>
+            </a:extLst>
+          </p:cNvPr>
+          <p:cNvGrpSpPr/>
+          <p:nvPr/>
+        </p:nvGrpSpPr>
+        <p:grpSpPr>
+          <a:xfrm>
+            <a:off x="3504490" y="3020717"/>
+            <a:ext cx="707949" cy="747008"/>
+            <a:chOff x="2609849" y="2519101"/>
+            <a:chExt cx="1137374" cy="1246319"/>
+          </a:xfrm>
+        </p:grpSpPr>
+        <p:pic>
+          <p:nvPicPr>
+            <p:cNvPr id="17" name="Picture 16">
+              <a:extLst>
+                <a:ext uri="{FF2B5EF4-FFF2-40B4-BE49-F238E27FC236}">
+                  <a16:creationId xmlns:a16="http://schemas.microsoft.com/office/drawing/2014/main" id="{330FC198-64DF-9036-A16E-B5C473133C83}"/>
+                </a:ext>
+              </a:extLst>
+            </p:cNvPr>
+            <p:cNvPicPr>
+              <a:picLocks noChangeAspect="1"/>
+            </p:cNvPicPr>
+            <p:nvPr/>
+          </p:nvPicPr>
+          <p:blipFill>
+            <a:blip r:embed="rId3">
+              <a:extLst>
+                <a:ext uri="{28A0092B-C50C-407E-A947-70E740481C1C}">
+                  <a14:useLocalDpi xmlns:a14="http://schemas.microsoft.com/office/drawing/2010/main" val="0"/>
+                </a:ext>
+              </a:extLst>
+            </a:blip>
+            <a:stretch>
+              <a:fillRect/>
+            </a:stretch>
+          </p:blipFill>
+          <p:spPr>
+            <a:xfrm>
+              <a:off x="2609850" y="2519101"/>
+              <a:ext cx="1137373" cy="909898"/>
+            </a:xfrm>
+            <a:prstGeom prst="rect">
+              <a:avLst/>
+            </a:prstGeom>
+          </p:spPr>
+        </p:pic>
+        <p:pic>
+          <p:nvPicPr>
+            <p:cNvPr id="18" name="Picture 17">
+              <a:extLst>
+                <a:ext uri="{FF2B5EF4-FFF2-40B4-BE49-F238E27FC236}">
+                  <a16:creationId xmlns:a16="http://schemas.microsoft.com/office/drawing/2014/main" id="{A53143CF-7CC2-4A9A-C313-44E98CEEE182}"/>
+                </a:ext>
+              </a:extLst>
+            </p:cNvPr>
+            <p:cNvPicPr>
+              <a:picLocks noChangeAspect="1"/>
+            </p:cNvPicPr>
+            <p:nvPr/>
+          </p:nvPicPr>
+          <p:blipFill>
+            <a:blip r:embed="rId3">
+              <a:extLst>
+                <a:ext uri="{28A0092B-C50C-407E-A947-70E740481C1C}">
+                  <a14:useLocalDpi xmlns:a14="http://schemas.microsoft.com/office/drawing/2010/main" val="0"/>
+                </a:ext>
+              </a:extLst>
+            </a:blip>
+            <a:stretch>
+              <a:fillRect/>
+            </a:stretch>
+          </p:blipFill>
+          <p:spPr>
+            <a:xfrm rot="10800000">
+              <a:off x="2609849" y="2855522"/>
+              <a:ext cx="1137373" cy="909898"/>
+            </a:xfrm>
+            <a:prstGeom prst="rect">
+              <a:avLst/>
+            </a:prstGeom>
+          </p:spPr>
+        </p:pic>
+      </p:grpSp>
+      <p:pic>
+        <p:nvPicPr>
+          <p:cNvPr id="20" name="Picture 19">
+            <a:extLst>
+              <a:ext uri="{FF2B5EF4-FFF2-40B4-BE49-F238E27FC236}">
+                <a16:creationId xmlns:a16="http://schemas.microsoft.com/office/drawing/2014/main" id="{D4571D94-0688-89C0-2689-2CDB31675146}"/>
+              </a:ext>
+            </a:extLst>
+          </p:cNvPr>
+          <p:cNvPicPr>
+            <a:picLocks noChangeAspect="1"/>
+          </p:cNvPicPr>
+          <p:nvPr/>
+        </p:nvPicPr>
+        <p:blipFill>
+          <a:blip r:embed="rId5">
+            <a:extLst>
+              <a:ext uri="{28A0092B-C50C-407E-A947-70E740481C1C}">
+                <a14:useLocalDpi xmlns:a14="http://schemas.microsoft.com/office/drawing/2010/main" val="0"/>
+              </a:ext>
+            </a:extLst>
+          </a:blip>
+          <a:stretch>
+            <a:fillRect/>
+          </a:stretch>
+        </p:blipFill>
+        <p:spPr>
+          <a:xfrm>
+            <a:off x="4183350" y="2949561"/>
+            <a:ext cx="862440" cy="862440"/>
+          </a:xfrm>
+          <a:prstGeom prst="rect">
+            <a:avLst/>
+          </a:prstGeom>
+        </p:spPr>
+      </p:pic>
+      <p:grpSp>
+        <p:nvGrpSpPr>
+          <p:cNvPr id="21" name="Group 20">
+            <a:extLst>
+              <a:ext uri="{FF2B5EF4-FFF2-40B4-BE49-F238E27FC236}">
+                <a16:creationId xmlns:a16="http://schemas.microsoft.com/office/drawing/2014/main" id="{9B7E6C56-0611-269D-E269-D1506CE83E5C}"/>
+              </a:ext>
+            </a:extLst>
+          </p:cNvPr>
+          <p:cNvGrpSpPr/>
+          <p:nvPr/>
+        </p:nvGrpSpPr>
+        <p:grpSpPr>
+          <a:xfrm>
+            <a:off x="5044120" y="3048724"/>
+            <a:ext cx="723368" cy="763277"/>
+            <a:chOff x="2609849" y="2519101"/>
+            <a:chExt cx="1137374" cy="1246319"/>
+          </a:xfrm>
+        </p:grpSpPr>
+        <p:pic>
+          <p:nvPicPr>
+            <p:cNvPr id="22" name="Picture 21">
+              <a:extLst>
+                <a:ext uri="{FF2B5EF4-FFF2-40B4-BE49-F238E27FC236}">
+                  <a16:creationId xmlns:a16="http://schemas.microsoft.com/office/drawing/2014/main" id="{AA0B8FE4-9295-9E70-240E-13A972A01207}"/>
+                </a:ext>
+              </a:extLst>
+            </p:cNvPr>
+            <p:cNvPicPr>
+              <a:picLocks noChangeAspect="1"/>
+            </p:cNvPicPr>
+            <p:nvPr/>
+          </p:nvPicPr>
+          <p:blipFill>
+            <a:blip r:embed="rId3">
+              <a:extLst>
+                <a:ext uri="{28A0092B-C50C-407E-A947-70E740481C1C}">
+                  <a14:useLocalDpi xmlns:a14="http://schemas.microsoft.com/office/drawing/2010/main" val="0"/>
+                </a:ext>
+              </a:extLst>
+            </a:blip>
+            <a:stretch>
+              <a:fillRect/>
+            </a:stretch>
+          </p:blipFill>
+          <p:spPr>
+            <a:xfrm>
+              <a:off x="2609850" y="2519101"/>
+              <a:ext cx="1137373" cy="909898"/>
+            </a:xfrm>
+            <a:prstGeom prst="rect">
+              <a:avLst/>
+            </a:prstGeom>
+          </p:spPr>
+        </p:pic>
+        <p:pic>
+          <p:nvPicPr>
+            <p:cNvPr id="23" name="Picture 22">
+              <a:extLst>
+                <a:ext uri="{FF2B5EF4-FFF2-40B4-BE49-F238E27FC236}">
+                  <a16:creationId xmlns:a16="http://schemas.microsoft.com/office/drawing/2014/main" id="{23D409B1-EE0E-96A0-B0F6-2DF9F919BB77}"/>
+                </a:ext>
+              </a:extLst>
+            </p:cNvPr>
+            <p:cNvPicPr>
+              <a:picLocks noChangeAspect="1"/>
+            </p:cNvPicPr>
+            <p:nvPr/>
+          </p:nvPicPr>
+          <p:blipFill>
+            <a:blip r:embed="rId3">
+              <a:extLst>
+                <a:ext uri="{28A0092B-C50C-407E-A947-70E740481C1C}">
+                  <a14:useLocalDpi xmlns:a14="http://schemas.microsoft.com/office/drawing/2010/main" val="0"/>
+                </a:ext>
+              </a:extLst>
+            </a:blip>
+            <a:stretch>
+              <a:fillRect/>
+            </a:stretch>
+          </p:blipFill>
+          <p:spPr>
+            <a:xfrm rot="10800000">
+              <a:off x="2609849" y="2855522"/>
+              <a:ext cx="1137373" cy="909898"/>
+            </a:xfrm>
+            <a:prstGeom prst="rect">
+              <a:avLst/>
+            </a:prstGeom>
+          </p:spPr>
+        </p:pic>
+      </p:grpSp>
+      <p:sp>
+        <p:nvSpPr>
+          <p:cNvPr id="34" name="Rectangle: Rounded Corners 33">
+            <a:extLst>
+              <a:ext uri="{FF2B5EF4-FFF2-40B4-BE49-F238E27FC236}">
+                <a16:creationId xmlns:a16="http://schemas.microsoft.com/office/drawing/2014/main" id="{9C9E46EC-7802-ADF8-B04A-3E6BFF8A2986}"/>
+              </a:ext>
+            </a:extLst>
+          </p:cNvPr>
+          <p:cNvSpPr/>
+          <p:nvPr/>
+        </p:nvSpPr>
+        <p:spPr>
+          <a:xfrm>
+            <a:off x="5852664" y="3213375"/>
+            <a:ext cx="1241388" cy="474086"/>
+          </a:xfrm>
+          <a:prstGeom prst="roundRect">
+            <a:avLst/>
+          </a:prstGeom>
+          <a:noFill/>
+          <a:ln w="28575">
+            <a:solidFill>
+              <a:schemeClr val="tx1"/>
+            </a:solidFill>
+          </a:ln>
+        </p:spPr>
+        <p:style>
+          <a:lnRef idx="2">
+            <a:schemeClr val="accent1">
+              <a:shade val="15000"/>
+            </a:schemeClr>
+          </a:lnRef>
+          <a:fillRef idx="1">
+            <a:schemeClr val="accent1"/>
+          </a:fillRef>
+          <a:effectRef idx="0">
+            <a:schemeClr val="accent1"/>
+          </a:effectRef>
+          <a:fontRef idx="minor">
+            <a:schemeClr val="lt1"/>
+          </a:fontRef>
+        </p:style>
+        <p:txBody>
+          <a:bodyPr rtlCol="0" anchor="ctr"/>
+          <a:lstStyle/>
+          <a:p>
+            <a:pPr algn="ctr"/>
+            <a:r>
+              <a:rPr lang="en-GB" dirty="0">
+                <a:solidFill>
+                  <a:schemeClr val="tx1"/>
+                </a:solidFill>
+              </a:rPr>
+              <a:t>URL</a:t>
+            </a:r>
+            <a:endParaRPr lang="en-US" dirty="0">
+              <a:solidFill>
+                <a:schemeClr val="tx1"/>
+              </a:solidFill>
+            </a:endParaRPr>
+          </a:p>
+        </p:txBody>
+      </p:sp>
+      <p:grpSp>
+        <p:nvGrpSpPr>
+          <p:cNvPr id="35" name="Group 34">
+            <a:extLst>
+              <a:ext uri="{FF2B5EF4-FFF2-40B4-BE49-F238E27FC236}">
+                <a16:creationId xmlns:a16="http://schemas.microsoft.com/office/drawing/2014/main" id="{B2CA29F8-3412-A286-8631-32A4538A5F23}"/>
+              </a:ext>
+            </a:extLst>
+          </p:cNvPr>
+          <p:cNvGrpSpPr/>
+          <p:nvPr/>
+        </p:nvGrpSpPr>
+        <p:grpSpPr>
+          <a:xfrm>
+            <a:off x="7168436" y="3057616"/>
+            <a:ext cx="723368" cy="763277"/>
+            <a:chOff x="2609849" y="2519101"/>
+            <a:chExt cx="1137374" cy="1246319"/>
+          </a:xfrm>
+        </p:grpSpPr>
+        <p:pic>
+          <p:nvPicPr>
+            <p:cNvPr id="36" name="Picture 35">
+              <a:extLst>
+                <a:ext uri="{FF2B5EF4-FFF2-40B4-BE49-F238E27FC236}">
+                  <a16:creationId xmlns:a16="http://schemas.microsoft.com/office/drawing/2014/main" id="{2BCF5E14-DAAC-1D87-CE97-189D83FAF337}"/>
+                </a:ext>
+              </a:extLst>
+            </p:cNvPr>
+            <p:cNvPicPr>
+              <a:picLocks noChangeAspect="1"/>
+            </p:cNvPicPr>
+            <p:nvPr/>
+          </p:nvPicPr>
+          <p:blipFill>
+            <a:blip r:embed="rId3">
+              <a:extLst>
+                <a:ext uri="{28A0092B-C50C-407E-A947-70E740481C1C}">
+                  <a14:useLocalDpi xmlns:a14="http://schemas.microsoft.com/office/drawing/2010/main" val="0"/>
+                </a:ext>
+              </a:extLst>
+            </a:blip>
+            <a:stretch>
+              <a:fillRect/>
+            </a:stretch>
+          </p:blipFill>
+          <p:spPr>
+            <a:xfrm>
+              <a:off x="2609850" y="2519101"/>
+              <a:ext cx="1137373" cy="909898"/>
+            </a:xfrm>
+            <a:prstGeom prst="rect">
+              <a:avLst/>
+            </a:prstGeom>
+          </p:spPr>
+        </p:pic>
+        <p:pic>
+          <p:nvPicPr>
+            <p:cNvPr id="37" name="Picture 36">
+              <a:extLst>
+                <a:ext uri="{FF2B5EF4-FFF2-40B4-BE49-F238E27FC236}">
+                  <a16:creationId xmlns:a16="http://schemas.microsoft.com/office/drawing/2014/main" id="{3A06979E-E565-B31F-E79E-C86DDD1DD770}"/>
+                </a:ext>
+              </a:extLst>
+            </p:cNvPr>
+            <p:cNvPicPr>
+              <a:picLocks noChangeAspect="1"/>
+            </p:cNvPicPr>
+            <p:nvPr/>
+          </p:nvPicPr>
+          <p:blipFill>
+            <a:blip r:embed="rId3">
+              <a:extLst>
+                <a:ext uri="{28A0092B-C50C-407E-A947-70E740481C1C}">
+                  <a14:useLocalDpi xmlns:a14="http://schemas.microsoft.com/office/drawing/2010/main" val="0"/>
+                </a:ext>
+              </a:extLst>
+            </a:blip>
+            <a:stretch>
+              <a:fillRect/>
+            </a:stretch>
+          </p:blipFill>
+          <p:spPr>
+            <a:xfrm rot="10800000">
+              <a:off x="2609849" y="2855522"/>
+              <a:ext cx="1137373" cy="909898"/>
+            </a:xfrm>
+            <a:prstGeom prst="rect">
+              <a:avLst/>
+            </a:prstGeom>
+          </p:spPr>
+        </p:pic>
+      </p:grpSp>
+      <p:sp>
+        <p:nvSpPr>
+          <p:cNvPr id="38" name="Rectangle: Rounded Corners 37">
+            <a:extLst>
+              <a:ext uri="{FF2B5EF4-FFF2-40B4-BE49-F238E27FC236}">
+                <a16:creationId xmlns:a16="http://schemas.microsoft.com/office/drawing/2014/main" id="{955724F2-CEA4-5376-D056-826E201F68A2}"/>
+              </a:ext>
+            </a:extLst>
+          </p:cNvPr>
+          <p:cNvSpPr/>
+          <p:nvPr/>
+        </p:nvSpPr>
+        <p:spPr>
+          <a:xfrm>
+            <a:off x="7966186" y="3191956"/>
+            <a:ext cx="1241388" cy="474086"/>
+          </a:xfrm>
+          <a:prstGeom prst="roundRect">
+            <a:avLst/>
+          </a:prstGeom>
+          <a:noFill/>
+          <a:ln w="28575">
+            <a:solidFill>
+              <a:schemeClr val="tx1"/>
+            </a:solidFill>
+          </a:ln>
+        </p:spPr>
+        <p:style>
+          <a:lnRef idx="2">
+            <a:schemeClr val="accent1">
+              <a:shade val="15000"/>
+            </a:schemeClr>
+          </a:lnRef>
+          <a:fillRef idx="1">
+            <a:schemeClr val="accent1"/>
+          </a:fillRef>
+          <a:effectRef idx="0">
+            <a:schemeClr val="accent1"/>
+          </a:effectRef>
+          <a:fontRef idx="minor">
+            <a:schemeClr val="lt1"/>
+          </a:fontRef>
+        </p:style>
+        <p:txBody>
+          <a:bodyPr rtlCol="0" anchor="ctr"/>
+          <a:lstStyle/>
+          <a:p>
+            <a:pPr algn="ctr"/>
+            <a:r>
+              <a:rPr lang="en-GB" dirty="0">
+                <a:solidFill>
+                  <a:schemeClr val="tx1"/>
+                </a:solidFill>
+              </a:rPr>
+              <a:t>View</a:t>
+            </a:r>
+            <a:endParaRPr lang="en-US" dirty="0">
+              <a:solidFill>
+                <a:schemeClr val="tx1"/>
+              </a:solidFill>
+            </a:endParaRPr>
+          </a:p>
+        </p:txBody>
+      </p:sp>
+      <p:sp>
+        <p:nvSpPr>
+          <p:cNvPr id="39" name="Rectangle: Rounded Corners 38">
+            <a:extLst>
+              <a:ext uri="{FF2B5EF4-FFF2-40B4-BE49-F238E27FC236}">
+                <a16:creationId xmlns:a16="http://schemas.microsoft.com/office/drawing/2014/main" id="{C6AA31ED-E181-2A75-42F4-04CA6911FA7F}"/>
+              </a:ext>
+            </a:extLst>
+          </p:cNvPr>
+          <p:cNvSpPr/>
+          <p:nvPr/>
+        </p:nvSpPr>
+        <p:spPr>
+          <a:xfrm>
+            <a:off x="10002409" y="2317736"/>
+            <a:ext cx="1241388" cy="474086"/>
+          </a:xfrm>
+          <a:prstGeom prst="roundRect">
+            <a:avLst/>
+          </a:prstGeom>
+          <a:noFill/>
+          <a:ln w="28575">
+            <a:solidFill>
+              <a:schemeClr val="tx1"/>
+            </a:solidFill>
+          </a:ln>
+        </p:spPr>
+        <p:style>
+          <a:lnRef idx="2">
+            <a:schemeClr val="accent1">
+              <a:shade val="15000"/>
+            </a:schemeClr>
+          </a:lnRef>
+          <a:fillRef idx="1">
+            <a:schemeClr val="accent1"/>
+          </a:fillRef>
+          <a:effectRef idx="0">
+            <a:schemeClr val="accent1"/>
+          </a:effectRef>
+          <a:fontRef idx="minor">
+            <a:schemeClr val="lt1"/>
+          </a:fontRef>
+        </p:style>
+        <p:txBody>
+          <a:bodyPr rtlCol="0" anchor="ctr"/>
+          <a:lstStyle/>
+          <a:p>
+            <a:pPr algn="ctr"/>
+            <a:r>
+              <a:rPr lang="en-GB" dirty="0">
+                <a:solidFill>
+                  <a:schemeClr val="tx1"/>
+                </a:solidFill>
+              </a:rPr>
+              <a:t>Model</a:t>
+            </a:r>
+            <a:endParaRPr lang="en-US" dirty="0">
+              <a:solidFill>
+                <a:schemeClr val="tx1"/>
+              </a:solidFill>
+            </a:endParaRPr>
+          </a:p>
+        </p:txBody>
+      </p:sp>
+      <p:grpSp>
+        <p:nvGrpSpPr>
+          <p:cNvPr id="40" name="Group 39">
+            <a:extLst>
+              <a:ext uri="{FF2B5EF4-FFF2-40B4-BE49-F238E27FC236}">
+                <a16:creationId xmlns:a16="http://schemas.microsoft.com/office/drawing/2014/main" id="{CF70F098-BADC-D51B-1B20-BEE3E3F910CA}"/>
+              </a:ext>
+            </a:extLst>
+          </p:cNvPr>
+          <p:cNvGrpSpPr/>
+          <p:nvPr/>
+        </p:nvGrpSpPr>
+        <p:grpSpPr>
+          <a:xfrm rot="19718319">
+            <a:off x="9240491" y="2599290"/>
+            <a:ext cx="723368" cy="763277"/>
+            <a:chOff x="2609849" y="2519101"/>
+            <a:chExt cx="1137374" cy="1246319"/>
+          </a:xfrm>
+        </p:grpSpPr>
+        <p:pic>
+          <p:nvPicPr>
+            <p:cNvPr id="41" name="Picture 40">
+              <a:extLst>
+                <a:ext uri="{FF2B5EF4-FFF2-40B4-BE49-F238E27FC236}">
+                  <a16:creationId xmlns:a16="http://schemas.microsoft.com/office/drawing/2014/main" id="{DC67DF22-2D42-B208-1A54-BE9695676157}"/>
+                </a:ext>
+              </a:extLst>
+            </p:cNvPr>
+            <p:cNvPicPr>
+              <a:picLocks noChangeAspect="1"/>
+            </p:cNvPicPr>
+            <p:nvPr/>
+          </p:nvPicPr>
+          <p:blipFill>
+            <a:blip r:embed="rId3">
+              <a:extLst>
+                <a:ext uri="{28A0092B-C50C-407E-A947-70E740481C1C}">
+                  <a14:useLocalDpi xmlns:a14="http://schemas.microsoft.com/office/drawing/2010/main" val="0"/>
+                </a:ext>
+              </a:extLst>
+            </a:blip>
+            <a:stretch>
+              <a:fillRect/>
+            </a:stretch>
+          </p:blipFill>
+          <p:spPr>
+            <a:xfrm>
+              <a:off x="2609850" y="2519101"/>
+              <a:ext cx="1137373" cy="909898"/>
+            </a:xfrm>
+            <a:prstGeom prst="rect">
+              <a:avLst/>
+            </a:prstGeom>
+          </p:spPr>
+        </p:pic>
+        <p:pic>
+          <p:nvPicPr>
+            <p:cNvPr id="42" name="Picture 41">
+              <a:extLst>
+                <a:ext uri="{FF2B5EF4-FFF2-40B4-BE49-F238E27FC236}">
+                  <a16:creationId xmlns:a16="http://schemas.microsoft.com/office/drawing/2014/main" id="{9E9EEB94-5E32-0221-4FCC-4EF997337CE1}"/>
+                </a:ext>
+              </a:extLst>
+            </p:cNvPr>
+            <p:cNvPicPr>
+              <a:picLocks noChangeAspect="1"/>
+            </p:cNvPicPr>
+            <p:nvPr/>
+          </p:nvPicPr>
+          <p:blipFill>
+            <a:blip r:embed="rId3">
+              <a:extLst>
+                <a:ext uri="{28A0092B-C50C-407E-A947-70E740481C1C}">
+                  <a14:useLocalDpi xmlns:a14="http://schemas.microsoft.com/office/drawing/2010/main" val="0"/>
+                </a:ext>
+              </a:extLst>
+            </a:blip>
+            <a:stretch>
+              <a:fillRect/>
+            </a:stretch>
+          </p:blipFill>
+          <p:spPr>
+            <a:xfrm rot="10800000">
+              <a:off x="2609849" y="2855522"/>
+              <a:ext cx="1137373" cy="909898"/>
+            </a:xfrm>
+            <a:prstGeom prst="rect">
+              <a:avLst/>
+            </a:prstGeom>
+          </p:spPr>
+        </p:pic>
+      </p:grpSp>
+      <p:sp>
+        <p:nvSpPr>
+          <p:cNvPr id="43" name="Rectangle: Rounded Corners 42">
+            <a:extLst>
+              <a:ext uri="{FF2B5EF4-FFF2-40B4-BE49-F238E27FC236}">
+                <a16:creationId xmlns:a16="http://schemas.microsoft.com/office/drawing/2014/main" id="{02607D75-FB3E-957B-F125-A6B1D8BDDDE1}"/>
+              </a:ext>
+            </a:extLst>
+          </p:cNvPr>
+          <p:cNvSpPr/>
+          <p:nvPr/>
+        </p:nvSpPr>
+        <p:spPr>
+          <a:xfrm>
+            <a:off x="9988859" y="4130206"/>
+            <a:ext cx="1241388" cy="474086"/>
+          </a:xfrm>
+          <a:prstGeom prst="roundRect">
+            <a:avLst/>
+          </a:prstGeom>
+          <a:noFill/>
+          <a:ln w="28575">
+            <a:solidFill>
+              <a:schemeClr val="tx1"/>
+            </a:solidFill>
+          </a:ln>
+        </p:spPr>
+        <p:style>
+          <a:lnRef idx="2">
+            <a:schemeClr val="accent1">
+              <a:shade val="15000"/>
+            </a:schemeClr>
+          </a:lnRef>
+          <a:fillRef idx="1">
+            <a:schemeClr val="accent1"/>
+          </a:fillRef>
+          <a:effectRef idx="0">
+            <a:schemeClr val="accent1"/>
+          </a:effectRef>
+          <a:fontRef idx="minor">
+            <a:schemeClr val="lt1"/>
+          </a:fontRef>
+        </p:style>
+        <p:txBody>
+          <a:bodyPr rtlCol="0" anchor="ctr"/>
+          <a:lstStyle/>
+          <a:p>
+            <a:pPr algn="ctr"/>
+            <a:r>
+              <a:rPr lang="en-GB" dirty="0">
+                <a:solidFill>
+                  <a:schemeClr val="tx1"/>
+                </a:solidFill>
+              </a:rPr>
+              <a:t>Template</a:t>
+            </a:r>
+            <a:endParaRPr lang="en-US" dirty="0">
+              <a:solidFill>
+                <a:schemeClr val="tx1"/>
+              </a:solidFill>
+            </a:endParaRPr>
+          </a:p>
+        </p:txBody>
+      </p:sp>
+      <p:grpSp>
+        <p:nvGrpSpPr>
+          <p:cNvPr id="44" name="Group 43">
+            <a:extLst>
+              <a:ext uri="{FF2B5EF4-FFF2-40B4-BE49-F238E27FC236}">
+                <a16:creationId xmlns:a16="http://schemas.microsoft.com/office/drawing/2014/main" id="{794BA634-9E41-A28A-D68D-DC0B6E59C4C4}"/>
+              </a:ext>
+            </a:extLst>
+          </p:cNvPr>
+          <p:cNvGrpSpPr/>
+          <p:nvPr/>
+        </p:nvGrpSpPr>
+        <p:grpSpPr>
+          <a:xfrm rot="2507663">
+            <a:off x="9240491" y="3536838"/>
+            <a:ext cx="723368" cy="763277"/>
+            <a:chOff x="2609849" y="2519101"/>
+            <a:chExt cx="1137374" cy="1246319"/>
+          </a:xfrm>
+        </p:grpSpPr>
+        <p:pic>
+          <p:nvPicPr>
+            <p:cNvPr id="45" name="Picture 44">
+              <a:extLst>
+                <a:ext uri="{FF2B5EF4-FFF2-40B4-BE49-F238E27FC236}">
+                  <a16:creationId xmlns:a16="http://schemas.microsoft.com/office/drawing/2014/main" id="{23BF7FC6-B0B2-796F-1969-2931EF2C043F}"/>
+                </a:ext>
+              </a:extLst>
+            </p:cNvPr>
+            <p:cNvPicPr>
+              <a:picLocks noChangeAspect="1"/>
+            </p:cNvPicPr>
+            <p:nvPr/>
+          </p:nvPicPr>
+          <p:blipFill>
+            <a:blip r:embed="rId3">
+              <a:extLst>
+                <a:ext uri="{28A0092B-C50C-407E-A947-70E740481C1C}">
+                  <a14:useLocalDpi xmlns:a14="http://schemas.microsoft.com/office/drawing/2010/main" val="0"/>
+                </a:ext>
+              </a:extLst>
+            </a:blip>
+            <a:stretch>
+              <a:fillRect/>
+            </a:stretch>
+          </p:blipFill>
+          <p:spPr>
+            <a:xfrm>
+              <a:off x="2609850" y="2519101"/>
+              <a:ext cx="1137373" cy="909898"/>
+            </a:xfrm>
+            <a:prstGeom prst="rect">
+              <a:avLst/>
+            </a:prstGeom>
+          </p:spPr>
+        </p:pic>
+        <p:pic>
+          <p:nvPicPr>
+            <p:cNvPr id="46" name="Picture 45">
+              <a:extLst>
+                <a:ext uri="{FF2B5EF4-FFF2-40B4-BE49-F238E27FC236}">
+                  <a16:creationId xmlns:a16="http://schemas.microsoft.com/office/drawing/2014/main" id="{48D4062C-68DC-922E-0C93-417F3F085180}"/>
+                </a:ext>
+              </a:extLst>
+            </p:cNvPr>
+            <p:cNvPicPr>
+              <a:picLocks noChangeAspect="1"/>
+            </p:cNvPicPr>
+            <p:nvPr/>
+          </p:nvPicPr>
+          <p:blipFill>
+            <a:blip r:embed="rId3">
+              <a:extLst>
+                <a:ext uri="{28A0092B-C50C-407E-A947-70E740481C1C}">
+                  <a14:useLocalDpi xmlns:a14="http://schemas.microsoft.com/office/drawing/2010/main" val="0"/>
+                </a:ext>
+              </a:extLst>
+            </a:blip>
+            <a:stretch>
+              <a:fillRect/>
+            </a:stretch>
+          </p:blipFill>
+          <p:spPr>
+            <a:xfrm rot="10800000">
+              <a:off x="2609849" y="2855522"/>
+              <a:ext cx="1137373" cy="909898"/>
+            </a:xfrm>
+            <a:prstGeom prst="rect">
+              <a:avLst/>
+            </a:prstGeom>
+          </p:spPr>
+        </p:pic>
+      </p:grpSp>
+      <p:sp>
+        <p:nvSpPr>
+          <p:cNvPr id="47" name="TextBox 46">
+            <a:extLst>
+              <a:ext uri="{FF2B5EF4-FFF2-40B4-BE49-F238E27FC236}">
+                <a16:creationId xmlns:a16="http://schemas.microsoft.com/office/drawing/2014/main" id="{B6FF212F-C7B5-8214-9562-7D1563F0C414}"/>
+              </a:ext>
+            </a:extLst>
+          </p:cNvPr>
+          <p:cNvSpPr txBox="1"/>
+          <p:nvPr/>
+        </p:nvSpPr>
+        <p:spPr>
+          <a:xfrm>
+            <a:off x="2222574" y="3835583"/>
+            <a:ext cx="1501955" cy="369332"/>
+          </a:xfrm>
+          <a:prstGeom prst="rect">
+            <a:avLst/>
+          </a:prstGeom>
+          <a:noFill/>
+        </p:spPr>
+        <p:txBody>
+          <a:bodyPr wrap="square" rtlCol="0">
+            <a:spAutoFit/>
+          </a:bodyPr>
+          <a:lstStyle/>
+          <a:p>
+            <a:pPr algn="ctr"/>
+            <a:r>
               <a:rPr lang="en-GB" dirty="0"/>
+              <a:t>Web browser</a:t>
+            </a:r>
+            <a:endParaRPr lang="en-US" dirty="0"/>
+          </a:p>
+        </p:txBody>
+      </p:sp>
+      <p:sp>
+        <p:nvSpPr>
+          <p:cNvPr id="48" name="TextBox 47">
+            <a:extLst>
+              <a:ext uri="{FF2B5EF4-FFF2-40B4-BE49-F238E27FC236}">
+                <a16:creationId xmlns:a16="http://schemas.microsoft.com/office/drawing/2014/main" id="{D880C1B5-C360-0B64-CA40-175B22D97001}"/>
+              </a:ext>
+            </a:extLst>
+          </p:cNvPr>
+          <p:cNvSpPr txBox="1"/>
+          <p:nvPr/>
+        </p:nvSpPr>
+        <p:spPr>
+          <a:xfrm>
+            <a:off x="939326" y="3859957"/>
+            <a:ext cx="727252" cy="369332"/>
+          </a:xfrm>
+          <a:prstGeom prst="rect">
+            <a:avLst/>
+          </a:prstGeom>
+          <a:noFill/>
+        </p:spPr>
+        <p:txBody>
+          <a:bodyPr wrap="square" rtlCol="0">
+            <a:spAutoFit/>
+          </a:bodyPr>
+          <a:lstStyle/>
+          <a:p>
+            <a:pPr algn="ctr"/>
+            <a:r>
+              <a:rPr lang="en-GB" dirty="0"/>
+              <a:t>User</a:t>
+            </a:r>
+            <a:endParaRPr lang="en-US" dirty="0"/>
+          </a:p>
+        </p:txBody>
+      </p:sp>
+      <p:sp>
+        <p:nvSpPr>
+          <p:cNvPr id="49" name="TextBox 48">
+            <a:extLst>
+              <a:ext uri="{FF2B5EF4-FFF2-40B4-BE49-F238E27FC236}">
+                <a16:creationId xmlns:a16="http://schemas.microsoft.com/office/drawing/2014/main" id="{D7E4C29F-A003-6F58-49F4-BF0B24C32843}"/>
+              </a:ext>
+            </a:extLst>
+          </p:cNvPr>
+          <p:cNvSpPr txBox="1"/>
+          <p:nvPr/>
+        </p:nvSpPr>
+        <p:spPr>
+          <a:xfrm>
+            <a:off x="4161328" y="3835583"/>
+            <a:ext cx="906484" cy="369332"/>
+          </a:xfrm>
+          <a:prstGeom prst="rect">
+            <a:avLst/>
+          </a:prstGeom>
+          <a:noFill/>
+        </p:spPr>
+        <p:txBody>
+          <a:bodyPr wrap="square" rtlCol="0">
+            <a:spAutoFit/>
+          </a:bodyPr>
+          <a:lstStyle/>
+          <a:p>
+            <a:pPr algn="ctr"/>
+            <a:r>
+              <a:rPr lang="en-GB" dirty="0" err="1"/>
+              <a:t>DJango</a:t>
+            </a:r>
+            <a:endParaRPr lang="en-US" dirty="0"/>
+          </a:p>
+        </p:txBody>
+      </p:sp>
+    </p:spTree>
+    <p:extLst>
+      <p:ext uri="{BB962C8B-B14F-4D97-AF65-F5344CB8AC3E}">
+        <p14:creationId xmlns:p14="http://schemas.microsoft.com/office/powerpoint/2010/main" val="262561977"/>
+      </p:ext>
+    </p:extLst>
+  </p:cSld>
+  <p:clrMapOvr>
+    <a:masterClrMapping/>
+  </p:clrMapOvr>
+</p:sld>
+</file>
+
+<file path=ppt/slides/slide6.xml><?xml version="1.0" encoding="utf-8"?>
+<p:sld xmlns:a="http://schemas.openxmlformats.org/drawingml/2006/main" xmlns:r="http://schemas.openxmlformats.org/officeDocument/2006/relationships" xmlns:p="http://schemas.openxmlformats.org/presentationml/2006/main">
+  <p:cSld>
+    <p:spTree>
+      <p:nvGrpSpPr>
+        <p:cNvPr id="1" name=""/>
+        <p:cNvGrpSpPr/>
+        <p:nvPr/>
+      </p:nvGrpSpPr>
+      <p:grpSpPr>
+        <a:xfrm>
+          <a:off x="0" y="0"/>
+          <a:ext cx="0" cy="0"/>
+          <a:chOff x="0" y="0"/>
+          <a:chExt cx="0" cy="0"/>
+        </a:xfrm>
+      </p:grpSpPr>
+      <p:sp>
+        <p:nvSpPr>
+          <p:cNvPr id="2" name="Title 1">
+            <a:extLst>
+              <a:ext uri="{FF2B5EF4-FFF2-40B4-BE49-F238E27FC236}">
+                <a16:creationId xmlns:a16="http://schemas.microsoft.com/office/drawing/2014/main" id="{41EA2D55-21D6-B6D6-9F55-727B1DB29312}"/>
+              </a:ext>
+            </a:extLst>
+          </p:cNvPr>
+          <p:cNvSpPr>
+            <a:spLocks noGrp="1"/>
+          </p:cNvSpPr>
+          <p:nvPr>
+            <p:ph type="title"/>
+          </p:nvPr>
+        </p:nvSpPr>
+        <p:spPr/>
+        <p:txBody>
+          <a:bodyPr/>
+          <a:lstStyle/>
+          <a:p>
+            <a:r>
+              <a:rPr lang="en-GB" noProof="0" dirty="0"/>
               <a:t>ER diagram</a:t>
             </a:r>
           </a:p>
@@ -3681,7 +5940,7 @@
           <p:nvPr>
             <p:extLst>
               <p:ext uri="{D42A27DB-BD31-4B8C-83A1-F6EECF244321}">
-                <p14:modId xmlns:p14="http://schemas.microsoft.com/office/powerpoint/2010/main" val="294875610"/>
+                <p14:modId xmlns:p14="http://schemas.microsoft.com/office/powerpoint/2010/main" val="3491845218"/>
               </p:ext>
             </p:extLst>
           </p:nvPr>
@@ -3719,7 +5978,7 @@
                     <a:lstStyle/>
                     <a:p>
                       <a:r>
-                        <a:rPr lang="en-GB" dirty="0"/>
+                        <a:rPr lang="en-GB" noProof="0" dirty="0"/>
                         <a:t>Fields</a:t>
                       </a:r>
                     </a:p>
@@ -3732,7 +5991,7 @@
                     <a:lstStyle/>
                     <a:p>
                       <a:r>
-                        <a:rPr lang="en-GB" dirty="0"/>
+                        <a:rPr lang="en-GB" noProof="0" dirty="0"/>
                         <a:t>Type</a:t>
                       </a:r>
                     </a:p>
@@ -3752,7 +6011,7 @@
                     <a:lstStyle/>
                     <a:p>
                       <a:r>
-                        <a:rPr lang="en-GB" dirty="0"/>
+                        <a:rPr lang="en-GB" noProof="0" dirty="0"/>
                         <a:t>Username</a:t>
                       </a:r>
                     </a:p>
@@ -3765,7 +6024,7 @@
                     <a:lstStyle/>
                     <a:p>
                       <a:r>
-                        <a:rPr lang="en-GB" dirty="0"/>
+                        <a:rPr lang="en-GB" noProof="0" dirty="0"/>
                         <a:t>Char(20)</a:t>
                       </a:r>
                     </a:p>
@@ -3785,10 +6044,10 @@
                     <a:lstStyle/>
                     <a:p>
                       <a:r>
-                        <a:rPr lang="en-GB" dirty="0" err="1"/>
+                        <a:rPr lang="en-GB" noProof="0" dirty="0" err="1"/>
                         <a:t>DateCreated</a:t>
                       </a:r>
-                      <a:endParaRPr lang="en-GB" dirty="0"/>
+                      <a:endParaRPr lang="en-GB" noProof="0" dirty="0"/>
                     </a:p>
                   </a:txBody>
                   <a:tcPr/>
@@ -3799,7 +6058,7 @@
                     <a:lstStyle/>
                     <a:p>
                       <a:r>
-                        <a:rPr lang="en-GB" dirty="0"/>
+                        <a:rPr lang="en-GB" noProof="0" dirty="0"/>
                         <a:t>Date</a:t>
                       </a:r>
                     </a:p>
@@ -3818,7 +6077,7 @@
                     <a:bodyPr/>
                     <a:lstStyle/>
                     <a:p>
-                      <a:endParaRPr lang="en-GB"/>
+                      <a:endParaRPr lang="en-GB" noProof="0" dirty="0"/>
                     </a:p>
                   </a:txBody>
                   <a:tcPr/>
@@ -3828,7 +6087,7 @@
                     <a:bodyPr/>
                     <a:lstStyle/>
                     <a:p>
-                      <a:endParaRPr lang="en-GB"/>
+                      <a:endParaRPr lang="en-GB" noProof="0" dirty="0"/>
                     </a:p>
                   </a:txBody>
                   <a:tcPr/>
@@ -3845,7 +6104,7 @@
                     <a:bodyPr/>
                     <a:lstStyle/>
                     <a:p>
-                      <a:endParaRPr lang="en-GB"/>
+                      <a:endParaRPr lang="en-GB" noProof="0" dirty="0"/>
                     </a:p>
                   </a:txBody>
                   <a:tcPr/>
@@ -3855,7 +6114,7 @@
                     <a:bodyPr/>
                     <a:lstStyle/>
                     <a:p>
-                      <a:endParaRPr lang="en-GB"/>
+                      <a:endParaRPr lang="en-GB" noProof="0" dirty="0"/>
                     </a:p>
                   </a:txBody>
                   <a:tcPr/>
@@ -3872,7 +6131,7 @@
                     <a:bodyPr/>
                     <a:lstStyle/>
                     <a:p>
-                      <a:endParaRPr lang="en-GB"/>
+                      <a:endParaRPr lang="en-GB" noProof="0" dirty="0"/>
                     </a:p>
                   </a:txBody>
                   <a:tcPr/>
@@ -3882,7 +6141,7 @@
                     <a:bodyPr/>
                     <a:lstStyle/>
                     <a:p>
-                      <a:endParaRPr lang="en-GB" dirty="0"/>
+                      <a:endParaRPr lang="en-GB" noProof="0" dirty="0"/>
                     </a:p>
                   </a:txBody>
                   <a:tcPr/>
@@ -3927,44 +6186,9 @@
           <a:p>
             <a:pPr algn="ctr"/>
             <a:r>
-              <a:rPr lang="en-GB" dirty="0"/>
+              <a:rPr lang="en-GB" noProof="0" dirty="0"/>
               <a:t>Users</a:t>
             </a:r>
-          </a:p>
-        </p:txBody>
-      </p:sp>
-      <p:sp>
-        <p:nvSpPr>
-          <p:cNvPr id="75" name="Content Placeholder 74">
-            <a:extLst>
-              <a:ext uri="{FF2B5EF4-FFF2-40B4-BE49-F238E27FC236}">
-                <a16:creationId xmlns:a16="http://schemas.microsoft.com/office/drawing/2014/main" id="{0378450C-A436-0540-7673-280DEF70E967}"/>
-              </a:ext>
-            </a:extLst>
-          </p:cNvPr>
-          <p:cNvSpPr>
-            <a:spLocks noGrp="1"/>
-          </p:cNvSpPr>
-          <p:nvPr>
-            <p:ph idx="1"/>
-          </p:nvPr>
-        </p:nvSpPr>
-        <p:spPr>
-          <a:xfrm>
-            <a:off x="11248101" y="6131244"/>
-            <a:ext cx="105698" cy="45719"/>
-          </a:xfrm>
-        </p:spPr>
-        <p:txBody>
-          <a:bodyPr>
-            <a:normAutofit fontScale="25000" lnSpcReduction="20000"/>
-          </a:bodyPr>
-          <a:lstStyle/>
-          <a:p>
-            <a:pPr marL="0" indent="0">
-              <a:buNone/>
-            </a:pPr>
-            <a:endParaRPr lang="en-GB" dirty="0"/>
           </a:p>
         </p:txBody>
       </p:sp>
@@ -3983,7 +6207,7 @@
           <p:nvPr>
             <p:extLst>
               <p:ext uri="{D42A27DB-BD31-4B8C-83A1-F6EECF244321}">
-                <p14:modId xmlns:p14="http://schemas.microsoft.com/office/powerpoint/2010/main" val="1482190724"/>
+                <p14:modId xmlns:p14="http://schemas.microsoft.com/office/powerpoint/2010/main" val="1184513284"/>
               </p:ext>
             </p:extLst>
           </p:nvPr>
@@ -4021,7 +6245,7 @@
                     <a:lstStyle/>
                     <a:p>
                       <a:r>
-                        <a:rPr lang="en-GB" dirty="0"/>
+                        <a:rPr lang="en-GB" noProof="0" dirty="0"/>
                         <a:t>Fields</a:t>
                       </a:r>
                     </a:p>
@@ -4034,7 +6258,7 @@
                     <a:lstStyle/>
                     <a:p>
                       <a:r>
-                        <a:rPr lang="en-GB" dirty="0"/>
+                        <a:rPr lang="en-GB" noProof="0" dirty="0"/>
                         <a:t>Type</a:t>
                       </a:r>
                     </a:p>
@@ -4054,7 +6278,7 @@
                     <a:lstStyle/>
                     <a:p>
                       <a:r>
-                        <a:rPr lang="en-GB" dirty="0"/>
+                        <a:rPr lang="en-GB" noProof="0" dirty="0"/>
                         <a:t>Title</a:t>
                       </a:r>
                     </a:p>
@@ -4067,7 +6291,7 @@
                     <a:lstStyle/>
                     <a:p>
                       <a:r>
-                        <a:rPr lang="en-GB" dirty="0"/>
+                        <a:rPr lang="en-GB" noProof="0" dirty="0"/>
                         <a:t>Char(40)</a:t>
                       </a:r>
                     </a:p>
@@ -4087,7 +6311,7 @@
                     <a:lstStyle/>
                     <a:p>
                       <a:r>
-                        <a:rPr lang="en-GB" dirty="0"/>
+                        <a:rPr lang="en-GB" noProof="0" dirty="0"/>
                         <a:t>Likes</a:t>
                       </a:r>
                     </a:p>
@@ -4100,7 +6324,7 @@
                     <a:lstStyle/>
                     <a:p>
                       <a:r>
-                        <a:rPr lang="en-GB" dirty="0"/>
+                        <a:rPr lang="en-GB" noProof="0" dirty="0"/>
                         <a:t>Integer</a:t>
                       </a:r>
                     </a:p>
@@ -4120,7 +6344,7 @@
                     <a:lstStyle/>
                     <a:p>
                       <a:r>
-                        <a:rPr lang="en-GB" dirty="0"/>
+                        <a:rPr lang="en-GB" noProof="0" dirty="0"/>
                         <a:t>Dislikes</a:t>
                       </a:r>
                     </a:p>
@@ -4133,10 +6357,9 @@
                     <a:lstStyle/>
                     <a:p>
                       <a:r>
-                        <a:rPr lang="en-GB"/>
+                        <a:rPr lang="en-GB" noProof="0" dirty="0"/>
                         <a:t>Integer</a:t>
                       </a:r>
-                      <a:endParaRPr lang="en-GB" dirty="0"/>
                     </a:p>
                   </a:txBody>
                   <a:tcPr/>
@@ -4154,7 +6377,7 @@
                     <a:lstStyle/>
                     <a:p>
                       <a:r>
-                        <a:rPr lang="en-GB" dirty="0"/>
+                        <a:rPr lang="en-GB" noProof="0" dirty="0"/>
                         <a:t>Followers</a:t>
                       </a:r>
                     </a:p>
@@ -4167,7 +6390,7 @@
                     <a:lstStyle/>
                     <a:p>
                       <a:r>
-                        <a:rPr lang="en-GB" dirty="0"/>
+                        <a:rPr lang="en-GB" noProof="0" dirty="0"/>
                         <a:t>Integer</a:t>
                       </a:r>
                     </a:p>
@@ -4187,10 +6410,10 @@
                     <a:lstStyle/>
                     <a:p>
                       <a:r>
-                        <a:rPr lang="en-GB" dirty="0" err="1"/>
+                        <a:rPr lang="en-GB" noProof="0" dirty="0" err="1"/>
                         <a:t>CoverArt</a:t>
                       </a:r>
-                      <a:endParaRPr lang="en-GB" dirty="0"/>
+                      <a:endParaRPr lang="en-GB" noProof="0" dirty="0"/>
                     </a:p>
                   </a:txBody>
                   <a:tcPr/>
@@ -4201,7 +6424,7 @@
                     <a:lstStyle/>
                     <a:p>
                       <a:r>
-                        <a:rPr lang="en-GB" dirty="0"/>
+                        <a:rPr lang="en-GB" noProof="0" dirty="0"/>
                         <a:t>Image</a:t>
                       </a:r>
                     </a:p>
@@ -4221,10 +6444,10 @@
                     <a:lstStyle/>
                     <a:p>
                       <a:r>
-                        <a:rPr lang="en-GB" dirty="0" err="1"/>
+                        <a:rPr lang="en-GB" noProof="0" dirty="0" err="1"/>
                         <a:t>UploaderUsername</a:t>
                       </a:r>
-                      <a:endParaRPr lang="en-GB" dirty="0"/>
+                      <a:endParaRPr lang="en-GB" noProof="0" dirty="0"/>
                     </a:p>
                   </a:txBody>
                   <a:tcPr/>
@@ -4235,7 +6458,7 @@
                     <a:lstStyle/>
                     <a:p>
                       <a:r>
-                        <a:rPr lang="en-GB" dirty="0"/>
+                        <a:rPr lang="en-GB" noProof="0" dirty="0"/>
                         <a:t>Char(20)</a:t>
                       </a:r>
                     </a:p>
@@ -4255,10 +6478,10 @@
                     <a:lstStyle/>
                     <a:p>
                       <a:r>
-                        <a:rPr lang="en-GB" dirty="0" err="1"/>
+                        <a:rPr lang="en-GB" noProof="0" dirty="0" err="1"/>
                         <a:t>UploadDate</a:t>
                       </a:r>
-                      <a:endParaRPr lang="en-GB" dirty="0"/>
+                      <a:endParaRPr lang="en-GB" noProof="0" dirty="0"/>
                     </a:p>
                   </a:txBody>
                   <a:tcPr/>
@@ -4269,7 +6492,7 @@
                     <a:lstStyle/>
                     <a:p>
                       <a:r>
-                        <a:rPr lang="en-GB" dirty="0"/>
+                        <a:rPr lang="en-GB" noProof="0" dirty="0"/>
                         <a:t>Date</a:t>
                       </a:r>
                     </a:p>
@@ -4289,7 +6512,7 @@
                     <a:lstStyle/>
                     <a:p>
                       <a:r>
-                        <a:rPr lang="en-GB" dirty="0"/>
+                        <a:rPr lang="en-GB" noProof="0" dirty="0"/>
                         <a:t>Views</a:t>
                       </a:r>
                     </a:p>
@@ -4302,7 +6525,7 @@
                     <a:lstStyle/>
                     <a:p>
                       <a:r>
-                        <a:rPr lang="en-GB" dirty="0"/>
+                        <a:rPr lang="en-GB" noProof="0" dirty="0"/>
                         <a:t>Integer</a:t>
                       </a:r>
                     </a:p>
@@ -4349,7 +6572,7 @@
           <a:p>
             <a:pPr algn="ctr"/>
             <a:r>
-              <a:rPr lang="en-GB" dirty="0"/>
+              <a:rPr lang="en-GB" noProof="0" dirty="0"/>
               <a:t>Albums</a:t>
             </a:r>
           </a:p>
@@ -4370,7 +6593,7 @@
           <p:nvPr>
             <p:extLst>
               <p:ext uri="{D42A27DB-BD31-4B8C-83A1-F6EECF244321}">
-                <p14:modId xmlns:p14="http://schemas.microsoft.com/office/powerpoint/2010/main" val="1165967550"/>
+                <p14:modId xmlns:p14="http://schemas.microsoft.com/office/powerpoint/2010/main" val="3900862724"/>
               </p:ext>
             </p:extLst>
           </p:nvPr>
@@ -4408,7 +6631,7 @@
                     <a:lstStyle/>
                     <a:p>
                       <a:r>
-                        <a:rPr lang="en-GB" dirty="0"/>
+                        <a:rPr lang="en-GB" noProof="0" dirty="0"/>
                         <a:t>Fields</a:t>
                       </a:r>
                     </a:p>
@@ -4421,7 +6644,7 @@
                     <a:lstStyle/>
                     <a:p>
                       <a:r>
-                        <a:rPr lang="en-GB" dirty="0"/>
+                        <a:rPr lang="en-GB" noProof="0" dirty="0"/>
                         <a:t>Type</a:t>
                       </a:r>
                     </a:p>
@@ -4441,7 +6664,7 @@
                     <a:lstStyle/>
                     <a:p>
                       <a:r>
-                        <a:rPr lang="en-GB" dirty="0"/>
+                        <a:rPr lang="en-GB" noProof="0" dirty="0"/>
                         <a:t>Text</a:t>
                       </a:r>
                     </a:p>
@@ -4454,8 +6677,8 @@
                     <a:lstStyle/>
                     <a:p>
                       <a:r>
-                        <a:rPr lang="en-GB" dirty="0"/>
-                        <a:t>Char(128)</a:t>
+                        <a:rPr lang="en-GB" noProof="0" dirty="0"/>
+                        <a:t>Char(255)</a:t>
                       </a:r>
                     </a:p>
                   </a:txBody>
@@ -4474,7 +6697,7 @@
                     <a:lstStyle/>
                     <a:p>
                       <a:r>
-                        <a:rPr lang="en-GB" dirty="0"/>
+                        <a:rPr lang="en-GB" noProof="0" dirty="0"/>
                         <a:t>Username</a:t>
                       </a:r>
                     </a:p>
@@ -4487,7 +6710,7 @@
                     <a:lstStyle/>
                     <a:p>
                       <a:r>
-                        <a:rPr lang="en-GB" dirty="0"/>
+                        <a:rPr lang="en-GB" noProof="0" dirty="0"/>
                         <a:t>Char(20)</a:t>
                       </a:r>
                     </a:p>
@@ -4507,10 +6730,10 @@
                     <a:lstStyle/>
                     <a:p>
                       <a:r>
-                        <a:rPr lang="en-GB" dirty="0" err="1"/>
+                        <a:rPr lang="en-GB" noProof="0" dirty="0" err="1"/>
                         <a:t>AlbumTitle</a:t>
                       </a:r>
-                      <a:endParaRPr lang="en-GB" dirty="0"/>
+                      <a:endParaRPr lang="en-GB" noProof="0" dirty="0"/>
                     </a:p>
                   </a:txBody>
                   <a:tcPr/>
@@ -4521,7 +6744,7 @@
                     <a:lstStyle/>
                     <a:p>
                       <a:r>
-                        <a:rPr lang="en-GB" dirty="0"/>
+                        <a:rPr lang="en-GB" noProof="0" dirty="0"/>
                         <a:t>Char(40)</a:t>
                       </a:r>
                     </a:p>
@@ -4540,7 +6763,7 @@
                     <a:bodyPr/>
                     <a:lstStyle/>
                     <a:p>
-                      <a:endParaRPr lang="en-GB"/>
+                      <a:endParaRPr lang="en-GB" noProof="0" dirty="0"/>
                     </a:p>
                   </a:txBody>
                   <a:tcPr/>
@@ -4550,7 +6773,7 @@
                     <a:bodyPr/>
                     <a:lstStyle/>
                     <a:p>
-                      <a:endParaRPr lang="en-GB"/>
+                      <a:endParaRPr lang="en-GB" noProof="0" dirty="0"/>
                     </a:p>
                   </a:txBody>
                   <a:tcPr/>
@@ -4567,7 +6790,7 @@
                     <a:bodyPr/>
                     <a:lstStyle/>
                     <a:p>
-                      <a:endParaRPr lang="en-GB"/>
+                      <a:endParaRPr lang="en-GB" noProof="0" dirty="0"/>
                     </a:p>
                   </a:txBody>
                   <a:tcPr/>
@@ -4577,7 +6800,7 @@
                     <a:bodyPr/>
                     <a:lstStyle/>
                     <a:p>
-                      <a:endParaRPr lang="en-GB" dirty="0"/>
+                      <a:endParaRPr lang="en-GB" noProof="0" dirty="0"/>
                     </a:p>
                   </a:txBody>
                   <a:tcPr/>
@@ -4622,7 +6845,7 @@
           <a:p>
             <a:pPr algn="ctr"/>
             <a:r>
-              <a:rPr lang="en-GB" dirty="0"/>
+              <a:rPr lang="en-GB" noProof="0" dirty="0"/>
               <a:t>Comments</a:t>
             </a:r>
           </a:p>
@@ -4679,7 +6902,7 @@
           <a:p>
             <a:pPr algn="ctr"/>
             <a:r>
-              <a:rPr lang="en-GB" dirty="0">
+              <a:rPr lang="en-GB" noProof="0" dirty="0">
                 <a:ln w="0"/>
                 <a:solidFill>
                   <a:schemeClr val="tx1"/>

</xml_diff>

<commit_message>
Site Map and URL Design
</commit_message>
<xml_diff>
--- a/WAD2 Group Project Design Spec.pptx
+++ b/WAD2 Group Project Design Spec.pptx
@@ -11,6 +11,8 @@
     <p:sldId id="258" r:id="rId5"/>
     <p:sldId id="261" r:id="rId6"/>
     <p:sldId id="259" r:id="rId7"/>
+    <p:sldId id="262" r:id="rId8"/>
+    <p:sldId id="263" r:id="rId9"/>
   </p:sldIdLst>
   <p:sldSz cx="12192000" cy="6858000"/>
   <p:notesSz cx="6858000" cy="9144000"/>
@@ -346,7 +348,7 @@
           <a:p>
             <a:fld id="{386EAC6E-8ADC-498C-8D78-A1467B1978D3}" type="datetimeFigureOut">
               <a:rPr lang="en-GB" smtClean="0"/>
-              <a:t>22/02/2025</a:t>
+              <a:t>25/02/2025</a:t>
             </a:fld>
             <a:endParaRPr lang="en-GB"/>
           </a:p>
@@ -680,7 +682,7 @@
           <a:p>
             <a:fld id="{386EAC6E-8ADC-498C-8D78-A1467B1978D3}" type="datetimeFigureOut">
               <a:rPr lang="en-GB" smtClean="0"/>
-              <a:t>22/02/2025</a:t>
+              <a:t>25/02/2025</a:t>
             </a:fld>
             <a:endParaRPr lang="en-GB"/>
           </a:p>
@@ -958,7 +960,7 @@
           <a:p>
             <a:fld id="{386EAC6E-8ADC-498C-8D78-A1467B1978D3}" type="datetimeFigureOut">
               <a:rPr lang="en-GB" smtClean="0"/>
-              <a:t>22/02/2025</a:t>
+              <a:t>25/02/2025</a:t>
             </a:fld>
             <a:endParaRPr lang="en-GB"/>
           </a:p>
@@ -1526,7 +1528,7 @@
           <a:p>
             <a:fld id="{386EAC6E-8ADC-498C-8D78-A1467B1978D3}" type="datetimeFigureOut">
               <a:rPr lang="en-GB" smtClean="0"/>
-              <a:t>22/02/2025</a:t>
+              <a:t>25/02/2025</a:t>
             </a:fld>
             <a:endParaRPr lang="en-GB"/>
           </a:p>
@@ -1804,7 +1806,7 @@
           <a:p>
             <a:fld id="{386EAC6E-8ADC-498C-8D78-A1467B1978D3}" type="datetimeFigureOut">
               <a:rPr lang="en-GB" smtClean="0"/>
-              <a:t>22/02/2025</a:t>
+              <a:t>25/02/2025</a:t>
             </a:fld>
             <a:endParaRPr lang="en-GB"/>
           </a:p>
@@ -2366,7 +2368,7 @@
           <a:p>
             <a:fld id="{386EAC6E-8ADC-498C-8D78-A1467B1978D3}" type="datetimeFigureOut">
               <a:rPr lang="en-GB" smtClean="0"/>
-              <a:t>22/02/2025</a:t>
+              <a:t>25/02/2025</a:t>
             </a:fld>
             <a:endParaRPr lang="en-GB"/>
           </a:p>
@@ -2693,7 +2695,7 @@
           <a:p>
             <a:fld id="{386EAC6E-8ADC-498C-8D78-A1467B1978D3}" type="datetimeFigureOut">
               <a:rPr lang="en-GB" smtClean="0"/>
-              <a:t>22/02/2025</a:t>
+              <a:t>25/02/2025</a:t>
             </a:fld>
             <a:endParaRPr lang="en-GB"/>
           </a:p>
@@ -2870,7 +2872,7 @@
           <a:p>
             <a:fld id="{386EAC6E-8ADC-498C-8D78-A1467B1978D3}" type="datetimeFigureOut">
               <a:rPr lang="en-GB" smtClean="0"/>
-              <a:t>22/02/2025</a:t>
+              <a:t>25/02/2025</a:t>
             </a:fld>
             <a:endParaRPr lang="en-GB"/>
           </a:p>
@@ -3108,7 +3110,7 @@
           <a:p>
             <a:fld id="{386EAC6E-8ADC-498C-8D78-A1467B1978D3}" type="datetimeFigureOut">
               <a:rPr lang="en-GB" smtClean="0"/>
-              <a:t>22/02/2025</a:t>
+              <a:t>25/02/2025</a:t>
             </a:fld>
             <a:endParaRPr lang="en-GB"/>
           </a:p>
@@ -3308,7 +3310,7 @@
           <a:p>
             <a:fld id="{386EAC6E-8ADC-498C-8D78-A1467B1978D3}" type="datetimeFigureOut">
               <a:rPr lang="en-GB" smtClean="0"/>
-              <a:t>22/02/2025</a:t>
+              <a:t>25/02/2025</a:t>
             </a:fld>
             <a:endParaRPr lang="en-GB"/>
           </a:p>
@@ -3584,7 +3586,7 @@
           <a:p>
             <a:fld id="{386EAC6E-8ADC-498C-8D78-A1467B1978D3}" type="datetimeFigureOut">
               <a:rPr lang="en-GB" smtClean="0"/>
-              <a:t>22/02/2025</a:t>
+              <a:t>25/02/2025</a:t>
             </a:fld>
             <a:endParaRPr lang="en-GB"/>
           </a:p>
@@ -3850,7 +3852,7 @@
           <a:p>
             <a:fld id="{386EAC6E-8ADC-498C-8D78-A1467B1978D3}" type="datetimeFigureOut">
               <a:rPr lang="en-GB" smtClean="0"/>
-              <a:t>22/02/2025</a:t>
+              <a:t>25/02/2025</a:t>
             </a:fld>
             <a:endParaRPr lang="en-GB"/>
           </a:p>
@@ -4224,7 +4226,7 @@
           <a:p>
             <a:fld id="{386EAC6E-8ADC-498C-8D78-A1467B1978D3}" type="datetimeFigureOut">
               <a:rPr lang="en-GB" smtClean="0"/>
-              <a:t>22/02/2025</a:t>
+              <a:t>25/02/2025</a:t>
             </a:fld>
             <a:endParaRPr lang="en-GB"/>
           </a:p>
@@ -4372,7 +4374,7 @@
           <a:p>
             <a:fld id="{386EAC6E-8ADC-498C-8D78-A1467B1978D3}" type="datetimeFigureOut">
               <a:rPr lang="en-GB" smtClean="0"/>
-              <a:t>22/02/2025</a:t>
+              <a:t>25/02/2025</a:t>
             </a:fld>
             <a:endParaRPr lang="en-GB"/>
           </a:p>
@@ -4497,7 +4499,7 @@
           <a:p>
             <a:fld id="{386EAC6E-8ADC-498C-8D78-A1467B1978D3}" type="datetimeFigureOut">
               <a:rPr lang="en-GB" smtClean="0"/>
-              <a:t>22/02/2025</a:t>
+              <a:t>25/02/2025</a:t>
             </a:fld>
             <a:endParaRPr lang="en-GB"/>
           </a:p>
@@ -4782,7 +4784,7 @@
           <a:p>
             <a:fld id="{386EAC6E-8ADC-498C-8D78-A1467B1978D3}" type="datetimeFigureOut">
               <a:rPr lang="en-GB" smtClean="0"/>
-              <a:t>22/02/2025</a:t>
+              <a:t>25/02/2025</a:t>
             </a:fld>
             <a:endParaRPr lang="en-GB"/>
           </a:p>
@@ -5106,7 +5108,7 @@
           <a:p>
             <a:fld id="{386EAC6E-8ADC-498C-8D78-A1467B1978D3}" type="datetimeFigureOut">
               <a:rPr lang="en-GB" smtClean="0"/>
-              <a:t>22/02/2025</a:t>
+              <a:t>25/02/2025</a:t>
             </a:fld>
             <a:endParaRPr lang="en-GB"/>
           </a:p>
@@ -5320,7 +5322,7 @@
           <a:p>
             <a:fld id="{386EAC6E-8ADC-498C-8D78-A1467B1978D3}" type="datetimeFigureOut">
               <a:rPr lang="en-GB" smtClean="0"/>
-              <a:t>22/02/2025</a:t>
+              <a:t>25/02/2025</a:t>
             </a:fld>
             <a:endParaRPr lang="en-GB"/>
           </a:p>
@@ -9474,6 +9476,740 @@
 </p:sld>
 </file>
 
+<file path=ppt/slides/slide7.xml><?xml version="1.0" encoding="utf-8"?>
+<p:sld xmlns:a="http://schemas.openxmlformats.org/drawingml/2006/main" xmlns:r="http://schemas.openxmlformats.org/officeDocument/2006/relationships" xmlns:p="http://schemas.openxmlformats.org/presentationml/2006/main">
+  <p:cSld>
+    <p:spTree>
+      <p:nvGrpSpPr>
+        <p:cNvPr id="1" name=""/>
+        <p:cNvGrpSpPr/>
+        <p:nvPr/>
+      </p:nvGrpSpPr>
+      <p:grpSpPr>
+        <a:xfrm>
+          <a:off x="0" y="0"/>
+          <a:ext cx="0" cy="0"/>
+          <a:chOff x="0" y="0"/>
+          <a:chExt cx="0" cy="0"/>
+        </a:xfrm>
+      </p:grpSpPr>
+      <p:sp>
+        <p:nvSpPr>
+          <p:cNvPr id="2" name="Title 1">
+            <a:extLst>
+              <a:ext uri="{FF2B5EF4-FFF2-40B4-BE49-F238E27FC236}">
+                <a16:creationId xmlns:a16="http://schemas.microsoft.com/office/drawing/2014/main" id="{7471175A-2D75-780B-F248-8195BFE9D53C}"/>
+              </a:ext>
+            </a:extLst>
+          </p:cNvPr>
+          <p:cNvSpPr>
+            <a:spLocks noGrp="1"/>
+          </p:cNvSpPr>
+          <p:nvPr>
+            <p:ph type="title"/>
+          </p:nvPr>
+        </p:nvSpPr>
+        <p:spPr/>
+        <p:txBody>
+          <a:bodyPr/>
+          <a:lstStyle/>
+          <a:p>
+            <a:r>
+              <a:rPr lang="en-GB" dirty="0"/>
+              <a:t>Site map</a:t>
+            </a:r>
+          </a:p>
+        </p:txBody>
+      </p:sp>
+      <p:sp>
+        <p:nvSpPr>
+          <p:cNvPr id="3" name="Content Placeholder 2">
+            <a:extLst>
+              <a:ext uri="{FF2B5EF4-FFF2-40B4-BE49-F238E27FC236}">
+                <a16:creationId xmlns:a16="http://schemas.microsoft.com/office/drawing/2014/main" id="{2E5EEE34-7970-9F40-61F1-D7F05A913003}"/>
+              </a:ext>
+            </a:extLst>
+          </p:cNvPr>
+          <p:cNvSpPr>
+            <a:spLocks noGrp="1"/>
+          </p:cNvSpPr>
+          <p:nvPr>
+            <p:ph idx="1"/>
+          </p:nvPr>
+        </p:nvSpPr>
+        <p:spPr>
+          <a:xfrm flipV="1">
+            <a:off x="13556227" y="3098255"/>
+            <a:ext cx="45719" cy="76200"/>
+          </a:xfrm>
+        </p:spPr>
+        <p:txBody>
+          <a:bodyPr>
+            <a:normAutofit fontScale="25000" lnSpcReduction="20000"/>
+          </a:bodyPr>
+          <a:lstStyle/>
+          <a:p>
+            <a:endParaRPr lang="en-GB" dirty="0"/>
+          </a:p>
+        </p:txBody>
+      </p:sp>
+      <p:sp>
+        <p:nvSpPr>
+          <p:cNvPr id="4" name="Rectangle 3">
+            <a:extLst>
+              <a:ext uri="{FF2B5EF4-FFF2-40B4-BE49-F238E27FC236}">
+                <a16:creationId xmlns:a16="http://schemas.microsoft.com/office/drawing/2014/main" id="{1C186EF5-6F08-13ED-DF99-17C5E2BB352B}"/>
+              </a:ext>
+            </a:extLst>
+          </p:cNvPr>
+          <p:cNvSpPr/>
+          <p:nvPr/>
+        </p:nvSpPr>
+        <p:spPr>
+          <a:xfrm>
+            <a:off x="5481486" y="2027631"/>
+            <a:ext cx="1474839" cy="588843"/>
+          </a:xfrm>
+          <a:prstGeom prst="rect">
+            <a:avLst/>
+          </a:prstGeom>
+        </p:spPr>
+        <p:style>
+          <a:lnRef idx="2">
+            <a:schemeClr val="accent1">
+              <a:shade val="15000"/>
+            </a:schemeClr>
+          </a:lnRef>
+          <a:fillRef idx="1">
+            <a:schemeClr val="accent1"/>
+          </a:fillRef>
+          <a:effectRef idx="0">
+            <a:schemeClr val="accent1"/>
+          </a:effectRef>
+          <a:fontRef idx="minor">
+            <a:schemeClr val="lt1"/>
+          </a:fontRef>
+        </p:style>
+        <p:txBody>
+          <a:bodyPr rtlCol="0" anchor="ctr"/>
+          <a:lstStyle/>
+          <a:p>
+            <a:pPr algn="ctr"/>
+            <a:r>
+              <a:rPr lang="en-GB" dirty="0"/>
+              <a:t>Home Page</a:t>
+            </a:r>
+          </a:p>
+        </p:txBody>
+      </p:sp>
+      <p:sp>
+        <p:nvSpPr>
+          <p:cNvPr id="5" name="Rectangle 4">
+            <a:extLst>
+              <a:ext uri="{FF2B5EF4-FFF2-40B4-BE49-F238E27FC236}">
+                <a16:creationId xmlns:a16="http://schemas.microsoft.com/office/drawing/2014/main" id="{4F7FAB3E-5EE8-7162-A178-073ACF603C44}"/>
+              </a:ext>
+            </a:extLst>
+          </p:cNvPr>
+          <p:cNvSpPr/>
+          <p:nvPr/>
+        </p:nvSpPr>
+        <p:spPr>
+          <a:xfrm>
+            <a:off x="879987" y="3309648"/>
+            <a:ext cx="1474839" cy="588843"/>
+          </a:xfrm>
+          <a:prstGeom prst="rect">
+            <a:avLst/>
+          </a:prstGeom>
+        </p:spPr>
+        <p:style>
+          <a:lnRef idx="2">
+            <a:schemeClr val="accent1">
+              <a:shade val="15000"/>
+            </a:schemeClr>
+          </a:lnRef>
+          <a:fillRef idx="1">
+            <a:schemeClr val="accent1"/>
+          </a:fillRef>
+          <a:effectRef idx="0">
+            <a:schemeClr val="accent1"/>
+          </a:effectRef>
+          <a:fontRef idx="minor">
+            <a:schemeClr val="lt1"/>
+          </a:fontRef>
+        </p:style>
+        <p:txBody>
+          <a:bodyPr rtlCol="0" anchor="ctr"/>
+          <a:lstStyle/>
+          <a:p>
+            <a:pPr algn="ctr"/>
+            <a:r>
+              <a:rPr lang="en-GB" dirty="0"/>
+              <a:t>Sign Up</a:t>
+            </a:r>
+          </a:p>
+        </p:txBody>
+      </p:sp>
+      <p:sp>
+        <p:nvSpPr>
+          <p:cNvPr id="6" name="Rectangle 5">
+            <a:extLst>
+              <a:ext uri="{FF2B5EF4-FFF2-40B4-BE49-F238E27FC236}">
+                <a16:creationId xmlns:a16="http://schemas.microsoft.com/office/drawing/2014/main" id="{9CF68EA2-35DE-3A4C-1564-1CE2501A6684}"/>
+              </a:ext>
+            </a:extLst>
+          </p:cNvPr>
+          <p:cNvSpPr/>
+          <p:nvPr/>
+        </p:nvSpPr>
+        <p:spPr>
+          <a:xfrm>
+            <a:off x="3180736" y="3309647"/>
+            <a:ext cx="1474839" cy="588843"/>
+          </a:xfrm>
+          <a:prstGeom prst="rect">
+            <a:avLst/>
+          </a:prstGeom>
+        </p:spPr>
+        <p:style>
+          <a:lnRef idx="2">
+            <a:schemeClr val="accent1">
+              <a:shade val="15000"/>
+            </a:schemeClr>
+          </a:lnRef>
+          <a:fillRef idx="1">
+            <a:schemeClr val="accent1"/>
+          </a:fillRef>
+          <a:effectRef idx="0">
+            <a:schemeClr val="accent1"/>
+          </a:effectRef>
+          <a:fontRef idx="minor">
+            <a:schemeClr val="lt1"/>
+          </a:fontRef>
+        </p:style>
+        <p:txBody>
+          <a:bodyPr rtlCol="0" anchor="ctr"/>
+          <a:lstStyle/>
+          <a:p>
+            <a:pPr algn="ctr"/>
+            <a:r>
+              <a:rPr lang="en-GB" dirty="0"/>
+              <a:t>Login</a:t>
+            </a:r>
+          </a:p>
+        </p:txBody>
+      </p:sp>
+      <p:sp>
+        <p:nvSpPr>
+          <p:cNvPr id="7" name="Rectangle 6">
+            <a:extLst>
+              <a:ext uri="{FF2B5EF4-FFF2-40B4-BE49-F238E27FC236}">
+                <a16:creationId xmlns:a16="http://schemas.microsoft.com/office/drawing/2014/main" id="{9511E68E-42FB-25EA-A112-15FB7E041008}"/>
+              </a:ext>
+            </a:extLst>
+          </p:cNvPr>
+          <p:cNvSpPr/>
+          <p:nvPr/>
+        </p:nvSpPr>
+        <p:spPr>
+          <a:xfrm>
+            <a:off x="5481485" y="3315651"/>
+            <a:ext cx="1474839" cy="588843"/>
+          </a:xfrm>
+          <a:prstGeom prst="rect">
+            <a:avLst/>
+          </a:prstGeom>
+        </p:spPr>
+        <p:style>
+          <a:lnRef idx="2">
+            <a:schemeClr val="accent1">
+              <a:shade val="15000"/>
+            </a:schemeClr>
+          </a:lnRef>
+          <a:fillRef idx="1">
+            <a:schemeClr val="accent1"/>
+          </a:fillRef>
+          <a:effectRef idx="0">
+            <a:schemeClr val="accent1"/>
+          </a:effectRef>
+          <a:fontRef idx="minor">
+            <a:schemeClr val="lt1"/>
+          </a:fontRef>
+        </p:style>
+        <p:txBody>
+          <a:bodyPr rtlCol="0" anchor="ctr"/>
+          <a:lstStyle/>
+          <a:p>
+            <a:pPr algn="ctr"/>
+            <a:r>
+              <a:rPr lang="en-GB" dirty="0"/>
+              <a:t>User Pages</a:t>
+            </a:r>
+          </a:p>
+        </p:txBody>
+      </p:sp>
+      <p:sp>
+        <p:nvSpPr>
+          <p:cNvPr id="8" name="Rectangle 7">
+            <a:extLst>
+              <a:ext uri="{FF2B5EF4-FFF2-40B4-BE49-F238E27FC236}">
+                <a16:creationId xmlns:a16="http://schemas.microsoft.com/office/drawing/2014/main" id="{62C32F1F-ACCA-C186-9355-1B2A2C16E727}"/>
+              </a:ext>
+            </a:extLst>
+          </p:cNvPr>
+          <p:cNvSpPr/>
+          <p:nvPr/>
+        </p:nvSpPr>
+        <p:spPr>
+          <a:xfrm>
+            <a:off x="7733071" y="3309645"/>
+            <a:ext cx="1474839" cy="588843"/>
+          </a:xfrm>
+          <a:prstGeom prst="rect">
+            <a:avLst/>
+          </a:prstGeom>
+        </p:spPr>
+        <p:style>
+          <a:lnRef idx="2">
+            <a:schemeClr val="accent1">
+              <a:shade val="15000"/>
+            </a:schemeClr>
+          </a:lnRef>
+          <a:fillRef idx="1">
+            <a:schemeClr val="accent1"/>
+          </a:fillRef>
+          <a:effectRef idx="0">
+            <a:schemeClr val="accent1"/>
+          </a:effectRef>
+          <a:fontRef idx="minor">
+            <a:schemeClr val="lt1"/>
+          </a:fontRef>
+        </p:style>
+        <p:txBody>
+          <a:bodyPr rtlCol="0" anchor="ctr"/>
+          <a:lstStyle/>
+          <a:p>
+            <a:pPr algn="ctr"/>
+            <a:r>
+              <a:rPr lang="en-GB" dirty="0"/>
+              <a:t>Album Pages</a:t>
+            </a:r>
+          </a:p>
+        </p:txBody>
+      </p:sp>
+      <p:cxnSp>
+        <p:nvCxnSpPr>
+          <p:cNvPr id="10" name="Connector: Elbow 9">
+            <a:extLst>
+              <a:ext uri="{FF2B5EF4-FFF2-40B4-BE49-F238E27FC236}">
+                <a16:creationId xmlns:a16="http://schemas.microsoft.com/office/drawing/2014/main" id="{CBB8E032-2206-5B9F-A4BF-169347293664}"/>
+              </a:ext>
+            </a:extLst>
+          </p:cNvPr>
+          <p:cNvCxnSpPr>
+            <a:stCxn id="4" idx="2"/>
+            <a:endCxn id="6" idx="0"/>
+          </p:cNvCxnSpPr>
+          <p:nvPr/>
+        </p:nvCxnSpPr>
+        <p:spPr>
+          <a:xfrm rot="5400000">
+            <a:off x="4721945" y="1812685"/>
+            <a:ext cx="693173" cy="2300750"/>
+          </a:xfrm>
+          <a:prstGeom prst="bentConnector3">
+            <a:avLst/>
+          </a:prstGeom>
+          <a:ln>
+            <a:tailEnd type="triangle"/>
+          </a:ln>
+        </p:spPr>
+        <p:style>
+          <a:lnRef idx="1">
+            <a:schemeClr val="accent1"/>
+          </a:lnRef>
+          <a:fillRef idx="0">
+            <a:schemeClr val="accent1"/>
+          </a:fillRef>
+          <a:effectRef idx="0">
+            <a:schemeClr val="accent1"/>
+          </a:effectRef>
+          <a:fontRef idx="minor">
+            <a:schemeClr val="tx1"/>
+          </a:fontRef>
+        </p:style>
+      </p:cxnSp>
+      <p:cxnSp>
+        <p:nvCxnSpPr>
+          <p:cNvPr id="12" name="Connector: Elbow 11">
+            <a:extLst>
+              <a:ext uri="{FF2B5EF4-FFF2-40B4-BE49-F238E27FC236}">
+                <a16:creationId xmlns:a16="http://schemas.microsoft.com/office/drawing/2014/main" id="{E1F0AE37-D261-4149-53B0-8C7BFEA787E3}"/>
+              </a:ext>
+            </a:extLst>
+          </p:cNvPr>
+          <p:cNvCxnSpPr>
+            <a:stCxn id="4" idx="2"/>
+            <a:endCxn id="5" idx="0"/>
+          </p:cNvCxnSpPr>
+          <p:nvPr/>
+        </p:nvCxnSpPr>
+        <p:spPr>
+          <a:xfrm rot="5400000">
+            <a:off x="3571570" y="662312"/>
+            <a:ext cx="693174" cy="4601499"/>
+          </a:xfrm>
+          <a:prstGeom prst="bentConnector3">
+            <a:avLst/>
+          </a:prstGeom>
+          <a:ln>
+            <a:tailEnd type="triangle"/>
+          </a:ln>
+        </p:spPr>
+        <p:style>
+          <a:lnRef idx="1">
+            <a:schemeClr val="accent1"/>
+          </a:lnRef>
+          <a:fillRef idx="0">
+            <a:schemeClr val="accent1"/>
+          </a:fillRef>
+          <a:effectRef idx="0">
+            <a:schemeClr val="accent1"/>
+          </a:effectRef>
+          <a:fontRef idx="minor">
+            <a:schemeClr val="tx1"/>
+          </a:fontRef>
+        </p:style>
+      </p:cxnSp>
+      <p:cxnSp>
+        <p:nvCxnSpPr>
+          <p:cNvPr id="14" name="Connector: Elbow 13">
+            <a:extLst>
+              <a:ext uri="{FF2B5EF4-FFF2-40B4-BE49-F238E27FC236}">
+                <a16:creationId xmlns:a16="http://schemas.microsoft.com/office/drawing/2014/main" id="{033F9B51-8A83-FF4F-61D7-E3A483086499}"/>
+              </a:ext>
+            </a:extLst>
+          </p:cNvPr>
+          <p:cNvCxnSpPr>
+            <a:stCxn id="4" idx="2"/>
+            <a:endCxn id="7" idx="0"/>
+          </p:cNvCxnSpPr>
+          <p:nvPr/>
+        </p:nvCxnSpPr>
+        <p:spPr>
+          <a:xfrm rot="5400000">
+            <a:off x="5869318" y="2966062"/>
+            <a:ext cx="699177" cy="1"/>
+          </a:xfrm>
+          <a:prstGeom prst="bentConnector3">
+            <a:avLst/>
+          </a:prstGeom>
+          <a:ln>
+            <a:tailEnd type="triangle"/>
+          </a:ln>
+        </p:spPr>
+        <p:style>
+          <a:lnRef idx="1">
+            <a:schemeClr val="accent1"/>
+          </a:lnRef>
+          <a:fillRef idx="0">
+            <a:schemeClr val="accent1"/>
+          </a:fillRef>
+          <a:effectRef idx="0">
+            <a:schemeClr val="accent1"/>
+          </a:effectRef>
+          <a:fontRef idx="minor">
+            <a:schemeClr val="tx1"/>
+          </a:fontRef>
+        </p:style>
+      </p:cxnSp>
+      <p:cxnSp>
+        <p:nvCxnSpPr>
+          <p:cNvPr id="16" name="Connector: Elbow 15">
+            <a:extLst>
+              <a:ext uri="{FF2B5EF4-FFF2-40B4-BE49-F238E27FC236}">
+                <a16:creationId xmlns:a16="http://schemas.microsoft.com/office/drawing/2014/main" id="{753E242D-2D9B-D86E-A1C4-07CB5E1B65F8}"/>
+              </a:ext>
+            </a:extLst>
+          </p:cNvPr>
+          <p:cNvCxnSpPr>
+            <a:stCxn id="4" idx="2"/>
+            <a:endCxn id="8" idx="0"/>
+          </p:cNvCxnSpPr>
+          <p:nvPr/>
+        </p:nvCxnSpPr>
+        <p:spPr>
+          <a:xfrm rot="16200000" flipH="1">
+            <a:off x="6998113" y="1837266"/>
+            <a:ext cx="693171" cy="2251585"/>
+          </a:xfrm>
+          <a:prstGeom prst="bentConnector3">
+            <a:avLst/>
+          </a:prstGeom>
+          <a:ln>
+            <a:tailEnd type="triangle"/>
+          </a:ln>
+        </p:spPr>
+        <p:style>
+          <a:lnRef idx="1">
+            <a:schemeClr val="accent1"/>
+          </a:lnRef>
+          <a:fillRef idx="0">
+            <a:schemeClr val="accent1"/>
+          </a:fillRef>
+          <a:effectRef idx="0">
+            <a:schemeClr val="accent1"/>
+          </a:effectRef>
+          <a:fontRef idx="minor">
+            <a:schemeClr val="tx1"/>
+          </a:fontRef>
+        </p:style>
+      </p:cxnSp>
+      <p:sp>
+        <p:nvSpPr>
+          <p:cNvPr id="17" name="Rectangle 16">
+            <a:extLst>
+              <a:ext uri="{FF2B5EF4-FFF2-40B4-BE49-F238E27FC236}">
+                <a16:creationId xmlns:a16="http://schemas.microsoft.com/office/drawing/2014/main" id="{B29E7803-F4F1-C773-B575-C7AD39B9B4A9}"/>
+              </a:ext>
+            </a:extLst>
+          </p:cNvPr>
+          <p:cNvSpPr/>
+          <p:nvPr/>
+        </p:nvSpPr>
+        <p:spPr>
+          <a:xfrm>
+            <a:off x="9837173" y="3309644"/>
+            <a:ext cx="1474839" cy="588843"/>
+          </a:xfrm>
+          <a:prstGeom prst="rect">
+            <a:avLst/>
+          </a:prstGeom>
+        </p:spPr>
+        <p:style>
+          <a:lnRef idx="2">
+            <a:schemeClr val="accent1">
+              <a:shade val="15000"/>
+            </a:schemeClr>
+          </a:lnRef>
+          <a:fillRef idx="1">
+            <a:schemeClr val="accent1"/>
+          </a:fillRef>
+          <a:effectRef idx="0">
+            <a:schemeClr val="accent1"/>
+          </a:effectRef>
+          <a:fontRef idx="minor">
+            <a:schemeClr val="lt1"/>
+          </a:fontRef>
+        </p:style>
+        <p:txBody>
+          <a:bodyPr rtlCol="0" anchor="ctr"/>
+          <a:lstStyle/>
+          <a:p>
+            <a:pPr algn="ctr"/>
+            <a:r>
+              <a:rPr lang="en-GB" dirty="0"/>
+              <a:t>Album Pages</a:t>
+            </a:r>
+          </a:p>
+        </p:txBody>
+      </p:sp>
+      <p:cxnSp>
+        <p:nvCxnSpPr>
+          <p:cNvPr id="21" name="Connector: Elbow 20">
+            <a:extLst>
+              <a:ext uri="{FF2B5EF4-FFF2-40B4-BE49-F238E27FC236}">
+                <a16:creationId xmlns:a16="http://schemas.microsoft.com/office/drawing/2014/main" id="{6D4A6A89-F5F6-29FC-D42A-51B582BB79E8}"/>
+              </a:ext>
+            </a:extLst>
+          </p:cNvPr>
+          <p:cNvCxnSpPr>
+            <a:stCxn id="4" idx="2"/>
+            <a:endCxn id="17" idx="0"/>
+          </p:cNvCxnSpPr>
+          <p:nvPr/>
+        </p:nvCxnSpPr>
+        <p:spPr>
+          <a:xfrm rot="16200000" flipH="1">
+            <a:off x="8050164" y="785215"/>
+            <a:ext cx="693170" cy="4355687"/>
+          </a:xfrm>
+          <a:prstGeom prst="bentConnector3">
+            <a:avLst/>
+          </a:prstGeom>
+          <a:ln>
+            <a:tailEnd type="triangle"/>
+          </a:ln>
+        </p:spPr>
+        <p:style>
+          <a:lnRef idx="1">
+            <a:schemeClr val="accent1"/>
+          </a:lnRef>
+          <a:fillRef idx="0">
+            <a:schemeClr val="accent1"/>
+          </a:fillRef>
+          <a:effectRef idx="0">
+            <a:schemeClr val="accent1"/>
+          </a:effectRef>
+          <a:fontRef idx="minor">
+            <a:schemeClr val="tx1"/>
+          </a:fontRef>
+        </p:style>
+      </p:cxnSp>
+    </p:spTree>
+    <p:extLst>
+      <p:ext uri="{BB962C8B-B14F-4D97-AF65-F5344CB8AC3E}">
+        <p14:creationId xmlns:p14="http://schemas.microsoft.com/office/powerpoint/2010/main" val="2951477933"/>
+      </p:ext>
+    </p:extLst>
+  </p:cSld>
+  <p:clrMapOvr>
+    <a:masterClrMapping/>
+  </p:clrMapOvr>
+</p:sld>
+</file>
+
+<file path=ppt/slides/slide8.xml><?xml version="1.0" encoding="utf-8"?>
+<p:sld xmlns:a="http://schemas.openxmlformats.org/drawingml/2006/main" xmlns:r="http://schemas.openxmlformats.org/officeDocument/2006/relationships" xmlns:p="http://schemas.openxmlformats.org/presentationml/2006/main">
+  <p:cSld>
+    <p:spTree>
+      <p:nvGrpSpPr>
+        <p:cNvPr id="1" name=""/>
+        <p:cNvGrpSpPr/>
+        <p:nvPr/>
+      </p:nvGrpSpPr>
+      <p:grpSpPr>
+        <a:xfrm>
+          <a:off x="0" y="0"/>
+          <a:ext cx="0" cy="0"/>
+          <a:chOff x="0" y="0"/>
+          <a:chExt cx="0" cy="0"/>
+        </a:xfrm>
+      </p:grpSpPr>
+      <p:sp>
+        <p:nvSpPr>
+          <p:cNvPr id="2" name="Title 1">
+            <a:extLst>
+              <a:ext uri="{FF2B5EF4-FFF2-40B4-BE49-F238E27FC236}">
+                <a16:creationId xmlns:a16="http://schemas.microsoft.com/office/drawing/2014/main" id="{B732F183-CA58-5F59-347E-EBF07B7CFFE1}"/>
+              </a:ext>
+            </a:extLst>
+          </p:cNvPr>
+          <p:cNvSpPr>
+            <a:spLocks noGrp="1"/>
+          </p:cNvSpPr>
+          <p:nvPr>
+            <p:ph type="title"/>
+          </p:nvPr>
+        </p:nvSpPr>
+        <p:spPr/>
+        <p:txBody>
+          <a:bodyPr/>
+          <a:lstStyle/>
+          <a:p>
+            <a:r>
+              <a:rPr lang="en-GB" dirty="0"/>
+              <a:t>URL DESIGN</a:t>
+            </a:r>
+          </a:p>
+        </p:txBody>
+      </p:sp>
+      <p:sp>
+        <p:nvSpPr>
+          <p:cNvPr id="3" name="Content Placeholder 2">
+            <a:extLst>
+              <a:ext uri="{FF2B5EF4-FFF2-40B4-BE49-F238E27FC236}">
+                <a16:creationId xmlns:a16="http://schemas.microsoft.com/office/drawing/2014/main" id="{20104FFC-57DB-233E-865F-5DCE394E7F0A}"/>
+              </a:ext>
+            </a:extLst>
+          </p:cNvPr>
+          <p:cNvSpPr>
+            <a:spLocks noGrp="1"/>
+          </p:cNvSpPr>
+          <p:nvPr>
+            <p:ph idx="1"/>
+          </p:nvPr>
+        </p:nvSpPr>
+        <p:spPr/>
+        <p:txBody>
+          <a:bodyPr/>
+          <a:lstStyle/>
+          <a:p>
+            <a:r>
+              <a:rPr lang="en-GB" dirty="0"/>
+              <a:t>Home page - /index</a:t>
+            </a:r>
+          </a:p>
+          <a:p>
+            <a:r>
+              <a:rPr lang="en-GB" dirty="0"/>
+              <a:t>Sign Up - /register</a:t>
+            </a:r>
+          </a:p>
+          <a:p>
+            <a:r>
+              <a:rPr lang="en-GB" dirty="0"/>
+              <a:t>Login - /login</a:t>
+            </a:r>
+          </a:p>
+          <a:p>
+            <a:r>
+              <a:rPr lang="en-GB" dirty="0"/>
+              <a:t>User Pages - /user/&lt;</a:t>
+            </a:r>
+            <a:r>
+              <a:rPr lang="en-GB" dirty="0" err="1"/>
+              <a:t>Users.Username</a:t>
+            </a:r>
+            <a:r>
+              <a:rPr lang="en-GB" dirty="0"/>
+              <a:t>&gt;</a:t>
+            </a:r>
+          </a:p>
+          <a:p>
+            <a:r>
+              <a:rPr lang="en-GB" dirty="0"/>
+              <a:t>Album Pages - /album/&lt;</a:t>
+            </a:r>
+            <a:r>
+              <a:rPr lang="en-GB" dirty="0" err="1"/>
+              <a:t>Albums.AlbumTitle</a:t>
+            </a:r>
+            <a:r>
+              <a:rPr lang="en-GB" dirty="0"/>
+              <a:t>&gt;</a:t>
+            </a:r>
+          </a:p>
+          <a:p>
+            <a:r>
+              <a:rPr lang="en-GB" dirty="0"/>
+              <a:t>Search/Filter/Sort Page - </a:t>
+            </a:r>
+            <a:r>
+              <a:rPr lang="en-GB"/>
+              <a:t>/search</a:t>
+            </a:r>
+            <a:endParaRPr lang="en-GB" dirty="0"/>
+          </a:p>
+          <a:p>
+            <a:endParaRPr lang="en-GB" dirty="0"/>
+          </a:p>
+        </p:txBody>
+      </p:sp>
+    </p:spTree>
+    <p:extLst>
+      <p:ext uri="{BB962C8B-B14F-4D97-AF65-F5344CB8AC3E}">
+        <p14:creationId xmlns:p14="http://schemas.microsoft.com/office/powerpoint/2010/main" val="2875610521"/>
+      </p:ext>
+    </p:extLst>
+  </p:cSld>
+  <p:clrMapOvr>
+    <a:masterClrMapping/>
+  </p:clrMapOvr>
+</p:sld>
+</file>
+
 <file path=ppt/theme/theme1.xml><?xml version="1.0" encoding="utf-8"?>
 <a:theme xmlns:a="http://schemas.openxmlformats.org/drawingml/2006/main" name="Celestial">
   <a:themeElements>

</xml_diff>

<commit_message>
Additions to Site Map and URL Design
</commit_message>
<xml_diff>
--- a/WAD2 Group Project Design Spec.pptx
+++ b/WAD2 Group Project Design Spec.pptx
@@ -348,7 +348,7 @@
           <a:p>
             <a:fld id="{386EAC6E-8ADC-498C-8D78-A1467B1978D3}" type="datetimeFigureOut">
               <a:rPr lang="en-GB" smtClean="0"/>
-              <a:t>25/02/2025</a:t>
+              <a:t>26/02/2025</a:t>
             </a:fld>
             <a:endParaRPr lang="en-GB"/>
           </a:p>
@@ -682,7 +682,7 @@
           <a:p>
             <a:fld id="{386EAC6E-8ADC-498C-8D78-A1467B1978D3}" type="datetimeFigureOut">
               <a:rPr lang="en-GB" smtClean="0"/>
-              <a:t>25/02/2025</a:t>
+              <a:t>26/02/2025</a:t>
             </a:fld>
             <a:endParaRPr lang="en-GB"/>
           </a:p>
@@ -960,7 +960,7 @@
           <a:p>
             <a:fld id="{386EAC6E-8ADC-498C-8D78-A1467B1978D3}" type="datetimeFigureOut">
               <a:rPr lang="en-GB" smtClean="0"/>
-              <a:t>25/02/2025</a:t>
+              <a:t>26/02/2025</a:t>
             </a:fld>
             <a:endParaRPr lang="en-GB"/>
           </a:p>
@@ -1528,7 +1528,7 @@
           <a:p>
             <a:fld id="{386EAC6E-8ADC-498C-8D78-A1467B1978D3}" type="datetimeFigureOut">
               <a:rPr lang="en-GB" smtClean="0"/>
-              <a:t>25/02/2025</a:t>
+              <a:t>26/02/2025</a:t>
             </a:fld>
             <a:endParaRPr lang="en-GB"/>
           </a:p>
@@ -1806,7 +1806,7 @@
           <a:p>
             <a:fld id="{386EAC6E-8ADC-498C-8D78-A1467B1978D3}" type="datetimeFigureOut">
               <a:rPr lang="en-GB" smtClean="0"/>
-              <a:t>25/02/2025</a:t>
+              <a:t>26/02/2025</a:t>
             </a:fld>
             <a:endParaRPr lang="en-GB"/>
           </a:p>
@@ -2368,7 +2368,7 @@
           <a:p>
             <a:fld id="{386EAC6E-8ADC-498C-8D78-A1467B1978D3}" type="datetimeFigureOut">
               <a:rPr lang="en-GB" smtClean="0"/>
-              <a:t>25/02/2025</a:t>
+              <a:t>26/02/2025</a:t>
             </a:fld>
             <a:endParaRPr lang="en-GB"/>
           </a:p>
@@ -2695,7 +2695,7 @@
           <a:p>
             <a:fld id="{386EAC6E-8ADC-498C-8D78-A1467B1978D3}" type="datetimeFigureOut">
               <a:rPr lang="en-GB" smtClean="0"/>
-              <a:t>25/02/2025</a:t>
+              <a:t>26/02/2025</a:t>
             </a:fld>
             <a:endParaRPr lang="en-GB"/>
           </a:p>
@@ -2872,7 +2872,7 @@
           <a:p>
             <a:fld id="{386EAC6E-8ADC-498C-8D78-A1467B1978D3}" type="datetimeFigureOut">
               <a:rPr lang="en-GB" smtClean="0"/>
-              <a:t>25/02/2025</a:t>
+              <a:t>26/02/2025</a:t>
             </a:fld>
             <a:endParaRPr lang="en-GB"/>
           </a:p>
@@ -3110,7 +3110,7 @@
           <a:p>
             <a:fld id="{386EAC6E-8ADC-498C-8D78-A1467B1978D3}" type="datetimeFigureOut">
               <a:rPr lang="en-GB" smtClean="0"/>
-              <a:t>25/02/2025</a:t>
+              <a:t>26/02/2025</a:t>
             </a:fld>
             <a:endParaRPr lang="en-GB"/>
           </a:p>
@@ -3310,7 +3310,7 @@
           <a:p>
             <a:fld id="{386EAC6E-8ADC-498C-8D78-A1467B1978D3}" type="datetimeFigureOut">
               <a:rPr lang="en-GB" smtClean="0"/>
-              <a:t>25/02/2025</a:t>
+              <a:t>26/02/2025</a:t>
             </a:fld>
             <a:endParaRPr lang="en-GB"/>
           </a:p>
@@ -3586,7 +3586,7 @@
           <a:p>
             <a:fld id="{386EAC6E-8ADC-498C-8D78-A1467B1978D3}" type="datetimeFigureOut">
               <a:rPr lang="en-GB" smtClean="0"/>
-              <a:t>25/02/2025</a:t>
+              <a:t>26/02/2025</a:t>
             </a:fld>
             <a:endParaRPr lang="en-GB"/>
           </a:p>
@@ -3852,7 +3852,7 @@
           <a:p>
             <a:fld id="{386EAC6E-8ADC-498C-8D78-A1467B1978D3}" type="datetimeFigureOut">
               <a:rPr lang="en-GB" smtClean="0"/>
-              <a:t>25/02/2025</a:t>
+              <a:t>26/02/2025</a:t>
             </a:fld>
             <a:endParaRPr lang="en-GB"/>
           </a:p>
@@ -4226,7 +4226,7 @@
           <a:p>
             <a:fld id="{386EAC6E-8ADC-498C-8D78-A1467B1978D3}" type="datetimeFigureOut">
               <a:rPr lang="en-GB" smtClean="0"/>
-              <a:t>25/02/2025</a:t>
+              <a:t>26/02/2025</a:t>
             </a:fld>
             <a:endParaRPr lang="en-GB"/>
           </a:p>
@@ -4374,7 +4374,7 @@
           <a:p>
             <a:fld id="{386EAC6E-8ADC-498C-8D78-A1467B1978D3}" type="datetimeFigureOut">
               <a:rPr lang="en-GB" smtClean="0"/>
-              <a:t>25/02/2025</a:t>
+              <a:t>26/02/2025</a:t>
             </a:fld>
             <a:endParaRPr lang="en-GB"/>
           </a:p>
@@ -4499,7 +4499,7 @@
           <a:p>
             <a:fld id="{386EAC6E-8ADC-498C-8D78-A1467B1978D3}" type="datetimeFigureOut">
               <a:rPr lang="en-GB" smtClean="0"/>
-              <a:t>25/02/2025</a:t>
+              <a:t>26/02/2025</a:t>
             </a:fld>
             <a:endParaRPr lang="en-GB"/>
           </a:p>
@@ -4784,7 +4784,7 @@
           <a:p>
             <a:fld id="{386EAC6E-8ADC-498C-8D78-A1467B1978D3}" type="datetimeFigureOut">
               <a:rPr lang="en-GB" smtClean="0"/>
-              <a:t>25/02/2025</a:t>
+              <a:t>26/02/2025</a:t>
             </a:fld>
             <a:endParaRPr lang="en-GB"/>
           </a:p>
@@ -5108,7 +5108,7 @@
           <a:p>
             <a:fld id="{386EAC6E-8ADC-498C-8D78-A1467B1978D3}" type="datetimeFigureOut">
               <a:rPr lang="en-GB" smtClean="0"/>
-              <a:t>25/02/2025</a:t>
+              <a:t>26/02/2025</a:t>
             </a:fld>
             <a:endParaRPr lang="en-GB"/>
           </a:p>
@@ -5322,7 +5322,7 @@
           <a:p>
             <a:fld id="{386EAC6E-8ADC-498C-8D78-A1467B1978D3}" type="datetimeFigureOut">
               <a:rPr lang="en-GB" smtClean="0"/>
-              <a:t>25/02/2025</a:t>
+              <a:t>26/02/2025</a:t>
             </a:fld>
             <a:endParaRPr lang="en-GB"/>
           </a:p>
@@ -9616,7 +9616,7 @@
         </p:nvSpPr>
         <p:spPr>
           <a:xfrm>
-            <a:off x="879987" y="3309648"/>
+            <a:off x="0" y="3429003"/>
             <a:ext cx="1474839" cy="588843"/>
           </a:xfrm>
           <a:prstGeom prst="rect">
@@ -9665,7 +9665,7 @@
         </p:nvSpPr>
         <p:spPr>
           <a:xfrm>
-            <a:off x="3180736" y="3309647"/>
+            <a:off x="2300749" y="3429002"/>
             <a:ext cx="1474839" cy="588843"/>
           </a:xfrm>
           <a:prstGeom prst="rect">
@@ -9714,7 +9714,7 @@
         </p:nvSpPr>
         <p:spPr>
           <a:xfrm>
-            <a:off x="5481485" y="3315651"/>
+            <a:off x="4601498" y="3435006"/>
             <a:ext cx="1474839" cy="588843"/>
           </a:xfrm>
           <a:prstGeom prst="rect">
@@ -9763,7 +9763,7 @@
         </p:nvSpPr>
         <p:spPr>
           <a:xfrm>
-            <a:off x="7733071" y="3309645"/>
+            <a:off x="6764594" y="3429000"/>
             <a:ext cx="1474839" cy="588843"/>
           </a:xfrm>
           <a:prstGeom prst="rect">
@@ -9815,8 +9815,8 @@
         </p:nvCxnSpPr>
         <p:spPr>
           <a:xfrm rot="5400000">
-            <a:off x="4721945" y="1812685"/>
-            <a:ext cx="693173" cy="2300750"/>
+            <a:off x="4222274" y="1432370"/>
+            <a:ext cx="812528" cy="3180737"/>
           </a:xfrm>
           <a:prstGeom prst="bentConnector3">
             <a:avLst/>
@@ -9857,8 +9857,8 @@
         </p:nvCxnSpPr>
         <p:spPr>
           <a:xfrm rot="5400000">
-            <a:off x="3571570" y="662312"/>
-            <a:ext cx="693174" cy="4601499"/>
+            <a:off x="3071899" y="281995"/>
+            <a:ext cx="812529" cy="5481486"/>
           </a:xfrm>
           <a:prstGeom prst="bentConnector3">
             <a:avLst/>
@@ -9899,8 +9899,8 @@
         </p:nvCxnSpPr>
         <p:spPr>
           <a:xfrm rot="5400000">
-            <a:off x="5869318" y="2966062"/>
-            <a:ext cx="699177" cy="1"/>
+            <a:off x="5369646" y="2585746"/>
+            <a:ext cx="818532" cy="879988"/>
           </a:xfrm>
           <a:prstGeom prst="bentConnector3">
             <a:avLst/>
@@ -9941,8 +9941,8 @@
         </p:nvCxnSpPr>
         <p:spPr>
           <a:xfrm rot="16200000" flipH="1">
-            <a:off x="6998113" y="1837266"/>
-            <a:ext cx="693171" cy="2251585"/>
+            <a:off x="6454197" y="2381183"/>
+            <a:ext cx="812526" cy="1283108"/>
           </a:xfrm>
           <a:prstGeom prst="bentConnector3">
             <a:avLst/>
@@ -9980,7 +9980,7 @@
         </p:nvSpPr>
         <p:spPr>
           <a:xfrm>
-            <a:off x="9837173" y="3309644"/>
+            <a:off x="8785122" y="3428999"/>
             <a:ext cx="1474839" cy="588843"/>
           </a:xfrm>
           <a:prstGeom prst="rect">
@@ -10032,8 +10032,375 @@
         </p:nvCxnSpPr>
         <p:spPr>
           <a:xfrm rot="16200000" flipH="1">
-            <a:off x="8050164" y="785215"/>
-            <a:ext cx="693170" cy="4355687"/>
+            <a:off x="7464462" y="1370918"/>
+            <a:ext cx="812525" cy="3303636"/>
+          </a:xfrm>
+          <a:prstGeom prst="bentConnector3">
+            <a:avLst/>
+          </a:prstGeom>
+          <a:ln>
+            <a:tailEnd type="triangle"/>
+          </a:ln>
+        </p:spPr>
+        <p:style>
+          <a:lnRef idx="1">
+            <a:schemeClr val="accent1"/>
+          </a:lnRef>
+          <a:fillRef idx="0">
+            <a:schemeClr val="accent1"/>
+          </a:fillRef>
+          <a:effectRef idx="0">
+            <a:schemeClr val="accent1"/>
+          </a:effectRef>
+          <a:fontRef idx="minor">
+            <a:schemeClr val="tx1"/>
+          </a:fontRef>
+        </p:style>
+      </p:cxnSp>
+      <p:sp>
+        <p:nvSpPr>
+          <p:cNvPr id="9" name="Rectangle 8">
+            <a:extLst>
+              <a:ext uri="{FF2B5EF4-FFF2-40B4-BE49-F238E27FC236}">
+                <a16:creationId xmlns:a16="http://schemas.microsoft.com/office/drawing/2014/main" id="{62C32F1F-ACCA-C186-9355-1B2A2C16E727}"/>
+              </a:ext>
+            </a:extLst>
+          </p:cNvPr>
+          <p:cNvSpPr/>
+          <p:nvPr/>
+        </p:nvSpPr>
+        <p:spPr>
+          <a:xfrm>
+            <a:off x="6853083" y="4551792"/>
+            <a:ext cx="1474839" cy="588843"/>
+          </a:xfrm>
+          <a:prstGeom prst="rect">
+            <a:avLst/>
+          </a:prstGeom>
+        </p:spPr>
+        <p:style>
+          <a:lnRef idx="2">
+            <a:schemeClr val="accent1">
+              <a:shade val="15000"/>
+            </a:schemeClr>
+          </a:lnRef>
+          <a:fillRef idx="1">
+            <a:schemeClr val="accent1"/>
+          </a:fillRef>
+          <a:effectRef idx="0">
+            <a:schemeClr val="accent1"/>
+          </a:effectRef>
+          <a:fontRef idx="minor">
+            <a:schemeClr val="lt1"/>
+          </a:fontRef>
+        </p:style>
+        <p:txBody>
+          <a:bodyPr rtlCol="0" anchor="ctr"/>
+          <a:lstStyle>
+            <a:defPPr>
+              <a:defRPr lang="en-US"/>
+            </a:defPPr>
+            <a:lvl1pPr marL="0" algn="l" defTabSz="457200" rtl="0" eaLnBrk="1" latinLnBrk="0" hangingPunct="1">
+              <a:defRPr sz="1800" kern="1200">
+                <a:solidFill>
+                  <a:schemeClr val="lt1"/>
+                </a:solidFill>
+                <a:latin typeface="+mn-lt"/>
+                <a:ea typeface="+mn-ea"/>
+                <a:cs typeface="+mn-cs"/>
+              </a:defRPr>
+            </a:lvl1pPr>
+            <a:lvl2pPr marL="457200" algn="l" defTabSz="457200" rtl="0" eaLnBrk="1" latinLnBrk="0" hangingPunct="1">
+              <a:defRPr sz="1800" kern="1200">
+                <a:solidFill>
+                  <a:schemeClr val="lt1"/>
+                </a:solidFill>
+                <a:latin typeface="+mn-lt"/>
+                <a:ea typeface="+mn-ea"/>
+                <a:cs typeface="+mn-cs"/>
+              </a:defRPr>
+            </a:lvl2pPr>
+            <a:lvl3pPr marL="914400" algn="l" defTabSz="457200" rtl="0" eaLnBrk="1" latinLnBrk="0" hangingPunct="1">
+              <a:defRPr sz="1800" kern="1200">
+                <a:solidFill>
+                  <a:schemeClr val="lt1"/>
+                </a:solidFill>
+                <a:latin typeface="+mn-lt"/>
+                <a:ea typeface="+mn-ea"/>
+                <a:cs typeface="+mn-cs"/>
+              </a:defRPr>
+            </a:lvl3pPr>
+            <a:lvl4pPr marL="1371600" algn="l" defTabSz="457200" rtl="0" eaLnBrk="1" latinLnBrk="0" hangingPunct="1">
+              <a:defRPr sz="1800" kern="1200">
+                <a:solidFill>
+                  <a:schemeClr val="lt1"/>
+                </a:solidFill>
+                <a:latin typeface="+mn-lt"/>
+                <a:ea typeface="+mn-ea"/>
+                <a:cs typeface="+mn-cs"/>
+              </a:defRPr>
+            </a:lvl4pPr>
+            <a:lvl5pPr marL="1828800" algn="l" defTabSz="457200" rtl="0" eaLnBrk="1" latinLnBrk="0" hangingPunct="1">
+              <a:defRPr sz="1800" kern="1200">
+                <a:solidFill>
+                  <a:schemeClr val="lt1"/>
+                </a:solidFill>
+                <a:latin typeface="+mn-lt"/>
+                <a:ea typeface="+mn-ea"/>
+                <a:cs typeface="+mn-cs"/>
+              </a:defRPr>
+            </a:lvl5pPr>
+            <a:lvl6pPr marL="2286000" algn="l" defTabSz="457200" rtl="0" eaLnBrk="1" latinLnBrk="0" hangingPunct="1">
+              <a:defRPr sz="1800" kern="1200">
+                <a:solidFill>
+                  <a:schemeClr val="lt1"/>
+                </a:solidFill>
+                <a:latin typeface="+mn-lt"/>
+                <a:ea typeface="+mn-ea"/>
+                <a:cs typeface="+mn-cs"/>
+              </a:defRPr>
+            </a:lvl6pPr>
+            <a:lvl7pPr marL="2743200" algn="l" defTabSz="457200" rtl="0" eaLnBrk="1" latinLnBrk="0" hangingPunct="1">
+              <a:defRPr sz="1800" kern="1200">
+                <a:solidFill>
+                  <a:schemeClr val="lt1"/>
+                </a:solidFill>
+                <a:latin typeface="+mn-lt"/>
+                <a:ea typeface="+mn-ea"/>
+                <a:cs typeface="+mn-cs"/>
+              </a:defRPr>
+            </a:lvl7pPr>
+            <a:lvl8pPr marL="3200400" algn="l" defTabSz="457200" rtl="0" eaLnBrk="1" latinLnBrk="0" hangingPunct="1">
+              <a:defRPr sz="1800" kern="1200">
+                <a:solidFill>
+                  <a:schemeClr val="lt1"/>
+                </a:solidFill>
+                <a:latin typeface="+mn-lt"/>
+                <a:ea typeface="+mn-ea"/>
+                <a:cs typeface="+mn-cs"/>
+              </a:defRPr>
+            </a:lvl8pPr>
+            <a:lvl9pPr marL="3657600" algn="l" defTabSz="457200" rtl="0" eaLnBrk="1" latinLnBrk="0" hangingPunct="1">
+              <a:defRPr sz="1800" kern="1200">
+                <a:solidFill>
+                  <a:schemeClr val="lt1"/>
+                </a:solidFill>
+                <a:latin typeface="+mn-lt"/>
+                <a:ea typeface="+mn-ea"/>
+                <a:cs typeface="+mn-cs"/>
+              </a:defRPr>
+            </a:lvl9pPr>
+          </a:lstStyle>
+          <a:p>
+            <a:pPr algn="ctr"/>
+            <a:r>
+              <a:rPr lang="en-GB" dirty="0"/>
+              <a:t>Create Album</a:t>
+            </a:r>
+          </a:p>
+        </p:txBody>
+      </p:sp>
+      <p:cxnSp>
+        <p:nvCxnSpPr>
+          <p:cNvPr id="13" name="Connector: Elbow 12">
+            <a:extLst>
+              <a:ext uri="{FF2B5EF4-FFF2-40B4-BE49-F238E27FC236}">
+                <a16:creationId xmlns:a16="http://schemas.microsoft.com/office/drawing/2014/main" id="{436FCC1E-2BA6-BC1B-806D-021CEC133189}"/>
+              </a:ext>
+            </a:extLst>
+          </p:cNvPr>
+          <p:cNvCxnSpPr>
+            <a:stCxn id="8" idx="2"/>
+            <a:endCxn id="9" idx="0"/>
+          </p:cNvCxnSpPr>
+          <p:nvPr/>
+        </p:nvCxnSpPr>
+        <p:spPr>
+          <a:xfrm rot="16200000" flipH="1">
+            <a:off x="7279284" y="4240572"/>
+            <a:ext cx="533949" cy="88489"/>
+          </a:xfrm>
+          <a:prstGeom prst="bentConnector3">
+            <a:avLst/>
+          </a:prstGeom>
+          <a:ln>
+            <a:tailEnd type="triangle"/>
+          </a:ln>
+        </p:spPr>
+        <p:style>
+          <a:lnRef idx="1">
+            <a:schemeClr val="accent1"/>
+          </a:lnRef>
+          <a:fillRef idx="0">
+            <a:schemeClr val="accent1"/>
+          </a:fillRef>
+          <a:effectRef idx="0">
+            <a:schemeClr val="accent1"/>
+          </a:effectRef>
+          <a:fontRef idx="minor">
+            <a:schemeClr val="tx1"/>
+          </a:fontRef>
+        </p:style>
+      </p:cxnSp>
+      <p:sp>
+        <p:nvSpPr>
+          <p:cNvPr id="15" name="Rectangle 14">
+            <a:extLst>
+              <a:ext uri="{FF2B5EF4-FFF2-40B4-BE49-F238E27FC236}">
+                <a16:creationId xmlns:a16="http://schemas.microsoft.com/office/drawing/2014/main" id="{27A7604D-9A47-5D70-B3AB-278CA5B96D42}"/>
+              </a:ext>
+            </a:extLst>
+          </p:cNvPr>
+          <p:cNvSpPr/>
+          <p:nvPr/>
+        </p:nvSpPr>
+        <p:spPr>
+          <a:xfrm>
+            <a:off x="2300748" y="4519837"/>
+            <a:ext cx="1474839" cy="588843"/>
+          </a:xfrm>
+          <a:prstGeom prst="rect">
+            <a:avLst/>
+          </a:prstGeom>
+        </p:spPr>
+        <p:style>
+          <a:lnRef idx="2">
+            <a:schemeClr val="accent1">
+              <a:shade val="15000"/>
+            </a:schemeClr>
+          </a:lnRef>
+          <a:fillRef idx="1">
+            <a:schemeClr val="accent1"/>
+          </a:fillRef>
+          <a:effectRef idx="0">
+            <a:schemeClr val="accent1"/>
+          </a:effectRef>
+          <a:fontRef idx="minor">
+            <a:schemeClr val="lt1"/>
+          </a:fontRef>
+        </p:style>
+        <p:txBody>
+          <a:bodyPr rtlCol="0" anchor="ctr"/>
+          <a:lstStyle/>
+          <a:p>
+            <a:pPr algn="ctr"/>
+            <a:r>
+              <a:rPr lang="en-GB" dirty="0"/>
+              <a:t>Logout</a:t>
+            </a:r>
+          </a:p>
+        </p:txBody>
+      </p:sp>
+      <p:cxnSp>
+        <p:nvCxnSpPr>
+          <p:cNvPr id="19" name="Connector: Elbow 18">
+            <a:extLst>
+              <a:ext uri="{FF2B5EF4-FFF2-40B4-BE49-F238E27FC236}">
+                <a16:creationId xmlns:a16="http://schemas.microsoft.com/office/drawing/2014/main" id="{764C8757-D497-DF7A-5B16-7D0E16DBCCEB}"/>
+              </a:ext>
+            </a:extLst>
+          </p:cNvPr>
+          <p:cNvCxnSpPr>
+            <a:stCxn id="6" idx="2"/>
+            <a:endCxn id="15" idx="0"/>
+          </p:cNvCxnSpPr>
+          <p:nvPr/>
+        </p:nvCxnSpPr>
+        <p:spPr>
+          <a:xfrm rot="5400000">
+            <a:off x="2787173" y="4268841"/>
+            <a:ext cx="501992" cy="1"/>
+          </a:xfrm>
+          <a:prstGeom prst="bentConnector3">
+            <a:avLst/>
+          </a:prstGeom>
+          <a:ln>
+            <a:tailEnd type="triangle"/>
+          </a:ln>
+        </p:spPr>
+        <p:style>
+          <a:lnRef idx="1">
+            <a:schemeClr val="accent1"/>
+          </a:lnRef>
+          <a:fillRef idx="0">
+            <a:schemeClr val="accent1"/>
+          </a:fillRef>
+          <a:effectRef idx="0">
+            <a:schemeClr val="accent1"/>
+          </a:effectRef>
+          <a:fontRef idx="minor">
+            <a:schemeClr val="tx1"/>
+          </a:fontRef>
+        </p:style>
+      </p:cxnSp>
+      <p:sp>
+        <p:nvSpPr>
+          <p:cNvPr id="26" name="Rectangle 25">
+            <a:extLst>
+              <a:ext uri="{FF2B5EF4-FFF2-40B4-BE49-F238E27FC236}">
+                <a16:creationId xmlns:a16="http://schemas.microsoft.com/office/drawing/2014/main" id="{734FFEE7-E30F-64EB-0089-13C937896C28}"/>
+              </a:ext>
+            </a:extLst>
+          </p:cNvPr>
+          <p:cNvSpPr/>
+          <p:nvPr/>
+        </p:nvSpPr>
+        <p:spPr>
+          <a:xfrm>
+            <a:off x="10717160" y="3428999"/>
+            <a:ext cx="1474839" cy="588843"/>
+          </a:xfrm>
+          <a:prstGeom prst="rect">
+            <a:avLst/>
+          </a:prstGeom>
+        </p:spPr>
+        <p:style>
+          <a:lnRef idx="2">
+            <a:schemeClr val="accent1">
+              <a:shade val="15000"/>
+            </a:schemeClr>
+          </a:lnRef>
+          <a:fillRef idx="1">
+            <a:schemeClr val="accent1"/>
+          </a:fillRef>
+          <a:effectRef idx="0">
+            <a:schemeClr val="accent1"/>
+          </a:effectRef>
+          <a:fontRef idx="minor">
+            <a:schemeClr val="lt1"/>
+          </a:fontRef>
+        </p:style>
+        <p:txBody>
+          <a:bodyPr rtlCol="0" anchor="ctr"/>
+          <a:lstStyle/>
+          <a:p>
+            <a:pPr algn="ctr"/>
+            <a:r>
+              <a:rPr lang="en-GB" dirty="0"/>
+              <a:t>Delete Account</a:t>
+            </a:r>
+          </a:p>
+        </p:txBody>
+      </p:sp>
+      <p:cxnSp>
+        <p:nvCxnSpPr>
+          <p:cNvPr id="28" name="Connector: Elbow 27">
+            <a:extLst>
+              <a:ext uri="{FF2B5EF4-FFF2-40B4-BE49-F238E27FC236}">
+                <a16:creationId xmlns:a16="http://schemas.microsoft.com/office/drawing/2014/main" id="{05CEF51D-B3E9-48EB-7868-775CB702FD92}"/>
+              </a:ext>
+            </a:extLst>
+          </p:cNvPr>
+          <p:cNvCxnSpPr>
+            <a:stCxn id="4" idx="2"/>
+            <a:endCxn id="26" idx="0"/>
+          </p:cNvCxnSpPr>
+          <p:nvPr/>
+        </p:nvCxnSpPr>
+        <p:spPr>
+          <a:xfrm rot="16200000" flipH="1">
+            <a:off x="8430481" y="404899"/>
+            <a:ext cx="812525" cy="5235674"/>
           </a:xfrm>
           <a:prstGeom prst="bentConnector3">
             <a:avLst/>
@@ -10133,7 +10500,9 @@
         </p:nvSpPr>
         <p:spPr/>
         <p:txBody>
-          <a:bodyPr/>
+          <a:bodyPr>
+            <a:normAutofit lnSpcReduction="10000"/>
+          </a:bodyPr>
           <a:lstStyle/>
           <a:p>
             <a:r>
@@ -10144,13 +10513,25 @@
           <a:p>
             <a:r>
               <a:rPr lang="en-GB" dirty="0"/>
-              <a:t>Sign Up - /register</a:t>
+              <a:t>Sign Up - /account/register</a:t>
             </a:r>
           </a:p>
           <a:p>
             <a:r>
               <a:rPr lang="en-GB" dirty="0"/>
-              <a:t>Login - /login</a:t>
+              <a:t>Login - /account/login</a:t>
+            </a:r>
+          </a:p>
+          <a:p>
+            <a:r>
+              <a:rPr lang="en-GB" dirty="0"/>
+              <a:t>Logout – /account/logout</a:t>
+            </a:r>
+          </a:p>
+          <a:p>
+            <a:r>
+              <a:rPr lang="en-GB" dirty="0"/>
+              <a:t>Delete Account - /account/delete-account</a:t>
             </a:r>
           </a:p>
           <a:p>
@@ -10179,6 +10560,12 @@
             <a:r>
               <a:rPr lang="en-GB" dirty="0"/>
               <a:t>&gt;</a:t>
+            </a:r>
+          </a:p>
+          <a:p>
+            <a:r>
+              <a:rPr lang="en-GB" dirty="0"/>
+              <a:t>Create Album - /album/create</a:t>
             </a:r>
           </a:p>
           <a:p>

</xml_diff>

<commit_message>
Added pages to Site Map, URL Design. Minor changes to User Personas
</commit_message>
<xml_diff>
--- a/WAD2 Group Project Design Spec.pptx
+++ b/WAD2 Group Project Design Spec.pptx
@@ -7243,7 +7243,7 @@
           <p:nvPr>
             <p:extLst>
               <p:ext uri="{D42A27DB-BD31-4B8C-83A1-F6EECF244321}">
-                <p14:modId xmlns:p14="http://schemas.microsoft.com/office/powerpoint/2010/main" val="436267963"/>
+                <p14:modId xmlns:p14="http://schemas.microsoft.com/office/powerpoint/2010/main" val="1543229446"/>
               </p:ext>
             </p:extLst>
           </p:nvPr>
@@ -7259,14 +7259,14 @@
                 <a:tableStyleId>{5C22544A-7EE6-4342-B048-85BDC9FD1C3A}</a:tableStyleId>
               </a:tblPr>
               <a:tblGrid>
-                <a:gridCol w="1484597">
+                <a:gridCol w="1592751">
                   <a:extLst>
                     <a:ext uri="{9D8B030D-6E8A-4147-A177-3AD203B41FA5}">
                       <a16:colId xmlns:a16="http://schemas.microsoft.com/office/drawing/2014/main" val="1978240753"/>
                     </a:ext>
                   </a:extLst>
                 </a:gridCol>
-                <a:gridCol w="1409365">
+                <a:gridCol w="1301211">
                   <a:extLst>
                     <a:ext uri="{9D8B030D-6E8A-4147-A177-3AD203B41FA5}">
                       <a16:colId xmlns:a16="http://schemas.microsoft.com/office/drawing/2014/main" val="1094651281"/>
@@ -7382,7 +7382,7 @@
                     <a:p>
                       <a:r>
                         <a:rPr lang="en-GB" noProof="0" dirty="0" err="1"/>
-                        <a:t>FavouriteAlbum</a:t>
+                        <a:t>FavouriteAlbumTitle</a:t>
                       </a:r>
                       <a:endParaRPr lang="en-GB" noProof="0" dirty="0"/>
                     </a:p>
@@ -7396,7 +7396,7 @@
                     <a:p>
                       <a:r>
                         <a:rPr lang="en-GB" noProof="0" dirty="0"/>
-                        <a:t>Album (1)</a:t>
+                        <a:t>Char(40)</a:t>
                       </a:r>
                     </a:p>
                   </a:txBody>
@@ -8423,7 +8423,7 @@
         </p:nvSpPr>
         <p:spPr>
           <a:xfrm>
-            <a:off x="2300749" y="3429002"/>
+            <a:off x="1687465" y="3445661"/>
             <a:ext cx="1474839" cy="588843"/>
           </a:xfrm>
           <a:prstGeom prst="rect">
@@ -8472,7 +8472,7 @@
         </p:nvSpPr>
         <p:spPr>
           <a:xfrm>
-            <a:off x="4601498" y="3435006"/>
+            <a:off x="3374931" y="3445661"/>
             <a:ext cx="1474839" cy="588843"/>
           </a:xfrm>
           <a:prstGeom prst="rect">
@@ -8566,6 +8566,7 @@
             </a:extLst>
           </p:cNvPr>
           <p:cNvCxnSpPr>
+            <a:cxnSpLocks/>
             <a:stCxn id="4" idx="2"/>
             <a:endCxn id="6" idx="0"/>
           </p:cNvCxnSpPr>
@@ -8573,8 +8574,8 @@
         </p:nvCxnSpPr>
         <p:spPr>
           <a:xfrm rot="5400000">
-            <a:off x="4222274" y="1432370"/>
-            <a:ext cx="812528" cy="3180737"/>
+            <a:off x="3907303" y="1134057"/>
+            <a:ext cx="829187" cy="3794021"/>
           </a:xfrm>
           <a:prstGeom prst="bentConnector3">
             <a:avLst/>
@@ -8657,8 +8658,8 @@
         </p:nvCxnSpPr>
         <p:spPr>
           <a:xfrm rot="5400000">
-            <a:off x="5369646" y="2585746"/>
-            <a:ext cx="818532" cy="879988"/>
+            <a:off x="4751036" y="1977790"/>
+            <a:ext cx="829187" cy="2106555"/>
           </a:xfrm>
           <a:prstGeom prst="bentConnector3">
             <a:avLst/>
@@ -8738,7 +8739,7 @@
         </p:nvSpPr>
         <p:spPr>
           <a:xfrm>
-            <a:off x="8785122" y="3428999"/>
+            <a:off x="8432753" y="3423537"/>
             <a:ext cx="1474839" cy="588843"/>
           </a:xfrm>
           <a:prstGeom prst="rect">
@@ -8790,8 +8791,8 @@
         </p:nvCxnSpPr>
         <p:spPr>
           <a:xfrm rot="16200000" flipH="1">
-            <a:off x="7464462" y="1370918"/>
-            <a:ext cx="812525" cy="3303636"/>
+            <a:off x="7291008" y="1544371"/>
+            <a:ext cx="807063" cy="2951267"/>
           </a:xfrm>
           <a:prstGeom prst="bentConnector3">
             <a:avLst/>
@@ -8829,7 +8830,7 @@
         </p:nvSpPr>
         <p:spPr>
           <a:xfrm>
-            <a:off x="6853083" y="4551792"/>
+            <a:off x="6764593" y="4536496"/>
             <a:ext cx="1474839" cy="588843"/>
           </a:xfrm>
           <a:prstGeom prst="rect">
@@ -8974,9 +8975,9 @@
           <p:nvPr/>
         </p:nvCxnSpPr>
         <p:spPr>
-          <a:xfrm rot="16200000" flipH="1">
-            <a:off x="7279284" y="4240572"/>
-            <a:ext cx="533949" cy="88489"/>
+          <a:xfrm rot="5400000">
+            <a:off x="7242688" y="4277169"/>
+            <a:ext cx="518653" cy="1"/>
           </a:xfrm>
           <a:prstGeom prst="bentConnector3">
             <a:avLst/>
@@ -9014,7 +9015,7 @@
         </p:nvSpPr>
         <p:spPr>
           <a:xfrm>
-            <a:off x="2300748" y="4519837"/>
+            <a:off x="2637511" y="4497716"/>
             <a:ext cx="1474839" cy="588843"/>
           </a:xfrm>
           <a:prstGeom prst="rect">
@@ -9059,15 +9060,16 @@
             </a:extLst>
           </p:cNvPr>
           <p:cNvCxnSpPr>
+            <a:cxnSpLocks/>
             <a:stCxn id="6" idx="2"/>
             <a:endCxn id="15" idx="0"/>
           </p:cNvCxnSpPr>
           <p:nvPr/>
         </p:nvCxnSpPr>
         <p:spPr>
-          <a:xfrm rot="5400000">
-            <a:off x="2787173" y="4268841"/>
-            <a:ext cx="501992" cy="1"/>
+          <a:xfrm rot="16200000" flipH="1">
+            <a:off x="2668302" y="3791087"/>
+            <a:ext cx="463212" cy="950046"/>
           </a:xfrm>
           <a:prstGeom prst="bentConnector3">
             <a:avLst/>
@@ -9105,7 +9107,7 @@
         </p:nvSpPr>
         <p:spPr>
           <a:xfrm>
-            <a:off x="10717160" y="3428999"/>
+            <a:off x="10154257" y="3450032"/>
             <a:ext cx="1474839" cy="588843"/>
           </a:xfrm>
           <a:prstGeom prst="rect">
@@ -9157,8 +9159,190 @@
         </p:nvCxnSpPr>
         <p:spPr>
           <a:xfrm rot="16200000" flipH="1">
-            <a:off x="8430481" y="404899"/>
-            <a:ext cx="812525" cy="5235674"/>
+            <a:off x="8138512" y="696867"/>
+            <a:ext cx="833558" cy="4672771"/>
+          </a:xfrm>
+          <a:prstGeom prst="bentConnector3">
+            <a:avLst/>
+          </a:prstGeom>
+          <a:ln>
+            <a:tailEnd type="triangle"/>
+          </a:ln>
+        </p:spPr>
+        <p:style>
+          <a:lnRef idx="1">
+            <a:schemeClr val="accent1"/>
+          </a:lnRef>
+          <a:fillRef idx="0">
+            <a:schemeClr val="accent1"/>
+          </a:fillRef>
+          <a:effectRef idx="0">
+            <a:schemeClr val="accent1"/>
+          </a:effectRef>
+          <a:fontRef idx="minor">
+            <a:schemeClr val="tx1"/>
+          </a:fontRef>
+        </p:style>
+      </p:cxnSp>
+      <p:sp>
+        <p:nvSpPr>
+          <p:cNvPr id="20" name="Rectangle 19">
+            <a:extLst>
+              <a:ext uri="{FF2B5EF4-FFF2-40B4-BE49-F238E27FC236}">
+                <a16:creationId xmlns:a16="http://schemas.microsoft.com/office/drawing/2014/main" id="{B0167E2E-B597-F03F-97D4-4C14C32B4F0E}"/>
+              </a:ext>
+            </a:extLst>
+          </p:cNvPr>
+          <p:cNvSpPr/>
+          <p:nvPr/>
+        </p:nvSpPr>
+        <p:spPr>
+          <a:xfrm>
+            <a:off x="5096435" y="3445661"/>
+            <a:ext cx="1474839" cy="588843"/>
+          </a:xfrm>
+          <a:prstGeom prst="rect">
+            <a:avLst/>
+          </a:prstGeom>
+        </p:spPr>
+        <p:style>
+          <a:lnRef idx="2">
+            <a:schemeClr val="accent1">
+              <a:shade val="15000"/>
+            </a:schemeClr>
+          </a:lnRef>
+          <a:fillRef idx="1">
+            <a:schemeClr val="accent1"/>
+          </a:fillRef>
+          <a:effectRef idx="0">
+            <a:schemeClr val="accent1"/>
+          </a:effectRef>
+          <a:fontRef idx="minor">
+            <a:schemeClr val="lt1"/>
+          </a:fontRef>
+        </p:style>
+        <p:txBody>
+          <a:bodyPr rtlCol="0" anchor="ctr"/>
+          <a:lstStyle/>
+          <a:p>
+            <a:pPr algn="ctr"/>
+            <a:r>
+              <a:rPr lang="en-GB" dirty="0"/>
+              <a:t>About</a:t>
+            </a:r>
+          </a:p>
+        </p:txBody>
+      </p:sp>
+      <p:cxnSp>
+        <p:nvCxnSpPr>
+          <p:cNvPr id="27" name="Connector: Elbow 26">
+            <a:extLst>
+              <a:ext uri="{FF2B5EF4-FFF2-40B4-BE49-F238E27FC236}">
+                <a16:creationId xmlns:a16="http://schemas.microsoft.com/office/drawing/2014/main" id="{6A225660-11AA-082D-4F9F-D348BA566498}"/>
+              </a:ext>
+            </a:extLst>
+          </p:cNvPr>
+          <p:cNvCxnSpPr>
+            <a:stCxn id="4" idx="2"/>
+            <a:endCxn id="20" idx="0"/>
+          </p:cNvCxnSpPr>
+          <p:nvPr/>
+        </p:nvCxnSpPr>
+        <p:spPr>
+          <a:xfrm rot="5400000">
+            <a:off x="5611788" y="2838542"/>
+            <a:ext cx="829187" cy="385051"/>
+          </a:xfrm>
+          <a:prstGeom prst="bentConnector3">
+            <a:avLst/>
+          </a:prstGeom>
+          <a:ln>
+            <a:tailEnd type="triangle"/>
+          </a:ln>
+        </p:spPr>
+        <p:style>
+          <a:lnRef idx="1">
+            <a:schemeClr val="accent1"/>
+          </a:lnRef>
+          <a:fillRef idx="0">
+            <a:schemeClr val="accent1"/>
+          </a:fillRef>
+          <a:effectRef idx="0">
+            <a:schemeClr val="accent1"/>
+          </a:effectRef>
+          <a:fontRef idx="minor">
+            <a:schemeClr val="tx1"/>
+          </a:fontRef>
+        </p:style>
+      </p:cxnSp>
+      <p:sp>
+        <p:nvSpPr>
+          <p:cNvPr id="38" name="Rectangle 37">
+            <a:extLst>
+              <a:ext uri="{FF2B5EF4-FFF2-40B4-BE49-F238E27FC236}">
+                <a16:creationId xmlns:a16="http://schemas.microsoft.com/office/drawing/2014/main" id="{456B79FD-C8AA-309E-84FE-F262D5AC4DB1}"/>
+              </a:ext>
+            </a:extLst>
+          </p:cNvPr>
+          <p:cNvSpPr/>
+          <p:nvPr/>
+        </p:nvSpPr>
+        <p:spPr>
+          <a:xfrm>
+            <a:off x="685801" y="4497715"/>
+            <a:ext cx="1474839" cy="588843"/>
+          </a:xfrm>
+          <a:prstGeom prst="rect">
+            <a:avLst/>
+          </a:prstGeom>
+        </p:spPr>
+        <p:style>
+          <a:lnRef idx="2">
+            <a:schemeClr val="accent1">
+              <a:shade val="15000"/>
+            </a:schemeClr>
+          </a:lnRef>
+          <a:fillRef idx="1">
+            <a:schemeClr val="accent1"/>
+          </a:fillRef>
+          <a:effectRef idx="0">
+            <a:schemeClr val="accent1"/>
+          </a:effectRef>
+          <a:fontRef idx="minor">
+            <a:schemeClr val="lt1"/>
+          </a:fontRef>
+        </p:style>
+        <p:txBody>
+          <a:bodyPr rtlCol="0" anchor="ctr"/>
+          <a:lstStyle/>
+          <a:p>
+            <a:pPr algn="ctr"/>
+            <a:r>
+              <a:rPr lang="en-GB" dirty="0"/>
+              <a:t>Change Password</a:t>
+            </a:r>
+          </a:p>
+        </p:txBody>
+      </p:sp>
+      <p:cxnSp>
+        <p:nvCxnSpPr>
+          <p:cNvPr id="41" name="Connector: Elbow 40">
+            <a:extLst>
+              <a:ext uri="{FF2B5EF4-FFF2-40B4-BE49-F238E27FC236}">
+                <a16:creationId xmlns:a16="http://schemas.microsoft.com/office/drawing/2014/main" id="{8A5EE8E8-6C51-AE9D-4F8E-1FD46B0AF126}"/>
+              </a:ext>
+            </a:extLst>
+          </p:cNvPr>
+          <p:cNvCxnSpPr>
+            <a:stCxn id="6" idx="2"/>
+            <a:endCxn id="38" idx="0"/>
+          </p:cNvCxnSpPr>
+          <p:nvPr/>
+        </p:nvCxnSpPr>
+        <p:spPr>
+          <a:xfrm rot="5400000">
+            <a:off x="1692448" y="3765277"/>
+            <a:ext cx="463211" cy="1001664"/>
           </a:xfrm>
           <a:prstGeom prst="bentConnector3">
             <a:avLst/>
@@ -9259,7 +9443,7 @@
         <p:spPr/>
         <p:txBody>
           <a:bodyPr>
-            <a:normAutofit lnSpcReduction="10000"/>
+            <a:normAutofit fontScale="85000" lnSpcReduction="20000"/>
           </a:bodyPr>
           <a:lstStyle/>
           <a:p>
@@ -9271,6 +9455,12 @@
           <a:p>
             <a:r>
               <a:rPr lang="en-GB" dirty="0"/>
+              <a:t>About Page - /about</a:t>
+            </a:r>
+          </a:p>
+          <a:p>
+            <a:r>
+              <a:rPr lang="en-GB" dirty="0"/>
               <a:t>Sign Up - /account/register</a:t>
             </a:r>
           </a:p>
@@ -9284,6 +9474,12 @@
             <a:r>
               <a:rPr lang="en-GB" dirty="0"/>
               <a:t>Logout – /account/logout</a:t>
+            </a:r>
+          </a:p>
+          <a:p>
+            <a:r>
+              <a:rPr lang="en-GB" dirty="0"/>
+              <a:t>Change Password - /account/password-change</a:t>
             </a:r>
           </a:p>
           <a:p>
@@ -9570,7 +9766,7 @@
             </a:pPr>
             <a:r>
               <a:rPr lang="en-GB" b="1" noProof="0" dirty="0"/>
-              <a:t>Casual Listener</a:t>
+              <a:t>Casual Listener Derek</a:t>
             </a:r>
             <a:r>
               <a:rPr lang="en-GB" noProof="0" dirty="0"/>
@@ -9586,7 +9782,15 @@
             </a:pPr>
             <a:r>
               <a:rPr lang="en-GB" noProof="0" dirty="0"/>
-              <a:t>Description: Loves listening to music, but doesn't have time to search deeply for new releases.</a:t>
+              <a:t>Description: Derek ;</a:t>
+            </a:r>
+            <a:r>
+              <a:rPr lang="en-GB" noProof="0" dirty="0" err="1"/>
+              <a:t>oves</a:t>
+            </a:r>
+            <a:r>
+              <a:rPr lang="en-GB" noProof="0" dirty="0"/>
+              <a:t> listening to music, but he doesn't have time to search deeply for new releases.</a:t>
             </a:r>
           </a:p>
           <a:p>
@@ -9602,7 +9806,7 @@
             </a:r>
             <a:r>
               <a:rPr lang="en-GB" noProof="0" dirty="0"/>
-              <a:t>Find new albums, quickly rate and read reviews from other users.</a:t>
+              <a:t>He wants to find new albums, and  quickly rate and read reviews from other users.</a:t>
             </a:r>
           </a:p>
           <a:p>
@@ -9843,11 +10047,11 @@
               <a:buNone/>
             </a:pPr>
             <a:r>
-              <a:rPr lang="en-GB" b="1" noProof="0"/>
-              <a:t>Content Creator</a:t>
-            </a:r>
-            <a:r>
-              <a:rPr lang="en-GB" noProof="0"/>
+              <a:rPr lang="en-GB" b="1" noProof="0" dirty="0"/>
+              <a:t>Content Creator Evan</a:t>
+            </a:r>
+            <a:r>
+              <a:rPr lang="en-GB" noProof="0" dirty="0"/>
               <a:t>:</a:t>
             </a:r>
           </a:p>
@@ -9860,12 +10064,20 @@
               <a:buNone/>
             </a:pPr>
             <a:r>
-              <a:rPr lang="en-GB" i="1" noProof="0"/>
+              <a:rPr lang="en-GB" i="1" noProof="0" dirty="0"/>
               <a:t>Description:</a:t>
             </a:r>
             <a:r>
-              <a:rPr lang="en-GB" noProof="0"/>
-              <a:t> An aspiring musician, he records his own tracks and wants to share them with the community.</a:t>
+              <a:rPr lang="en-GB" noProof="0" dirty="0"/>
+              <a:t> Evan is an aspiring musician, </a:t>
+            </a:r>
+            <a:r>
+              <a:rPr lang="en-GB" dirty="0"/>
+              <a:t>who</a:t>
+            </a:r>
+            <a:r>
+              <a:rPr lang="en-GB" noProof="0" dirty="0"/>
+              <a:t> records his own tracks and wants to share them with the community.</a:t>
             </a:r>
           </a:p>
           <a:p>
@@ -9877,12 +10089,20 @@
               <a:buNone/>
             </a:pPr>
             <a:r>
-              <a:rPr lang="en-GB" i="1" noProof="0"/>
+              <a:rPr lang="en-GB" i="1" noProof="0" dirty="0"/>
               <a:t>Goal: </a:t>
             </a:r>
             <a:r>
-              <a:rPr lang="en-GB" noProof="0"/>
-              <a:t>Upload your albums, get feedback and a fan base.</a:t>
+              <a:rPr lang="en-GB" noProof="0" dirty="0"/>
+              <a:t>He wants to upload his albums, </a:t>
+            </a:r>
+            <a:r>
+              <a:rPr lang="en-GB" dirty="0"/>
+              <a:t>and g</a:t>
+            </a:r>
+            <a:r>
+              <a:rPr lang="en-GB" noProof="0" dirty="0"/>
+              <a:t>et feedback and a fan base.</a:t>
             </a:r>
           </a:p>
           <a:p>
@@ -9894,7 +10114,7 @@
               <a:buNone/>
             </a:pPr>
             <a:r>
-              <a:rPr lang="en-GB" i="1" noProof="0"/>
+              <a:rPr lang="en-GB" i="1" noProof="0" dirty="0"/>
               <a:t>Tasks:</a:t>
             </a:r>
           </a:p>
@@ -9905,7 +10125,7 @@
               </a:lnSpc>
             </a:pPr>
             <a:r>
-              <a:rPr lang="en-GB" noProof="0"/>
+              <a:rPr lang="en-GB" noProof="0" dirty="0"/>
               <a:t>Easy upload albums and covers.</a:t>
             </a:r>
           </a:p>
@@ -9916,7 +10136,7 @@
               </a:lnSpc>
             </a:pPr>
             <a:r>
-              <a:rPr lang="en-GB" noProof="0"/>
+              <a:rPr lang="en-GB" noProof="0" dirty="0"/>
               <a:t>Ability to track statistics (number of likes, views and reviews).</a:t>
             </a:r>
           </a:p>
@@ -9927,7 +10147,7 @@
               </a:lnSpc>
             </a:pPr>
             <a:r>
-              <a:rPr lang="en-GB" noProof="0"/>
+              <a:rPr lang="en-GB" noProof="0" dirty="0"/>
               <a:t>Get fan feedback from reviews</a:t>
             </a:r>
           </a:p>
@@ -10111,7 +10331,7 @@
         </p:spPr>
         <p:txBody>
           <a:bodyPr>
-            <a:normAutofit/>
+            <a:normAutofit lnSpcReduction="10000"/>
           </a:bodyPr>
           <a:lstStyle/>
           <a:p>
@@ -10123,11 +10343,11 @@
               <a:buNone/>
             </a:pPr>
             <a:r>
-              <a:rPr lang="en-GB" b="1" noProof="0"/>
-              <a:t>Music Critic</a:t>
-            </a:r>
-            <a:r>
-              <a:rPr lang="en-GB" noProof="0"/>
+              <a:rPr lang="en-GB" b="1" noProof="0" dirty="0"/>
+              <a:t>Music Critic Jared</a:t>
+            </a:r>
+            <a:r>
+              <a:rPr lang="en-GB" noProof="0" dirty="0"/>
               <a:t>:</a:t>
             </a:r>
           </a:p>
@@ -10140,12 +10360,12 @@
               <a:buNone/>
             </a:pPr>
             <a:r>
-              <a:rPr lang="en-GB" i="1" noProof="0"/>
+              <a:rPr lang="en-GB" i="1" noProof="0" dirty="0"/>
               <a:t>Description:</a:t>
             </a:r>
             <a:r>
-              <a:rPr lang="en-GB" noProof="0"/>
-              <a:t> An experienced music lover, he runs a blog and loves to give detailed reviews of music.</a:t>
+              <a:rPr lang="en-GB" noProof="0" dirty="0"/>
+              <a:t> Jared is an experienced music lover, he runs a blog and loves to give detailed reviews of music.</a:t>
             </a:r>
           </a:p>
           <a:p>
@@ -10157,15 +10377,23 @@
               <a:buNone/>
             </a:pPr>
             <a:r>
-              <a:rPr lang="en-GB" i="1" noProof="0"/>
+              <a:rPr lang="en-GB" i="1" noProof="0" dirty="0"/>
               <a:t>Goal: </a:t>
             </a:r>
             <a:r>
+              <a:rPr lang="en-US" noProof="0" dirty="0"/>
+              <a:t>He wants to search for rare/interesting albums</a:t>
+            </a:r>
+            <a:r>
               <a:rPr lang="en-US" noProof="0"/>
-              <a:t>Search for rare/interesting albums, comment on them in detail</a:t>
-            </a:r>
-            <a:r>
-              <a:rPr lang="en-GB" noProof="0"/>
+              <a:t>, and comment </a:t>
+            </a:r>
+            <a:r>
+              <a:rPr lang="en-US" noProof="0" dirty="0"/>
+              <a:t>on them in detail</a:t>
+            </a:r>
+            <a:r>
+              <a:rPr lang="en-GB" noProof="0" dirty="0"/>
               <a:t>.</a:t>
             </a:r>
           </a:p>
@@ -10178,7 +10406,7 @@
               <a:buNone/>
             </a:pPr>
             <a:r>
-              <a:rPr lang="en-GB" i="1" noProof="0"/>
+              <a:rPr lang="en-GB" i="1" noProof="0" dirty="0"/>
               <a:t>Tasks:</a:t>
             </a:r>
           </a:p>
@@ -10189,7 +10417,7 @@
               </a:lnSpc>
             </a:pPr>
             <a:r>
-              <a:rPr lang="en-US" noProof="0"/>
+              <a:rPr lang="en-US" noProof="0" dirty="0"/>
               <a:t>Ability to find albums by genre and other metadata.</a:t>
             </a:r>
           </a:p>
@@ -10200,11 +10428,11 @@
               </a:lnSpc>
             </a:pPr>
             <a:r>
-              <a:rPr lang="en-US"/>
+              <a:rPr lang="en-US" dirty="0"/>
               <a:t>Write detailed reviews for each album</a:t>
             </a:r>
             <a:r>
-              <a:rPr lang="en-US" noProof="0"/>
+              <a:rPr lang="en-US" noProof="0" dirty="0"/>
               <a:t>.</a:t>
             </a:r>
           </a:p>

</xml_diff>